<commit_message>
Final Transportation Analytics dashboard, model and documentation
</commit_message>
<xml_diff>
--- a/TRANSPORT.pptx
+++ b/TRANSPORT.pptx
@@ -17,10 +17,11 @@
     <p:sldId id="268" r:id="rId11"/>
     <p:sldId id="265" r:id="rId12"/>
     <p:sldId id="272" r:id="rId13"/>
-    <p:sldId id="266" r:id="rId14"/>
-    <p:sldId id="269" r:id="rId15"/>
-    <p:sldId id="270" r:id="rId16"/>
-    <p:sldId id="271" r:id="rId17"/>
+    <p:sldId id="273" r:id="rId14"/>
+    <p:sldId id="266" r:id="rId15"/>
+    <p:sldId id="269" r:id="rId16"/>
+    <p:sldId id="270" r:id="rId17"/>
+    <p:sldId id="271" r:id="rId18"/>
   </p:sldIdLst>
   <p:sldSz cx="12192000" cy="6858000"/>
   <p:notesSz cx="6858000" cy="9144000"/>
@@ -3920,8 +3921,8 @@
         </p:nvSpPr>
         <p:spPr>
           <a:xfrm>
-            <a:off x="200025" y="114300"/>
-            <a:ext cx="8943975" cy="976486"/>
+            <a:off x="200025" y="95250"/>
+            <a:ext cx="8943975" cy="6323398"/>
           </a:xfrm>
           <a:prstGeom prst="rect">
             <a:avLst/>
@@ -3933,6 +3934,387 @@
           </a:bodyPr>
           <a:lstStyle/>
           <a:p>
+            <a:r>
+              <a:rPr lang="en-IN" sz="1050" dirty="0"/>
+              <a:t>X = df[FEATURES]</a:t>
+            </a:r>
+          </a:p>
+          <a:p>
+            <a:r>
+              <a:rPr lang="en-IN" sz="1050" dirty="0"/>
+              <a:t>y = df[TARGET]</a:t>
+            </a:r>
+          </a:p>
+          <a:p>
+            <a:br>
+              <a:rPr lang="en-IN" sz="1050" dirty="0"/>
+            </a:br>
+            <a:r>
+              <a:rPr lang="en-IN" sz="1050" dirty="0"/>
+              <a:t>print(</a:t>
+            </a:r>
+            <a:r>
+              <a:rPr lang="en-IN" sz="1050" dirty="0" err="1"/>
+              <a:t>f"Features</a:t>
+            </a:r>
+            <a:r>
+              <a:rPr lang="en-IN" sz="1050" dirty="0"/>
+              <a:t> used: {</a:t>
+            </a:r>
+            <a:r>
+              <a:rPr lang="en-IN" sz="1050" dirty="0" err="1"/>
+              <a:t>len</a:t>
+            </a:r>
+            <a:r>
+              <a:rPr lang="en-IN" sz="1050" dirty="0"/>
+              <a:t>(FEATURES)}, Rows: {</a:t>
+            </a:r>
+            <a:r>
+              <a:rPr lang="en-IN" sz="1050" dirty="0" err="1"/>
+              <a:t>len</a:t>
+            </a:r>
+            <a:r>
+              <a:rPr lang="en-IN" sz="1050" dirty="0"/>
+              <a:t>(df)}")</a:t>
+            </a:r>
+          </a:p>
+          <a:p>
+            <a:br>
+              <a:rPr lang="en-IN" sz="1050" dirty="0"/>
+            </a:br>
+            <a:br>
+              <a:rPr lang="en-IN" sz="1050" dirty="0"/>
+            </a:br>
+            <a:r>
+              <a:rPr lang="en-IN" sz="1050" dirty="0" err="1"/>
+              <a:t>X_train</a:t>
+            </a:r>
+            <a:r>
+              <a:rPr lang="en-IN" sz="1050" dirty="0"/>
+              <a:t>, </a:t>
+            </a:r>
+            <a:r>
+              <a:rPr lang="en-IN" sz="1050" dirty="0" err="1"/>
+              <a:t>X_test</a:t>
+            </a:r>
+            <a:r>
+              <a:rPr lang="en-IN" sz="1050" dirty="0"/>
+              <a:t>, </a:t>
+            </a:r>
+            <a:r>
+              <a:rPr lang="en-IN" sz="1050" dirty="0" err="1"/>
+              <a:t>y_train</a:t>
+            </a:r>
+            <a:r>
+              <a:rPr lang="en-IN" sz="1050" dirty="0"/>
+              <a:t>, </a:t>
+            </a:r>
+            <a:r>
+              <a:rPr lang="en-IN" sz="1050" dirty="0" err="1"/>
+              <a:t>y_test</a:t>
+            </a:r>
+            <a:r>
+              <a:rPr lang="en-IN" sz="1050" dirty="0"/>
+              <a:t> = </a:t>
+            </a:r>
+            <a:r>
+              <a:rPr lang="en-IN" sz="1050" dirty="0" err="1"/>
+              <a:t>train_test_split</a:t>
+            </a:r>
+            <a:r>
+              <a:rPr lang="en-IN" sz="1050" dirty="0"/>
+              <a:t>(</a:t>
+            </a:r>
+          </a:p>
+          <a:p>
+            <a:r>
+              <a:rPr lang="en-IN" sz="1050" dirty="0"/>
+              <a:t>    X, y, </a:t>
+            </a:r>
+            <a:r>
+              <a:rPr lang="en-IN" sz="1050" dirty="0" err="1"/>
+              <a:t>test_size</a:t>
+            </a:r>
+            <a:r>
+              <a:rPr lang="en-IN" sz="1050" dirty="0"/>
+              <a:t>=0.2, </a:t>
+            </a:r>
+            <a:r>
+              <a:rPr lang="en-IN" sz="1050" dirty="0" err="1"/>
+              <a:t>random_state</a:t>
+            </a:r>
+            <a:r>
+              <a:rPr lang="en-IN" sz="1050" dirty="0"/>
+              <a:t>=42</a:t>
+            </a:r>
+          </a:p>
+          <a:p>
+            <a:r>
+              <a:rPr lang="en-IN" sz="1050" dirty="0"/>
+              <a:t>)</a:t>
+            </a:r>
+          </a:p>
+          <a:p>
+            <a:br>
+              <a:rPr lang="en-IN" sz="1050" dirty="0"/>
+            </a:br>
+            <a:br>
+              <a:rPr lang="en-IN" sz="1050" dirty="0"/>
+            </a:br>
+            <a:r>
+              <a:rPr lang="en-IN" sz="1050" dirty="0"/>
+              <a:t>model = </a:t>
+            </a:r>
+            <a:r>
+              <a:rPr lang="en-IN" sz="1050" dirty="0" err="1"/>
+              <a:t>RandomForestRegressor</a:t>
+            </a:r>
+            <a:r>
+              <a:rPr lang="en-IN" sz="1050" dirty="0"/>
+              <a:t>(</a:t>
+            </a:r>
+          </a:p>
+          <a:p>
+            <a:r>
+              <a:rPr lang="en-IN" sz="1050" dirty="0"/>
+              <a:t>    </a:t>
+            </a:r>
+            <a:r>
+              <a:rPr lang="en-IN" sz="1050" dirty="0" err="1"/>
+              <a:t>n_estimators</a:t>
+            </a:r>
+            <a:r>
+              <a:rPr lang="en-IN" sz="1050" dirty="0"/>
+              <a:t>=100,</a:t>
+            </a:r>
+          </a:p>
+          <a:p>
+            <a:r>
+              <a:rPr lang="en-IN" sz="1050" dirty="0"/>
+              <a:t>    </a:t>
+            </a:r>
+            <a:r>
+              <a:rPr lang="en-IN" sz="1050" dirty="0" err="1"/>
+              <a:t>random_state</a:t>
+            </a:r>
+            <a:r>
+              <a:rPr lang="en-IN" sz="1050" dirty="0"/>
+              <a:t>=42</a:t>
+            </a:r>
+          </a:p>
+          <a:p>
+            <a:r>
+              <a:rPr lang="en-IN" sz="1050" dirty="0"/>
+              <a:t>)</a:t>
+            </a:r>
+          </a:p>
+          <a:p>
+            <a:br>
+              <a:rPr lang="en-IN" sz="1050" dirty="0"/>
+            </a:br>
+            <a:r>
+              <a:rPr lang="en-IN" sz="1050" dirty="0" err="1"/>
+              <a:t>model.fit</a:t>
+            </a:r>
+            <a:r>
+              <a:rPr lang="en-IN" sz="1050" dirty="0"/>
+              <a:t>(</a:t>
+            </a:r>
+            <a:r>
+              <a:rPr lang="en-IN" sz="1050" dirty="0" err="1"/>
+              <a:t>X_train</a:t>
+            </a:r>
+            <a:r>
+              <a:rPr lang="en-IN" sz="1050" dirty="0"/>
+              <a:t>, </a:t>
+            </a:r>
+            <a:r>
+              <a:rPr lang="en-IN" sz="1050" dirty="0" err="1"/>
+              <a:t>y_train</a:t>
+            </a:r>
+            <a:r>
+              <a:rPr lang="en-IN" sz="1050" dirty="0"/>
+              <a:t>)</a:t>
+            </a:r>
+          </a:p>
+          <a:p>
+            <a:br>
+              <a:rPr lang="en-IN" sz="1050" dirty="0"/>
+            </a:br>
+            <a:br>
+              <a:rPr lang="en-IN" sz="1050" dirty="0"/>
+            </a:br>
+            <a:r>
+              <a:rPr lang="en-IN" sz="1050" dirty="0" err="1"/>
+              <a:t>y_pred</a:t>
+            </a:r>
+            <a:r>
+              <a:rPr lang="en-IN" sz="1050" dirty="0"/>
+              <a:t> = </a:t>
+            </a:r>
+            <a:r>
+              <a:rPr lang="en-IN" sz="1050" dirty="0" err="1"/>
+              <a:t>model.predict</a:t>
+            </a:r>
+            <a:r>
+              <a:rPr lang="en-IN" sz="1050" dirty="0"/>
+              <a:t>(</a:t>
+            </a:r>
+            <a:r>
+              <a:rPr lang="en-IN" sz="1050" dirty="0" err="1"/>
+              <a:t>X_test</a:t>
+            </a:r>
+            <a:r>
+              <a:rPr lang="en-IN" sz="1050" dirty="0"/>
+              <a:t>)</a:t>
+            </a:r>
+          </a:p>
+          <a:p>
+            <a:br>
+              <a:rPr lang="en-IN" sz="1050" dirty="0"/>
+            </a:br>
+            <a:r>
+              <a:rPr lang="en-IN" sz="1050" dirty="0" err="1"/>
+              <a:t>mae</a:t>
+            </a:r>
+            <a:r>
+              <a:rPr lang="en-IN" sz="1050" dirty="0"/>
+              <a:t> = </a:t>
+            </a:r>
+            <a:r>
+              <a:rPr lang="en-IN" sz="1050" dirty="0" err="1"/>
+              <a:t>mean_absolute_error</a:t>
+            </a:r>
+            <a:r>
+              <a:rPr lang="en-IN" sz="1050" dirty="0"/>
+              <a:t>(</a:t>
+            </a:r>
+            <a:r>
+              <a:rPr lang="en-IN" sz="1050" dirty="0" err="1"/>
+              <a:t>y_test</a:t>
+            </a:r>
+            <a:r>
+              <a:rPr lang="en-IN" sz="1050" dirty="0"/>
+              <a:t>, </a:t>
+            </a:r>
+            <a:r>
+              <a:rPr lang="en-IN" sz="1050" dirty="0" err="1"/>
+              <a:t>y_pred</a:t>
+            </a:r>
+            <a:r>
+              <a:rPr lang="en-IN" sz="1050" dirty="0"/>
+              <a:t>)</a:t>
+            </a:r>
+          </a:p>
+          <a:p>
+            <a:r>
+              <a:rPr lang="en-IN" sz="1050" dirty="0"/>
+              <a:t>r2 = r2_score(</a:t>
+            </a:r>
+            <a:r>
+              <a:rPr lang="en-IN" sz="1050" dirty="0" err="1"/>
+              <a:t>y_test</a:t>
+            </a:r>
+            <a:r>
+              <a:rPr lang="en-IN" sz="1050" dirty="0"/>
+              <a:t>, </a:t>
+            </a:r>
+            <a:r>
+              <a:rPr lang="en-IN" sz="1050" dirty="0" err="1"/>
+              <a:t>y_pred</a:t>
+            </a:r>
+            <a:r>
+              <a:rPr lang="en-IN" sz="1050" dirty="0"/>
+              <a:t>)</a:t>
+            </a:r>
+          </a:p>
+          <a:p>
+            <a:br>
+              <a:rPr lang="en-IN" sz="1050" dirty="0"/>
+            </a:br>
+            <a:r>
+              <a:rPr lang="en-IN" sz="1050" dirty="0"/>
+              <a:t>print("Model Trained Successfully!")</a:t>
+            </a:r>
+          </a:p>
+          <a:p>
+            <a:r>
+              <a:rPr lang="en-IN" sz="1050" dirty="0"/>
+              <a:t>print(</a:t>
+            </a:r>
+            <a:r>
+              <a:rPr lang="en-IN" sz="1050" dirty="0" err="1"/>
+              <a:t>f"MAE</a:t>
+            </a:r>
+            <a:r>
+              <a:rPr lang="en-IN" sz="1050" dirty="0"/>
+              <a:t>: {mae:.4f}")</a:t>
+            </a:r>
+          </a:p>
+          <a:p>
+            <a:r>
+              <a:rPr lang="en-IN" sz="1050" dirty="0"/>
+              <a:t>print(f"R² Score: {r2:.4f}")</a:t>
+            </a:r>
+          </a:p>
+          <a:p>
+            <a:br>
+              <a:rPr lang="en-IN" sz="1050" dirty="0"/>
+            </a:br>
+            <a:br>
+              <a:rPr lang="en-IN" sz="1050" dirty="0"/>
+            </a:br>
+            <a:r>
+              <a:rPr lang="en-IN" sz="1050" dirty="0" err="1"/>
+              <a:t>os.makedirs</a:t>
+            </a:r>
+            <a:r>
+              <a:rPr lang="en-IN" sz="1050" dirty="0"/>
+              <a:t>(MODEL_DIR, </a:t>
+            </a:r>
+            <a:r>
+              <a:rPr lang="en-IN" sz="1050" dirty="0" err="1"/>
+              <a:t>exist_ok</a:t>
+            </a:r>
+            <a:r>
+              <a:rPr lang="en-IN" sz="1050" dirty="0"/>
+              <a:t>=True)</a:t>
+            </a:r>
+          </a:p>
+          <a:p>
+            <a:r>
+              <a:rPr lang="en-IN" sz="1050" dirty="0" err="1"/>
+              <a:t>joblib.dump</a:t>
+            </a:r>
+            <a:r>
+              <a:rPr lang="en-IN" sz="1050" dirty="0"/>
+              <a:t>(model, MODEL_PATH)</a:t>
+            </a:r>
+          </a:p>
+          <a:p>
+            <a:br>
+              <a:rPr lang="en-IN" sz="1050" dirty="0"/>
+            </a:br>
+            <a:r>
+              <a:rPr lang="en-IN" sz="1050" dirty="0"/>
+              <a:t>print(</a:t>
+            </a:r>
+            <a:r>
+              <a:rPr lang="en-IN" sz="1050" dirty="0" err="1"/>
+              <a:t>f"Model</a:t>
+            </a:r>
+            <a:r>
+              <a:rPr lang="en-IN" sz="1050" dirty="0"/>
+              <a:t> saved at: {MODEL_PATH}")</a:t>
+            </a:r>
+          </a:p>
+          <a:p>
+            <a:br>
+              <a:rPr lang="en-IN" sz="1050" dirty="0"/>
+            </a:br>
+            <a:endParaRPr lang="en-IN" sz="1050" dirty="0"/>
+          </a:p>
+          <a:p>
             <a:pPr>
               <a:lnSpc>
                 <a:spcPts val="1425"/>
@@ -3941,16 +4323,8 @@
                 <a:spcPts val="0"/>
               </a:spcAft>
             </a:pPr>
-            <a:r>
-              <a:rPr lang="en-IN" sz="1050" dirty="0">
-                <a:latin typeface="Times New Roman" panose="02020603050405020304" pitchFamily="18" charset="0"/>
-                <a:ea typeface="Times New Roman" panose="02020603050405020304" pitchFamily="18" charset="0"/>
-                <a:cs typeface="Times New Roman" panose="02020603050405020304" pitchFamily="18" charset="0"/>
-              </a:rPr>
-              <a:t>print("Model Trained Successfully!")</a:t>
-            </a:r>
-            <a:endParaRPr lang="en-IN" sz="1050" dirty="0">
-              <a:latin typeface="Cambria" panose="02040503050406030204" pitchFamily="18" charset="0"/>
+            <a:endParaRPr lang="en-US" sz="1050" dirty="0">
+              <a:latin typeface="Times New Roman" panose="02020603050405020304" pitchFamily="18" charset="0"/>
               <a:ea typeface="MS Mincho" panose="02020609040205080304" pitchFamily="49" charset="-128"/>
               <a:cs typeface="Times New Roman" panose="02020603050405020304" pitchFamily="18" charset="0"/>
             </a:endParaRPr>
@@ -3964,107 +4338,6 @@
                 <a:spcPts val="0"/>
               </a:spcAft>
             </a:pPr>
-            <a:r>
-              <a:rPr lang="en-IN" sz="1050" dirty="0">
-                <a:latin typeface="Times New Roman" panose="02020603050405020304" pitchFamily="18" charset="0"/>
-                <a:ea typeface="Times New Roman" panose="02020603050405020304" pitchFamily="18" charset="0"/>
-                <a:cs typeface="Times New Roman" panose="02020603050405020304" pitchFamily="18" charset="0"/>
-              </a:rPr>
-              <a:t>print(</a:t>
-            </a:r>
-            <a:r>
-              <a:rPr lang="en-IN" sz="1050" dirty="0" err="1">
-                <a:latin typeface="Times New Roman" panose="02020603050405020304" pitchFamily="18" charset="0"/>
-                <a:ea typeface="Times New Roman" panose="02020603050405020304" pitchFamily="18" charset="0"/>
-                <a:cs typeface="Times New Roman" panose="02020603050405020304" pitchFamily="18" charset="0"/>
-              </a:rPr>
-              <a:t>f"MAE</a:t>
-            </a:r>
-            <a:r>
-              <a:rPr lang="en-IN" sz="1050" dirty="0">
-                <a:latin typeface="Times New Roman" panose="02020603050405020304" pitchFamily="18" charset="0"/>
-                <a:ea typeface="Times New Roman" panose="02020603050405020304" pitchFamily="18" charset="0"/>
-                <a:cs typeface="Times New Roman" panose="02020603050405020304" pitchFamily="18" charset="0"/>
-              </a:rPr>
-              <a:t>: {mae:.4f}")</a:t>
-            </a:r>
-            <a:endParaRPr lang="en-IN" sz="1050" dirty="0">
-              <a:latin typeface="Cambria" panose="02040503050406030204" pitchFamily="18" charset="0"/>
-              <a:ea typeface="MS Mincho" panose="02020609040205080304" pitchFamily="49" charset="-128"/>
-              <a:cs typeface="Times New Roman" panose="02020603050405020304" pitchFamily="18" charset="0"/>
-            </a:endParaRPr>
-          </a:p>
-          <a:p>
-            <a:pPr>
-              <a:lnSpc>
-                <a:spcPts val="1425"/>
-              </a:lnSpc>
-              <a:spcAft>
-                <a:spcPts val="0"/>
-              </a:spcAft>
-            </a:pPr>
-            <a:r>
-              <a:rPr lang="en-IN" sz="1050" dirty="0">
-                <a:latin typeface="Times New Roman" panose="02020603050405020304" pitchFamily="18" charset="0"/>
-                <a:ea typeface="Times New Roman" panose="02020603050405020304" pitchFamily="18" charset="0"/>
-                <a:cs typeface="Times New Roman" panose="02020603050405020304" pitchFamily="18" charset="0"/>
-              </a:rPr>
-              <a:t>print(f"R² Score: {r2:.4f}")</a:t>
-            </a:r>
-            <a:endParaRPr lang="en-IN" sz="1050" dirty="0">
-              <a:latin typeface="Cambria" panose="02040503050406030204" pitchFamily="18" charset="0"/>
-              <a:ea typeface="MS Mincho" panose="02020609040205080304" pitchFamily="49" charset="-128"/>
-              <a:cs typeface="Times New Roman" panose="02020603050405020304" pitchFamily="18" charset="0"/>
-            </a:endParaRPr>
-          </a:p>
-          <a:p>
-            <a:pPr>
-              <a:lnSpc>
-                <a:spcPts val="1425"/>
-              </a:lnSpc>
-              <a:spcAft>
-                <a:spcPts val="0"/>
-              </a:spcAft>
-            </a:pPr>
-            <a:r>
-              <a:rPr lang="en-IN" sz="1050" dirty="0" err="1">
-                <a:latin typeface="Times New Roman" panose="02020603050405020304" pitchFamily="18" charset="0"/>
-                <a:ea typeface="Times New Roman" panose="02020603050405020304" pitchFamily="18" charset="0"/>
-                <a:cs typeface="Times New Roman" panose="02020603050405020304" pitchFamily="18" charset="0"/>
-              </a:rPr>
-              <a:t>joblib.dump</a:t>
-            </a:r>
-            <a:r>
-              <a:rPr lang="en-IN" sz="1050" dirty="0">
-                <a:latin typeface="Times New Roman" panose="02020603050405020304" pitchFamily="18" charset="0"/>
-                <a:ea typeface="Times New Roman" panose="02020603050405020304" pitchFamily="18" charset="0"/>
-                <a:cs typeface="Times New Roman" panose="02020603050405020304" pitchFamily="18" charset="0"/>
-              </a:rPr>
-              <a:t>(model, MODEL_PATH)</a:t>
-            </a:r>
-            <a:endParaRPr lang="en-IN" sz="1050" dirty="0">
-              <a:latin typeface="Cambria" panose="02040503050406030204" pitchFamily="18" charset="0"/>
-              <a:ea typeface="MS Mincho" panose="02020609040205080304" pitchFamily="49" charset="-128"/>
-              <a:cs typeface="Times New Roman" panose="02020603050405020304" pitchFamily="18" charset="0"/>
-            </a:endParaRPr>
-          </a:p>
-          <a:p>
-            <a:pPr>
-              <a:lnSpc>
-                <a:spcPts val="1425"/>
-              </a:lnSpc>
-              <a:spcAft>
-                <a:spcPts val="0"/>
-              </a:spcAft>
-            </a:pPr>
-            <a:r>
-              <a:rPr lang="en-IN" sz="1050" dirty="0">
-                <a:latin typeface="Times New Roman" panose="02020603050405020304" pitchFamily="18" charset="0"/>
-                <a:ea typeface="Times New Roman" panose="02020603050405020304" pitchFamily="18" charset="0"/>
-                <a:cs typeface="Times New Roman" panose="02020603050405020304" pitchFamily="18" charset="0"/>
-              </a:rPr>
-              <a:t>print(f" Model saved as {MODEL_PATH}")</a:t>
-            </a:r>
             <a:endParaRPr lang="en-IN" sz="1050" dirty="0">
               <a:latin typeface="Cambria" panose="02040503050406030204" pitchFamily="18" charset="0"/>
               <a:ea typeface="MS Mincho" panose="02020609040205080304" pitchFamily="49" charset="-128"/>
@@ -4087,8 +4360,8 @@
         </p:nvSpPr>
         <p:spPr>
           <a:xfrm>
-            <a:off x="200025" y="1090786"/>
-            <a:ext cx="5762625" cy="2820900"/>
+            <a:off x="3905249" y="2447924"/>
+            <a:ext cx="6391275" cy="2820900"/>
           </a:xfrm>
           <a:prstGeom prst="rect">
             <a:avLst/>
@@ -4306,8 +4579,8 @@
         </p:nvSpPr>
         <p:spPr>
           <a:xfrm>
-            <a:off x="361950" y="276225"/>
-            <a:ext cx="8782050" cy="6708118"/>
+            <a:off x="228600" y="323850"/>
+            <a:ext cx="8782050" cy="6394315"/>
           </a:xfrm>
           <a:prstGeom prst="rect">
             <a:avLst/>
@@ -4412,266 +4685,7 @@
               <a:rPr lang="en-IN" sz="1050" dirty="0" err="1"/>
               <a:t>os</a:t>
             </a:r>
-            <a:br>
-              <a:rPr lang="en-IN" sz="1050" dirty="0"/>
-            </a:br>
-            <a:r>
-              <a:rPr lang="en-IN" sz="1050" dirty="0" err="1"/>
-              <a:t>st.set_page_config</a:t>
-            </a:r>
-            <a:r>
-              <a:rPr lang="en-IN" sz="1050" dirty="0"/>
-              <a:t>(</a:t>
-            </a:r>
-          </a:p>
-          <a:p>
-            <a:r>
-              <a:rPr lang="en-IN" sz="1050" dirty="0"/>
-              <a:t>    </a:t>
-            </a:r>
-            <a:r>
-              <a:rPr lang="en-IN" sz="1050" dirty="0" err="1"/>
-              <a:t>page_title</a:t>
-            </a:r>
-            <a:r>
-              <a:rPr lang="en-IN" sz="1050" dirty="0"/>
-              <a:t>="Transportation Analytics Dashboard",</a:t>
-            </a:r>
-          </a:p>
-          <a:p>
-            <a:r>
-              <a:rPr lang="en-IN" sz="1050" dirty="0"/>
-              <a:t>    layout="wide"</a:t>
-            </a:r>
-          </a:p>
-          <a:p>
-            <a:r>
-              <a:rPr lang="en-IN" sz="1050" dirty="0"/>
-              <a:t>)</a:t>
-            </a:r>
-          </a:p>
-          <a:p>
-            <a:r>
-              <a:rPr lang="en-IN" sz="1050" dirty="0" err="1"/>
-              <a:t>st.title</a:t>
-            </a:r>
-            <a:r>
-              <a:rPr lang="en-IN" sz="1050" dirty="0"/>
-              <a:t>(" Transportation Analytics Dashboard")</a:t>
-            </a:r>
-          </a:p>
-          <a:p>
-            <a:r>
-              <a:rPr lang="en-IN" sz="1050" dirty="0"/>
-              <a:t>DATA_PATH = </a:t>
-            </a:r>
-            <a:r>
-              <a:rPr lang="en-IN" sz="1050" dirty="0" err="1"/>
-              <a:t>r"C</a:t>
-            </a:r>
-            <a:r>
-              <a:rPr lang="en-IN" sz="1050" dirty="0"/>
-              <a:t>:\Users\admin\Desktop\Transportation_Analytics\data\cleaned\master_analytics.csv"</a:t>
-            </a:r>
-          </a:p>
-          <a:p>
-            <a:r>
-              <a:rPr lang="en-IN" sz="1050" dirty="0"/>
-              <a:t>MODEL_PATH = </a:t>
-            </a:r>
-            <a:r>
-              <a:rPr lang="en-IN" sz="1050" dirty="0" err="1"/>
-              <a:t>r"D</a:t>
-            </a:r>
-            <a:r>
-              <a:rPr lang="en-IN" sz="1050" dirty="0"/>
-              <a:t>:\models\fuel_efficiency_model.pkl"</a:t>
-            </a:r>
-          </a:p>
-          <a:p>
             <a:endParaRPr lang="en-IN" sz="1050" dirty="0"/>
-          </a:p>
-          <a:p>
-            <a:r>
-              <a:rPr lang="en-IN" sz="1050" dirty="0"/>
-              <a:t>if not </a:t>
-            </a:r>
-            <a:r>
-              <a:rPr lang="en-IN" sz="1050" dirty="0" err="1"/>
-              <a:t>os.path.exists</a:t>
-            </a:r>
-            <a:r>
-              <a:rPr lang="en-IN" sz="1050" dirty="0"/>
-              <a:t>(DATA_PATH):</a:t>
-            </a:r>
-          </a:p>
-          <a:p>
-            <a:r>
-              <a:rPr lang="en-IN" sz="1050" dirty="0"/>
-              <a:t>    </a:t>
-            </a:r>
-            <a:r>
-              <a:rPr lang="en-IN" sz="1050" dirty="0" err="1"/>
-              <a:t>st.error</a:t>
-            </a:r>
-            <a:r>
-              <a:rPr lang="en-IN" sz="1050" dirty="0"/>
-              <a:t>(" master_analytics.csv not found")</a:t>
-            </a:r>
-          </a:p>
-          <a:p>
-            <a:r>
-              <a:rPr lang="en-IN" sz="1050" dirty="0"/>
-              <a:t>    </a:t>
-            </a:r>
-            <a:r>
-              <a:rPr lang="en-IN" sz="1050" dirty="0" err="1"/>
-              <a:t>st.stop</a:t>
-            </a:r>
-            <a:r>
-              <a:rPr lang="en-IN" sz="1050" dirty="0"/>
-              <a:t>()</a:t>
-            </a:r>
-          </a:p>
-          <a:p>
-            <a:r>
-              <a:rPr lang="en-IN" sz="1050" dirty="0"/>
-              <a:t>df = </a:t>
-            </a:r>
-            <a:r>
-              <a:rPr lang="en-IN" sz="1050" dirty="0" err="1"/>
-              <a:t>pd.read_csv</a:t>
-            </a:r>
-            <a:r>
-              <a:rPr lang="en-IN" sz="1050" dirty="0"/>
-              <a:t>(DATA_PATH)</a:t>
-            </a:r>
-          </a:p>
-          <a:p>
-            <a:r>
-              <a:rPr lang="en-IN" sz="1050" dirty="0" err="1"/>
-              <a:t>st.success</a:t>
-            </a:r>
-            <a:r>
-              <a:rPr lang="en-IN" sz="1050" dirty="0"/>
-              <a:t>(" Dataset loaded successfully")</a:t>
-            </a:r>
-          </a:p>
-          <a:p>
-            <a:endParaRPr lang="en-IN" sz="1050" dirty="0"/>
-          </a:p>
-          <a:p>
-            <a:r>
-              <a:rPr lang="en-IN" sz="1050" dirty="0"/>
-              <a:t>if not </a:t>
-            </a:r>
-            <a:r>
-              <a:rPr lang="en-IN" sz="1050" dirty="0" err="1"/>
-              <a:t>os.path.exists</a:t>
-            </a:r>
-            <a:r>
-              <a:rPr lang="en-IN" sz="1050" dirty="0"/>
-              <a:t>(MODEL_PATH):</a:t>
-            </a:r>
-          </a:p>
-          <a:p>
-            <a:r>
-              <a:rPr lang="en-IN" sz="1050" dirty="0"/>
-              <a:t>    </a:t>
-            </a:r>
-            <a:r>
-              <a:rPr lang="en-IN" sz="1050" dirty="0" err="1"/>
-              <a:t>st.error</a:t>
-            </a:r>
-            <a:r>
-              <a:rPr lang="en-IN" sz="1050" dirty="0"/>
-              <a:t>(" Model file not found. Run model_training.py")</a:t>
-            </a:r>
-          </a:p>
-          <a:p>
-            <a:r>
-              <a:rPr lang="en-IN" sz="1050" dirty="0"/>
-              <a:t>    </a:t>
-            </a:r>
-            <a:r>
-              <a:rPr lang="en-IN" sz="1050" dirty="0" err="1"/>
-              <a:t>st.stop</a:t>
-            </a:r>
-            <a:r>
-              <a:rPr lang="en-IN" sz="1050" dirty="0"/>
-              <a:t>()</a:t>
-            </a:r>
-          </a:p>
-          <a:p>
-            <a:br>
-              <a:rPr lang="en-IN" sz="1050" dirty="0"/>
-            </a:br>
-            <a:r>
-              <a:rPr lang="en-IN" sz="1050" dirty="0"/>
-              <a:t>try:</a:t>
-            </a:r>
-          </a:p>
-          <a:p>
-            <a:r>
-              <a:rPr lang="en-IN" sz="1050" dirty="0"/>
-              <a:t>    model = </a:t>
-            </a:r>
-            <a:r>
-              <a:rPr lang="en-IN" sz="1050" dirty="0" err="1"/>
-              <a:t>joblib.load</a:t>
-            </a:r>
-            <a:r>
-              <a:rPr lang="en-IN" sz="1050" dirty="0"/>
-              <a:t>(MODEL_PATH)</a:t>
-            </a:r>
-          </a:p>
-          <a:p>
-            <a:r>
-              <a:rPr lang="en-IN" sz="1050" dirty="0"/>
-              <a:t>    </a:t>
-            </a:r>
-            <a:r>
-              <a:rPr lang="en-IN" sz="1050" dirty="0" err="1"/>
-              <a:t>st.success</a:t>
-            </a:r>
-            <a:r>
-              <a:rPr lang="en-IN" sz="1050" dirty="0"/>
-              <a:t>(" Model loaded successfully")</a:t>
-            </a:r>
-          </a:p>
-          <a:p>
-            <a:r>
-              <a:rPr lang="en-IN" sz="1050" dirty="0"/>
-              <a:t>except Exception:</a:t>
-            </a:r>
-          </a:p>
-          <a:p>
-            <a:r>
-              <a:rPr lang="en-IN" sz="1050" dirty="0"/>
-              <a:t>    </a:t>
-            </a:r>
-            <a:r>
-              <a:rPr lang="en-IN" sz="1050" dirty="0" err="1"/>
-              <a:t>st.error</a:t>
-            </a:r>
-            <a:r>
-              <a:rPr lang="en-IN" sz="1050" dirty="0"/>
-              <a:t>(" Model file corrupted. Re-run model_training.py")</a:t>
-            </a:r>
-          </a:p>
-          <a:p>
-            <a:r>
-              <a:rPr lang="en-IN" sz="1050" dirty="0"/>
-              <a:t>    </a:t>
-            </a:r>
-            <a:r>
-              <a:rPr lang="en-IN" sz="1050" dirty="0" err="1"/>
-              <a:t>st.stop</a:t>
-            </a:r>
-            <a:r>
-              <a:rPr lang="en-IN" sz="1050" dirty="0"/>
-              <a:t>()</a:t>
-            </a:r>
           </a:p>
           <a:p>
             <a:br>
@@ -4682,29 +4696,50 @@
             </a:br>
             <a:r>
               <a:rPr lang="en-IN" sz="1050" dirty="0" err="1"/>
-              <a:t>st.subheader</a:t>
-            </a:r>
-            <a:r>
-              <a:rPr lang="en-IN" sz="1050" dirty="0"/>
-              <a:t>("Dataset Overview")</a:t>
-            </a:r>
-          </a:p>
-          <a:p>
-            <a:r>
-              <a:rPr lang="en-IN" sz="1050" dirty="0" err="1"/>
-              <a:t>st.dataframe</a:t>
+              <a:t>st.set_page_config</a:t>
             </a:r>
             <a:r>
               <a:rPr lang="en-IN" sz="1050" dirty="0"/>
               <a:t>(</a:t>
             </a:r>
-            <a:r>
-              <a:rPr lang="en-IN" sz="1050" dirty="0" err="1"/>
-              <a:t>df.head</a:t>
-            </a:r>
-            <a:r>
-              <a:rPr lang="en-IN" sz="1050" dirty="0"/>
-              <a:t>())</a:t>
+          </a:p>
+          <a:p>
+            <a:r>
+              <a:rPr lang="en-IN" sz="1050" dirty="0"/>
+              <a:t>    </a:t>
+            </a:r>
+            <a:r>
+              <a:rPr lang="en-IN" sz="1050" dirty="0" err="1"/>
+              <a:t>page_title</a:t>
+            </a:r>
+            <a:r>
+              <a:rPr lang="en-IN" sz="1050" dirty="0"/>
+              <a:t>="Transportation Analytics Dashboard",</a:t>
+            </a:r>
+          </a:p>
+          <a:p>
+            <a:r>
+              <a:rPr lang="en-IN" sz="1050" dirty="0"/>
+              <a:t>    layout="wide"</a:t>
+            </a:r>
+          </a:p>
+          <a:p>
+            <a:r>
+              <a:rPr lang="en-IN" sz="1050" dirty="0"/>
+              <a:t>)</a:t>
+            </a:r>
+          </a:p>
+          <a:p>
+            <a:br>
+              <a:rPr lang="en-IN" sz="1050" dirty="0"/>
+            </a:br>
+            <a:r>
+              <a:rPr lang="en-IN" sz="1050" dirty="0" err="1"/>
+              <a:t>st.title</a:t>
+            </a:r>
+            <a:r>
+              <a:rPr lang="en-IN" sz="1050" dirty="0"/>
+              <a:t>(" Transportation Analytics Dashboard")</a:t>
             </a:r>
           </a:p>
           <a:p>
@@ -4715,165 +4750,209 @@
               <a:rPr lang="en-IN" sz="1050" dirty="0"/>
             </a:br>
             <a:r>
-              <a:rPr lang="en-IN" sz="1050" dirty="0" err="1"/>
-              <a:t>st.subheader</a:t>
-            </a:r>
-            <a:r>
-              <a:rPr lang="en-IN" sz="1050" dirty="0"/>
-              <a:t>(" Fuel Efficiency per Vehicle")</a:t>
+              <a:rPr lang="en-IN" sz="1050" dirty="0"/>
+              <a:t>BASE_DIR = </a:t>
+            </a:r>
+            <a:r>
+              <a:rPr lang="en-IN" sz="1050" dirty="0" err="1"/>
+              <a:t>os.path.dirname</a:t>
+            </a:r>
+            <a:r>
+              <a:rPr lang="en-IN" sz="1050" dirty="0"/>
+              <a:t>(</a:t>
+            </a:r>
+            <a:r>
+              <a:rPr lang="en-IN" sz="1050" dirty="0" err="1"/>
+              <a:t>os.path.abspath</a:t>
+            </a:r>
+            <a:r>
+              <a:rPr lang="en-IN" sz="1050" dirty="0"/>
+              <a:t>(__file__))</a:t>
             </a:r>
           </a:p>
           <a:p>
             <a:br>
               <a:rPr lang="en-IN" sz="1050" dirty="0"/>
             </a:br>
+            <a:r>
+              <a:rPr lang="en-IN" sz="1050" dirty="0"/>
+              <a:t>DATA_PATH = </a:t>
+            </a:r>
+            <a:r>
+              <a:rPr lang="en-IN" sz="1050" dirty="0" err="1"/>
+              <a:t>os.path.join</a:t>
+            </a:r>
+            <a:r>
+              <a:rPr lang="en-IN" sz="1050" dirty="0"/>
+              <a:t>(BASE_DIR, "data", "cleaned", "master_analytics.csv")</a:t>
+            </a:r>
+          </a:p>
+          <a:p>
+            <a:r>
+              <a:rPr lang="en-IN" sz="1050" dirty="0"/>
+              <a:t>MODEL_PATH = </a:t>
+            </a:r>
+            <a:r>
+              <a:rPr lang="en-IN" sz="1050" dirty="0" err="1"/>
+              <a:t>os.path.join</a:t>
+            </a:r>
+            <a:r>
+              <a:rPr lang="en-IN" sz="1050" dirty="0"/>
+              <a:t>(BASE_DIR, "models", "</a:t>
+            </a:r>
+            <a:r>
+              <a:rPr lang="en-IN" sz="1050" dirty="0" err="1"/>
+              <a:t>fuel_efficiency_model.pkl</a:t>
+            </a:r>
+            <a:r>
+              <a:rPr lang="en-IN" sz="1050" dirty="0"/>
+              <a:t>")</a:t>
+            </a:r>
+          </a:p>
+          <a:p>
+            <a:br>
+              <a:rPr lang="en-IN" sz="1050" dirty="0"/>
+            </a:br>
+            <a:br>
+              <a:rPr lang="en-IN" sz="1050" dirty="0"/>
+            </a:br>
+            <a:r>
+              <a:rPr lang="en-IN" sz="1050" dirty="0"/>
+              <a:t>if not </a:t>
+            </a:r>
+            <a:r>
+              <a:rPr lang="en-IN" sz="1050" dirty="0" err="1"/>
+              <a:t>os.path.exists</a:t>
+            </a:r>
+            <a:r>
+              <a:rPr lang="en-IN" sz="1050" dirty="0"/>
+              <a:t>(DATA_PATH):</a:t>
+            </a:r>
+          </a:p>
+          <a:p>
+            <a:r>
+              <a:rPr lang="en-IN" sz="1050" dirty="0"/>
+              <a:t>    </a:t>
+            </a:r>
+            <a:r>
+              <a:rPr lang="en-IN" sz="1050" dirty="0" err="1"/>
+              <a:t>st.error</a:t>
+            </a:r>
+            <a:r>
+              <a:rPr lang="en-IN" sz="1050" dirty="0"/>
+              <a:t>(" master_analytics.csv not found in data/cleaned/")</a:t>
+            </a:r>
+          </a:p>
+          <a:p>
+            <a:r>
+              <a:rPr lang="en-IN" sz="1050" dirty="0"/>
+              <a:t>    </a:t>
+            </a:r>
+            <a:r>
+              <a:rPr lang="en-IN" sz="1050" dirty="0" err="1"/>
+              <a:t>st.stop</a:t>
+            </a:r>
+            <a:r>
+              <a:rPr lang="en-IN" sz="1050" dirty="0"/>
+              <a:t>()</a:t>
+            </a:r>
+          </a:p>
+          <a:p>
+            <a:br>
+              <a:rPr lang="en-IN" sz="1050" dirty="0"/>
+            </a:br>
+            <a:r>
+              <a:rPr lang="en-IN" sz="1050" dirty="0"/>
+              <a:t>df = </a:t>
+            </a:r>
+            <a:r>
+              <a:rPr lang="en-IN" sz="1050" dirty="0" err="1"/>
+              <a:t>pd.read_csv</a:t>
+            </a:r>
+            <a:r>
+              <a:rPr lang="en-IN" sz="1050" dirty="0"/>
+              <a:t>(DATA_PATH)</a:t>
+            </a:r>
+          </a:p>
+          <a:p>
+            <a:r>
+              <a:rPr lang="en-IN" sz="1050" dirty="0" err="1"/>
+              <a:t>st.success</a:t>
+            </a:r>
+            <a:r>
+              <a:rPr lang="en-IN" sz="1050" dirty="0"/>
+              <a:t>(" Dataset loaded successfully")</a:t>
+            </a:r>
+          </a:p>
+          <a:p>
+            <a:br>
+              <a:rPr lang="en-IN" sz="1050" dirty="0"/>
+            </a:br>
+            <a:br>
+              <a:rPr lang="en-IN" sz="1050" dirty="0"/>
+            </a:br>
+            <a:r>
+              <a:rPr lang="en-IN" sz="1050" dirty="0"/>
+              <a:t>if not </a:t>
+            </a:r>
+            <a:r>
+              <a:rPr lang="en-IN" sz="1050" dirty="0" err="1"/>
+              <a:t>os.path.exists</a:t>
+            </a:r>
+            <a:r>
+              <a:rPr lang="en-IN" sz="1050" dirty="0"/>
+              <a:t>(MODEL_PATH):</a:t>
+            </a:r>
+          </a:p>
+          <a:p>
+            <a:r>
+              <a:rPr lang="en-IN" sz="1050" dirty="0"/>
+              <a:t>    </a:t>
+            </a:r>
+            <a:r>
+              <a:rPr lang="en-IN" sz="1050" dirty="0" err="1"/>
+              <a:t>st.error</a:t>
+            </a:r>
+            <a:r>
+              <a:rPr lang="en-IN" sz="1050" dirty="0"/>
+              <a:t>(" Model file not found. Run model_training.py")</a:t>
+            </a:r>
+          </a:p>
+          <a:p>
+            <a:r>
+              <a:rPr lang="en-IN" sz="1050" dirty="0"/>
+              <a:t>    </a:t>
+            </a:r>
+            <a:r>
+              <a:rPr lang="en-IN" sz="1050" dirty="0" err="1"/>
+              <a:t>st.stop</a:t>
+            </a:r>
+            <a:r>
+              <a:rPr lang="en-IN" sz="1050" dirty="0"/>
+              <a:t>()</a:t>
+            </a:r>
+          </a:p>
+          <a:p>
+            <a:br>
+              <a:rPr lang="en-IN" sz="1050" dirty="0"/>
+            </a:br>
+            <a:br>
+              <a:rPr lang="en-IN" sz="1050" dirty="0"/>
+            </a:br>
+            <a:endParaRPr lang="en-IN" sz="1050" dirty="0"/>
+          </a:p>
+          <a:p>
+            <a:pPr>
+              <a:lnSpc>
+                <a:spcPct val="115000"/>
+              </a:lnSpc>
+              <a:spcAft>
+                <a:spcPts val="1000"/>
+              </a:spcAft>
+            </a:pPr>
             <a:endParaRPr lang="en-US" sz="1050" b="1" dirty="0">
               <a:effectLst/>
               <a:latin typeface="Times New Roman" panose="02020603050405020304" pitchFamily="18" charset="0"/>
-              <a:ea typeface="MS Mincho" panose="02020609040205080304" pitchFamily="49" charset="-128"/>
-              <a:cs typeface="Times New Roman" panose="02020603050405020304" pitchFamily="18" charset="0"/>
-            </a:endParaRPr>
-          </a:p>
-        </p:txBody>
-      </p:sp>
-      <p:sp>
-        <p:nvSpPr>
-          <p:cNvPr id="3" name="Rectangle 2">
-            <a:extLst>
-              <a:ext uri="{FF2B5EF4-FFF2-40B4-BE49-F238E27FC236}">
-                <a16:creationId xmlns:a16="http://schemas.microsoft.com/office/drawing/2014/main" id="{B87C6737-5C7B-4E76-B491-D5669781431C}"/>
-              </a:ext>
-            </a:extLst>
-          </p:cNvPr>
-          <p:cNvSpPr/>
-          <p:nvPr/>
-        </p:nvSpPr>
-        <p:spPr>
-          <a:xfrm>
-            <a:off x="5381625" y="2990850"/>
-            <a:ext cx="5295900" cy="1725409"/>
-          </a:xfrm>
-          <a:prstGeom prst="rect">
-            <a:avLst/>
-          </a:prstGeom>
-        </p:spPr>
-        <p:txBody>
-          <a:bodyPr wrap="square">
-            <a:spAutoFit/>
-          </a:bodyPr>
-          <a:lstStyle/>
-          <a:p>
-            <a:pPr>
-              <a:lnSpc>
-                <a:spcPct val="115000"/>
-              </a:lnSpc>
-              <a:spcAft>
-                <a:spcPts val="1000"/>
-              </a:spcAft>
-            </a:pPr>
-            <a:r>
-              <a:rPr lang="en-US" b="1" dirty="0" err="1">
-                <a:latin typeface="Times New Roman" panose="02020603050405020304" pitchFamily="18" charset="0"/>
-                <a:ea typeface="MS Mincho" panose="02020609040205080304" pitchFamily="49" charset="-128"/>
-                <a:cs typeface="Times New Roman" panose="02020603050405020304" pitchFamily="18" charset="0"/>
-              </a:rPr>
-              <a:t>streamlit</a:t>
-            </a:r>
-            <a:r>
-              <a:rPr lang="en-US" b="1" dirty="0">
-                <a:latin typeface="Times New Roman" panose="02020603050405020304" pitchFamily="18" charset="0"/>
-                <a:ea typeface="MS Mincho" panose="02020609040205080304" pitchFamily="49" charset="-128"/>
-                <a:cs typeface="Times New Roman" panose="02020603050405020304" pitchFamily="18" charset="0"/>
-              </a:rPr>
-              <a:t> run dashboard.py</a:t>
-            </a:r>
-            <a:endParaRPr lang="en-IN" dirty="0">
-              <a:latin typeface="Cambria" panose="02040503050406030204" pitchFamily="18" charset="0"/>
-              <a:ea typeface="MS Mincho" panose="02020609040205080304" pitchFamily="49" charset="-128"/>
-              <a:cs typeface="Times New Roman" panose="02020603050405020304" pitchFamily="18" charset="0"/>
-            </a:endParaRPr>
-          </a:p>
-          <a:p>
-            <a:pPr>
-              <a:lnSpc>
-                <a:spcPct val="115000"/>
-              </a:lnSpc>
-              <a:spcAft>
-                <a:spcPts val="1000"/>
-              </a:spcAft>
-            </a:pPr>
-            <a:r>
-              <a:rPr lang="en-US" dirty="0">
-                <a:latin typeface="Times New Roman" panose="02020603050405020304" pitchFamily="18" charset="0"/>
-                <a:ea typeface="MS Mincho" panose="02020609040205080304" pitchFamily="49" charset="-128"/>
-                <a:cs typeface="Times New Roman" panose="02020603050405020304" pitchFamily="18" charset="0"/>
-              </a:rPr>
-              <a:t>You can now view your </a:t>
-            </a:r>
-            <a:r>
-              <a:rPr lang="en-US" dirty="0" err="1">
-                <a:latin typeface="Times New Roman" panose="02020603050405020304" pitchFamily="18" charset="0"/>
-                <a:ea typeface="MS Mincho" panose="02020609040205080304" pitchFamily="49" charset="-128"/>
-                <a:cs typeface="Times New Roman" panose="02020603050405020304" pitchFamily="18" charset="0"/>
-              </a:rPr>
-              <a:t>Streamlit</a:t>
-            </a:r>
-            <a:r>
-              <a:rPr lang="en-US" dirty="0">
-                <a:latin typeface="Times New Roman" panose="02020603050405020304" pitchFamily="18" charset="0"/>
-                <a:ea typeface="MS Mincho" panose="02020609040205080304" pitchFamily="49" charset="-128"/>
-                <a:cs typeface="Times New Roman" panose="02020603050405020304" pitchFamily="18" charset="0"/>
-              </a:rPr>
-              <a:t> app in your browser.</a:t>
-            </a:r>
-            <a:endParaRPr lang="en-IN" dirty="0">
-              <a:latin typeface="Cambria" panose="02040503050406030204" pitchFamily="18" charset="0"/>
-              <a:ea typeface="MS Mincho" panose="02020609040205080304" pitchFamily="49" charset="-128"/>
-              <a:cs typeface="Times New Roman" panose="02020603050405020304" pitchFamily="18" charset="0"/>
-            </a:endParaRPr>
-          </a:p>
-          <a:p>
-            <a:pPr>
-              <a:lnSpc>
-                <a:spcPct val="115000"/>
-              </a:lnSpc>
-              <a:spcAft>
-                <a:spcPts val="1000"/>
-              </a:spcAft>
-            </a:pPr>
-            <a:r>
-              <a:rPr lang="en-US" dirty="0">
-                <a:latin typeface="Times New Roman" panose="02020603050405020304" pitchFamily="18" charset="0"/>
-                <a:ea typeface="MS Mincho" panose="02020609040205080304" pitchFamily="49" charset="-128"/>
-                <a:cs typeface="Times New Roman" panose="02020603050405020304" pitchFamily="18" charset="0"/>
-              </a:rPr>
-              <a:t> Local URL: http://localhost:8501</a:t>
-            </a:r>
-            <a:endParaRPr lang="en-IN" dirty="0">
-              <a:latin typeface="Cambria" panose="02040503050406030204" pitchFamily="18" charset="0"/>
-              <a:ea typeface="MS Mincho" panose="02020609040205080304" pitchFamily="49" charset="-128"/>
-              <a:cs typeface="Times New Roman" panose="02020603050405020304" pitchFamily="18" charset="0"/>
-            </a:endParaRPr>
-          </a:p>
-          <a:p>
-            <a:pPr>
-              <a:lnSpc>
-                <a:spcPct val="115000"/>
-              </a:lnSpc>
-              <a:spcAft>
-                <a:spcPts val="1000"/>
-              </a:spcAft>
-            </a:pPr>
-            <a:r>
-              <a:rPr lang="en-US" dirty="0">
-                <a:latin typeface="Times New Roman" panose="02020603050405020304" pitchFamily="18" charset="0"/>
-                <a:ea typeface="MS Mincho" panose="02020609040205080304" pitchFamily="49" charset="-128"/>
-                <a:cs typeface="Times New Roman" panose="02020603050405020304" pitchFamily="18" charset="0"/>
-              </a:rPr>
-              <a:t>  Network URL: http://10.172.46.106:8501</a:t>
-            </a:r>
-            <a:endParaRPr lang="en-IN" dirty="0">
-              <a:latin typeface="Cambria" panose="02040503050406030204" pitchFamily="18" charset="0"/>
               <a:ea typeface="MS Mincho" panose="02020609040205080304" pitchFamily="49" charset="-128"/>
               <a:cs typeface="Times New Roman" panose="02020603050405020304" pitchFamily="18" charset="0"/>
             </a:endParaRPr>
@@ -4925,7 +5004,7 @@
         <p:spPr>
           <a:xfrm>
             <a:off x="123825" y="133349"/>
-            <a:ext cx="9020175" cy="7201972"/>
+            <a:ext cx="9020175" cy="10110460"/>
           </a:xfrm>
           <a:prstGeom prst="rect">
             <a:avLst/>
@@ -4938,81 +5017,22 @@
           <a:lstStyle/>
           <a:p>
             <a:r>
-              <a:rPr lang="en-IN" sz="1050" dirty="0" err="1"/>
-              <a:t>st.subheader</a:t>
-            </a:r>
-            <a:r>
-              <a:rPr lang="en-IN" sz="1050" dirty="0"/>
-              <a:t>(" Fuel Efficiency per Vehicle")</a:t>
-            </a:r>
-          </a:p>
-          <a:p>
-            <a:br>
-              <a:rPr lang="en-IN" sz="1050" dirty="0"/>
-            </a:br>
-            <a:r>
-              <a:rPr lang="en-IN" sz="1050" dirty="0"/>
-              <a:t>fig1, ax1 = </a:t>
-            </a:r>
-            <a:r>
-              <a:rPr lang="en-IN" sz="1050" dirty="0" err="1"/>
-              <a:t>plt.subplots</a:t>
-            </a:r>
-            <a:r>
-              <a:rPr lang="en-IN" sz="1050" dirty="0"/>
-              <a:t>(</a:t>
-            </a:r>
-            <a:r>
-              <a:rPr lang="en-IN" sz="1050" dirty="0" err="1"/>
-              <a:t>figsize</a:t>
-            </a:r>
-            <a:r>
-              <a:rPr lang="en-IN" sz="1050" dirty="0"/>
-              <a:t>=(8, 4))</a:t>
-            </a:r>
-          </a:p>
-          <a:p>
-            <a:r>
-              <a:rPr lang="en-IN" sz="1050" dirty="0" err="1"/>
-              <a:t>sns.barplot</a:t>
-            </a:r>
-            <a:r>
-              <a:rPr lang="en-IN" sz="1050" dirty="0"/>
-              <a:t>(</a:t>
-            </a:r>
-          </a:p>
-          <a:p>
-            <a:r>
-              <a:rPr lang="en-IN" sz="1050" dirty="0"/>
-              <a:t>    x="</a:t>
-            </a:r>
-            <a:r>
-              <a:rPr lang="en-IN" sz="1050" dirty="0" err="1"/>
-              <a:t>Vehicle_ID</a:t>
-            </a:r>
-            <a:r>
-              <a:rPr lang="en-IN" sz="1050" dirty="0"/>
-              <a:t>",</a:t>
-            </a:r>
-          </a:p>
-          <a:p>
-            <a:r>
-              <a:rPr lang="en-IN" sz="1050" dirty="0"/>
-              <a:t>    y="</a:t>
-            </a:r>
-            <a:r>
-              <a:rPr lang="en-IN" sz="1050" dirty="0" err="1"/>
-              <a:t>Fuel_Efficiency_km_per_L</a:t>
-            </a:r>
-            <a:r>
-              <a:rPr lang="en-IN" sz="1050" dirty="0"/>
-              <a:t>",</a:t>
-            </a:r>
-          </a:p>
-          <a:p>
-            <a:r>
-              <a:rPr lang="en-IN" sz="1050" dirty="0"/>
-              <a:t>    data=df,</a:t>
+              <a:rPr lang="en-IN" sz="1050" dirty="0"/>
+              <a:t>try:</a:t>
+            </a:r>
+          </a:p>
+          <a:p>
+            <a:r>
+              <a:rPr lang="en-IN" sz="1050" dirty="0"/>
+              <a:t>    model = </a:t>
+            </a:r>
+            <a:r>
+              <a:rPr lang="en-IN" sz="1050" dirty="0" err="1"/>
+              <a:t>joblib.load</a:t>
+            </a:r>
+            <a:r>
+              <a:rPr lang="en-IN" sz="1050" dirty="0"/>
+              <a:t>(MODEL_PATH)</a:t>
             </a:r>
           </a:p>
           <a:p>
@@ -5022,33 +5042,45 @@
             </a:r>
             <a:r>
               <a:rPr lang="en-IN" sz="1050" dirty="0" err="1"/>
-              <a:t>ax</a:t>
-            </a:r>
-            <a:r>
-              <a:rPr lang="en-IN" sz="1050" dirty="0"/>
-              <a:t>=ax1</a:t>
-            </a:r>
-          </a:p>
-          <a:p>
-            <a:r>
-              <a:rPr lang="en-IN" sz="1050" dirty="0"/>
-              <a:t>)</a:t>
-            </a:r>
-          </a:p>
-          <a:p>
-            <a:r>
-              <a:rPr lang="en-IN" sz="1050" dirty="0"/>
-              <a:t>ax1.set_title("Fuel Efficiency per Vehicle")</a:t>
-            </a:r>
-          </a:p>
-          <a:p>
-            <a:r>
-              <a:rPr lang="en-IN" sz="1050" dirty="0" err="1"/>
-              <a:t>st.pyplot</a:t>
-            </a:r>
-            <a:r>
-              <a:rPr lang="en-IN" sz="1050" dirty="0"/>
-              <a:t>(fig1)</a:t>
+              <a:t>st.success</a:t>
+            </a:r>
+            <a:r>
+              <a:rPr lang="en-IN" sz="1050" dirty="0"/>
+              <a:t>(" ML Model loaded successfully")</a:t>
+            </a:r>
+          </a:p>
+          <a:p>
+            <a:r>
+              <a:rPr lang="en-IN" sz="1050" dirty="0"/>
+              <a:t>except Exception as e:</a:t>
+            </a:r>
+          </a:p>
+          <a:p>
+            <a:r>
+              <a:rPr lang="en-IN" sz="1050" dirty="0"/>
+              <a:t>    </a:t>
+            </a:r>
+            <a:r>
+              <a:rPr lang="en-IN" sz="1050" dirty="0" err="1"/>
+              <a:t>st.error</a:t>
+            </a:r>
+            <a:r>
+              <a:rPr lang="en-IN" sz="1050" dirty="0"/>
+              <a:t>(" Model file corrupted. Re-run model_training.py")</a:t>
+            </a:r>
+          </a:p>
+          <a:p>
+            <a:r>
+              <a:rPr lang="en-IN" sz="1050" dirty="0"/>
+              <a:t>    </a:t>
+            </a:r>
+            <a:r>
+              <a:rPr lang="en-IN" sz="1050" dirty="0" err="1"/>
+              <a:t>st.stop</a:t>
+            </a:r>
+            <a:r>
+              <a:rPr lang="en-IN" sz="1050" dirty="0"/>
+              <a:t>()                                                                                                                          </a:t>
             </a:r>
           </a:p>
           <a:p>
@@ -5064,13 +5096,174 @@
             </a:r>
             <a:r>
               <a:rPr lang="en-IN" sz="1050" dirty="0"/>
-              <a:t>("Delivery Delay Distribution")</a:t>
+              <a:t>(" Dataset Overview")</a:t>
+            </a:r>
+          </a:p>
+          <a:p>
+            <a:r>
+              <a:rPr lang="en-IN" sz="1050" dirty="0" err="1"/>
+              <a:t>st.dataframe</a:t>
+            </a:r>
+            <a:r>
+              <a:rPr lang="en-IN" sz="1050" dirty="0"/>
+              <a:t>(</a:t>
+            </a:r>
+            <a:r>
+              <a:rPr lang="en-IN" sz="1050" dirty="0" err="1"/>
+              <a:t>df.head</a:t>
+            </a:r>
+            <a:r>
+              <a:rPr lang="en-IN" sz="1050" dirty="0"/>
+              <a:t>())</a:t>
             </a:r>
           </a:p>
           <a:p>
             <a:br>
               <a:rPr lang="en-IN" sz="1050" dirty="0"/>
             </a:br>
+            <a:br>
+              <a:rPr lang="en-IN" sz="1050" dirty="0"/>
+            </a:br>
+            <a:r>
+              <a:rPr lang="en-IN" sz="1050" dirty="0" err="1"/>
+              <a:t>st.subheader</a:t>
+            </a:r>
+            <a:r>
+              <a:rPr lang="en-IN" sz="1050" dirty="0"/>
+              <a:t>(" Fuel Efficiency per Vehicle")</a:t>
+            </a:r>
+          </a:p>
+          <a:p>
+            <a:br>
+              <a:rPr lang="en-IN" sz="1050" dirty="0"/>
+            </a:br>
+            <a:r>
+              <a:rPr lang="en-IN" sz="1050" dirty="0"/>
+              <a:t>fig1, ax1 = </a:t>
+            </a:r>
+            <a:r>
+              <a:rPr lang="en-IN" sz="1050" dirty="0" err="1"/>
+              <a:t>plt.subplots</a:t>
+            </a:r>
+            <a:r>
+              <a:rPr lang="en-IN" sz="1050" dirty="0"/>
+              <a:t>(</a:t>
+            </a:r>
+            <a:r>
+              <a:rPr lang="en-IN" sz="1050" dirty="0" err="1"/>
+              <a:t>figsize</a:t>
+            </a:r>
+            <a:r>
+              <a:rPr lang="en-IN" sz="1050" dirty="0"/>
+              <a:t>=(8, 4))</a:t>
+            </a:r>
+          </a:p>
+          <a:p>
+            <a:r>
+              <a:rPr lang="en-IN" sz="1050" dirty="0" err="1"/>
+              <a:t>sns.barplot</a:t>
+            </a:r>
+            <a:r>
+              <a:rPr lang="en-IN" sz="1050" dirty="0"/>
+              <a:t>(</a:t>
+            </a:r>
+          </a:p>
+          <a:p>
+            <a:r>
+              <a:rPr lang="en-IN" sz="1050" dirty="0"/>
+              <a:t>    x="</a:t>
+            </a:r>
+            <a:r>
+              <a:rPr lang="en-IN" sz="1050" dirty="0" err="1"/>
+              <a:t>Vehicle_ID</a:t>
+            </a:r>
+            <a:r>
+              <a:rPr lang="en-IN" sz="1050" dirty="0"/>
+              <a:t>",</a:t>
+            </a:r>
+          </a:p>
+          <a:p>
+            <a:r>
+              <a:rPr lang="en-IN" sz="1050" dirty="0"/>
+              <a:t>    y="</a:t>
+            </a:r>
+            <a:r>
+              <a:rPr lang="en-IN" sz="1050" dirty="0" err="1"/>
+              <a:t>Fuel_Efficiency_km_per_L</a:t>
+            </a:r>
+            <a:r>
+              <a:rPr lang="en-IN" sz="1050" dirty="0"/>
+              <a:t>",</a:t>
+            </a:r>
+          </a:p>
+          <a:p>
+            <a:r>
+              <a:rPr lang="en-IN" sz="1050" dirty="0"/>
+              <a:t>    data=df,</a:t>
+            </a:r>
+          </a:p>
+          <a:p>
+            <a:r>
+              <a:rPr lang="en-IN" sz="1050" dirty="0"/>
+              <a:t>    </a:t>
+            </a:r>
+            <a:r>
+              <a:rPr lang="en-IN" sz="1050" dirty="0" err="1"/>
+              <a:t>ax</a:t>
+            </a:r>
+            <a:r>
+              <a:rPr lang="en-IN" sz="1050" dirty="0"/>
+              <a:t>=ax1</a:t>
+            </a:r>
+          </a:p>
+          <a:p>
+            <a:r>
+              <a:rPr lang="en-IN" sz="1050" dirty="0"/>
+              <a:t>)</a:t>
+            </a:r>
+          </a:p>
+          <a:p>
+            <a:r>
+              <a:rPr lang="en-IN" sz="1050" dirty="0"/>
+              <a:t>ax1.set_title("Fuel Efficiency per Vehicle")</a:t>
+            </a:r>
+          </a:p>
+          <a:p>
+            <a:r>
+              <a:rPr lang="en-IN" sz="1050" dirty="0"/>
+              <a:t>ax1.tick_params(axis='x', rotation=45)</a:t>
+            </a:r>
+          </a:p>
+          <a:p>
+            <a:r>
+              <a:rPr lang="en-IN" sz="1050" dirty="0" err="1"/>
+              <a:t>st.pyplot</a:t>
+            </a:r>
+            <a:r>
+              <a:rPr lang="en-IN" sz="1050" dirty="0"/>
+              <a:t>(fig1)</a:t>
+            </a:r>
+          </a:p>
+          <a:p>
+            <a:br>
+              <a:rPr lang="en-IN" sz="1050" dirty="0"/>
+            </a:br>
+            <a:br>
+              <a:rPr lang="en-IN" sz="1050" dirty="0"/>
+            </a:br>
+            <a:r>
+              <a:rPr lang="en-IN" sz="1050" dirty="0" err="1"/>
+              <a:t>st.subheader</a:t>
+            </a:r>
+            <a:r>
+              <a:rPr lang="en-IN" sz="1050" dirty="0"/>
+              <a:t>(" Delivery Delay Distribution")</a:t>
+            </a:r>
+          </a:p>
+          <a:p>
+            <a:br>
+              <a:rPr lang="en-IN" sz="1050" dirty="0"/>
+            </a:br>
             <a:r>
               <a:rPr lang="en-IN" sz="1050" dirty="0"/>
               <a:t>fig2, ax2 = </a:t>
@@ -5146,6 +5339,9 @@
             <a:br>
               <a:rPr lang="en-IN" sz="1050" dirty="0"/>
             </a:br>
+            <a:br>
+              <a:rPr lang="en-IN" sz="1050" dirty="0"/>
+            </a:br>
             <a:r>
               <a:rPr lang="en-IN" sz="1050" dirty="0" err="1"/>
               <a:t>st.subheader</a:t>
@@ -5268,6 +5464,9 @@
             <a:br>
               <a:rPr lang="en-IN" sz="1050" dirty="0"/>
             </a:br>
+            <a:br>
+              <a:rPr lang="en-IN" sz="1050" dirty="0"/>
+            </a:br>
             <a:r>
               <a:rPr lang="en-IN" sz="1050" dirty="0" err="1"/>
               <a:t>st.subheader</a:t>
@@ -5291,7 +5490,7 @@
             </a:r>
             <a:r>
               <a:rPr lang="en-IN" sz="1050" dirty="0"/>
-              <a:t>("Distance (km)", </a:t>
+              <a:t>("Distance Travelled (km)", </a:t>
             </a:r>
             <a:r>
               <a:rPr lang="en-IN" sz="1050" dirty="0" err="1"/>
@@ -5364,7 +5563,7 @@
             </a:r>
             <a:r>
               <a:rPr lang="en-IN" sz="1050" dirty="0"/>
-              <a:t>("Predict"):</a:t>
+              <a:t>("Predict Fuel Efficiency"):</a:t>
             </a:r>
           </a:p>
           <a:p>
@@ -5378,6 +5577,12 @@
               <a:rPr lang="en-IN" sz="1050" dirty="0"/>
               <a:t>        </a:t>
             </a:r>
+          </a:p>
+          <a:p>
+            <a:r>
+              <a:rPr lang="en-IN" sz="1050" dirty="0"/>
+              <a:t>        </a:t>
+            </a:r>
             <a:r>
               <a:rPr lang="en-IN" sz="1050" dirty="0" err="1"/>
               <a:t>input_data</a:t>
@@ -5392,7 +5597,7 @@
             </a:r>
             <a:r>
               <a:rPr lang="en-IN" sz="1050" dirty="0"/>
-              <a:t>, delay, 0, 0, 0, 0, 0, 0]]</a:t>
+              <a:t>, delay]]</a:t>
             </a:r>
           </a:p>
           <a:p>
@@ -5418,6 +5623,9 @@
             </a:r>
           </a:p>
           <a:p>
+            <a:br>
+              <a:rPr lang="en-IN" sz="1050" dirty="0"/>
+            </a:br>
             <a:r>
               <a:rPr lang="en-IN" sz="1050" dirty="0"/>
               <a:t>        </a:t>
@@ -5428,13 +5636,13 @@
             </a:r>
             <a:r>
               <a:rPr lang="en-IN" sz="1050" dirty="0"/>
-              <a:t>(f" Predicted Fuel Efficiency: {prediction[0]:.2f} km/L")</a:t>
-            </a:r>
-          </a:p>
-          <a:p>
-            <a:r>
-              <a:rPr lang="en-IN" sz="1050" dirty="0"/>
-              <a:t>    except Exception as e:</a:t>
+              <a:t>(f" Predicted Fuel Efficiency: **{prediction[0]:.2f} km/L**")</a:t>
+            </a:r>
+          </a:p>
+          <a:p>
+            <a:r>
+              <a:rPr lang="en-IN" sz="1050" dirty="0"/>
+              <a:t>    except Exception:</a:t>
             </a:r>
           </a:p>
           <a:p>
@@ -5448,7 +5656,7 @@
             </a:r>
             <a:r>
               <a:rPr lang="en-IN" sz="1050" dirty="0"/>
-              <a:t>("Prediction failed. Check model features.")</a:t>
+              <a:t>(" Prediction failed. Feature mismatch.")</a:t>
             </a:r>
           </a:p>
           <a:p>
@@ -5457,149 +5665,11 @@
             </a:br>
             <a:endParaRPr lang="en-IN" sz="1050" dirty="0"/>
           </a:p>
-        </p:txBody>
-      </p:sp>
-      <p:sp>
-        <p:nvSpPr>
-          <p:cNvPr id="4" name="Rectangle 3">
-            <a:extLst>
-              <a:ext uri="{FF2B5EF4-FFF2-40B4-BE49-F238E27FC236}">
-                <a16:creationId xmlns:a16="http://schemas.microsoft.com/office/drawing/2014/main" id="{17750FA2-A8C0-4FA5-B03E-00678575B743}"/>
-              </a:ext>
-            </a:extLst>
-          </p:cNvPr>
-          <p:cNvSpPr/>
-          <p:nvPr/>
-        </p:nvSpPr>
-        <p:spPr>
-          <a:xfrm>
-            <a:off x="4695824" y="2838450"/>
-            <a:ext cx="6296026" cy="1725409"/>
-          </a:xfrm>
-          <a:prstGeom prst="rect">
-            <a:avLst/>
-          </a:prstGeom>
-        </p:spPr>
-        <p:txBody>
-          <a:bodyPr wrap="square">
-            <a:spAutoFit/>
-          </a:bodyPr>
-          <a:lstStyle/>
-          <a:p>
-            <a:pPr>
-              <a:lnSpc>
-                <a:spcPct val="115000"/>
-              </a:lnSpc>
-              <a:spcAft>
-                <a:spcPts val="1000"/>
-              </a:spcAft>
-            </a:pPr>
-            <a:r>
-              <a:rPr lang="en-US" b="1" dirty="0" err="1">
-                <a:latin typeface="Times New Roman" panose="02020603050405020304" pitchFamily="18" charset="0"/>
-                <a:ea typeface="MS Mincho" panose="02020609040205080304" pitchFamily="49" charset="-128"/>
-                <a:cs typeface="Times New Roman" panose="02020603050405020304" pitchFamily="18" charset="0"/>
-              </a:rPr>
-              <a:t>streamlit</a:t>
-            </a:r>
-            <a:r>
-              <a:rPr lang="en-US" b="1" dirty="0">
-                <a:latin typeface="Times New Roman" panose="02020603050405020304" pitchFamily="18" charset="0"/>
-                <a:ea typeface="MS Mincho" panose="02020609040205080304" pitchFamily="49" charset="-128"/>
-                <a:cs typeface="Times New Roman" panose="02020603050405020304" pitchFamily="18" charset="0"/>
-              </a:rPr>
-              <a:t> run dashboard.py</a:t>
-            </a:r>
-            <a:endParaRPr lang="en-IN" dirty="0">
-              <a:latin typeface="Cambria" panose="02040503050406030204" pitchFamily="18" charset="0"/>
-              <a:ea typeface="MS Mincho" panose="02020609040205080304" pitchFamily="49" charset="-128"/>
-              <a:cs typeface="Times New Roman" panose="02020603050405020304" pitchFamily="18" charset="0"/>
-            </a:endParaRPr>
-          </a:p>
-          <a:p>
-            <a:pPr>
-              <a:lnSpc>
-                <a:spcPct val="115000"/>
-              </a:lnSpc>
-              <a:spcAft>
-                <a:spcPts val="1000"/>
-              </a:spcAft>
-            </a:pPr>
-            <a:r>
-              <a:rPr lang="en-US" dirty="0">
-                <a:latin typeface="Times New Roman" panose="02020603050405020304" pitchFamily="18" charset="0"/>
-                <a:ea typeface="MS Mincho" panose="02020609040205080304" pitchFamily="49" charset="-128"/>
-                <a:cs typeface="Times New Roman" panose="02020603050405020304" pitchFamily="18" charset="0"/>
-              </a:rPr>
-              <a:t>You can now view your </a:t>
-            </a:r>
-            <a:r>
-              <a:rPr lang="en-US" dirty="0" err="1">
-                <a:latin typeface="Times New Roman" panose="02020603050405020304" pitchFamily="18" charset="0"/>
-                <a:ea typeface="MS Mincho" panose="02020609040205080304" pitchFamily="49" charset="-128"/>
-                <a:cs typeface="Times New Roman" panose="02020603050405020304" pitchFamily="18" charset="0"/>
-              </a:rPr>
-              <a:t>Streamlit</a:t>
-            </a:r>
-            <a:r>
-              <a:rPr lang="en-US" dirty="0">
-                <a:latin typeface="Times New Roman" panose="02020603050405020304" pitchFamily="18" charset="0"/>
-                <a:ea typeface="MS Mincho" panose="02020609040205080304" pitchFamily="49" charset="-128"/>
-                <a:cs typeface="Times New Roman" panose="02020603050405020304" pitchFamily="18" charset="0"/>
-              </a:rPr>
-              <a:t> app in your browser.</a:t>
-            </a:r>
-            <a:endParaRPr lang="en-IN" dirty="0">
-              <a:latin typeface="Cambria" panose="02040503050406030204" pitchFamily="18" charset="0"/>
-              <a:ea typeface="MS Mincho" panose="02020609040205080304" pitchFamily="49" charset="-128"/>
-              <a:cs typeface="Times New Roman" panose="02020603050405020304" pitchFamily="18" charset="0"/>
-            </a:endParaRPr>
-          </a:p>
-          <a:p>
-            <a:pPr>
-              <a:lnSpc>
-                <a:spcPct val="115000"/>
-              </a:lnSpc>
-              <a:spcAft>
-                <a:spcPts val="1000"/>
-              </a:spcAft>
-            </a:pPr>
-            <a:r>
-              <a:rPr lang="en-US" dirty="0">
-                <a:latin typeface="Times New Roman" panose="02020603050405020304" pitchFamily="18" charset="0"/>
-                <a:ea typeface="MS Mincho" panose="02020609040205080304" pitchFamily="49" charset="-128"/>
-                <a:cs typeface="Times New Roman" panose="02020603050405020304" pitchFamily="18" charset="0"/>
-              </a:rPr>
-              <a:t> Local URL: http://localhost:8501</a:t>
-            </a:r>
-            <a:endParaRPr lang="en-IN" dirty="0">
-              <a:latin typeface="Cambria" panose="02040503050406030204" pitchFamily="18" charset="0"/>
-              <a:ea typeface="MS Mincho" panose="02020609040205080304" pitchFamily="49" charset="-128"/>
-              <a:cs typeface="Times New Roman" panose="02020603050405020304" pitchFamily="18" charset="0"/>
-            </a:endParaRPr>
-          </a:p>
-          <a:p>
-            <a:pPr>
-              <a:lnSpc>
-                <a:spcPct val="115000"/>
-              </a:lnSpc>
-              <a:spcAft>
-                <a:spcPts val="1000"/>
-              </a:spcAft>
-            </a:pPr>
-            <a:r>
-              <a:rPr lang="en-US" dirty="0">
-                <a:latin typeface="Times New Roman" panose="02020603050405020304" pitchFamily="18" charset="0"/>
-                <a:ea typeface="MS Mincho" panose="02020609040205080304" pitchFamily="49" charset="-128"/>
-                <a:cs typeface="Times New Roman" panose="02020603050405020304" pitchFamily="18" charset="0"/>
-              </a:rPr>
-              <a:t>  Network URL: http://10.172.46.106:8501</a:t>
-            </a:r>
-            <a:endParaRPr lang="en-IN" dirty="0">
-              <a:latin typeface="Cambria" panose="02040503050406030204" pitchFamily="18" charset="0"/>
-              <a:ea typeface="MS Mincho" panose="02020609040205080304" pitchFamily="49" charset="-128"/>
-              <a:cs typeface="Times New Roman" panose="02020603050405020304" pitchFamily="18" charset="0"/>
-            </a:endParaRPr>
+          <a:p>
+            <a:br>
+              <a:rPr lang="en-IN" sz="1050" dirty="0"/>
+            </a:br>
+            <a:endParaRPr lang="en-IN" sz="1050" dirty="0"/>
           </a:p>
         </p:txBody>
       </p:sp>
@@ -5617,6 +5687,401 @@
 </file>
 
 <file path=ppt/slides/slide13.xml><?xml version="1.0" encoding="utf-8"?>
+<p:sld xmlns:a="http://schemas.openxmlformats.org/drawingml/2006/main" xmlns:r="http://schemas.openxmlformats.org/officeDocument/2006/relationships" xmlns:p="http://schemas.openxmlformats.org/presentationml/2006/main">
+  <p:cSld>
+    <p:spTree>
+      <p:nvGrpSpPr>
+        <p:cNvPr id="1" name=""/>
+        <p:cNvGrpSpPr/>
+        <p:nvPr/>
+      </p:nvGrpSpPr>
+      <p:grpSpPr>
+        <a:xfrm>
+          <a:off x="0" y="0"/>
+          <a:ext cx="0" cy="0"/>
+          <a:chOff x="0" y="0"/>
+          <a:chExt cx="0" cy="0"/>
+        </a:xfrm>
+      </p:grpSpPr>
+      <p:sp>
+        <p:nvSpPr>
+          <p:cNvPr id="2" name="Rectangle 1">
+            <a:extLst>
+              <a:ext uri="{FF2B5EF4-FFF2-40B4-BE49-F238E27FC236}">
+                <a16:creationId xmlns:a16="http://schemas.microsoft.com/office/drawing/2014/main" id="{2BE4D223-5E1F-4D0C-A539-F913FA5F88EE}"/>
+              </a:ext>
+            </a:extLst>
+          </p:cNvPr>
+          <p:cNvSpPr/>
+          <p:nvPr/>
+        </p:nvSpPr>
+        <p:spPr>
+          <a:xfrm>
+            <a:off x="76200" y="638175"/>
+            <a:ext cx="9067800" cy="2516073"/>
+          </a:xfrm>
+          <a:prstGeom prst="rect">
+            <a:avLst/>
+          </a:prstGeom>
+        </p:spPr>
+        <p:txBody>
+          <a:bodyPr wrap="square">
+            <a:spAutoFit/>
+          </a:bodyPr>
+          <a:lstStyle/>
+          <a:p>
+            <a:r>
+              <a:rPr lang="en-IN" sz="1050" dirty="0" err="1"/>
+              <a:t>st.subheader</a:t>
+            </a:r>
+            <a:r>
+              <a:rPr lang="en-IN" sz="1050" dirty="0"/>
+              <a:t>(" Predict Fuel Efficiency")</a:t>
+            </a:r>
+          </a:p>
+          <a:p>
+            <a:br>
+              <a:rPr lang="en-IN" sz="1050" dirty="0"/>
+            </a:br>
+            <a:r>
+              <a:rPr lang="en-IN" sz="1050" dirty="0"/>
+              <a:t>distance = </a:t>
+            </a:r>
+            <a:r>
+              <a:rPr lang="en-IN" sz="1050" dirty="0" err="1"/>
+              <a:t>st.number_input</a:t>
+            </a:r>
+            <a:r>
+              <a:rPr lang="en-IN" sz="1050" dirty="0"/>
+              <a:t>("Distance Travelled (km)", </a:t>
+            </a:r>
+            <a:r>
+              <a:rPr lang="en-IN" sz="1050" dirty="0" err="1"/>
+              <a:t>min_value</a:t>
+            </a:r>
+            <a:r>
+              <a:rPr lang="en-IN" sz="1050" dirty="0"/>
+              <a:t>=1.0)</a:t>
+            </a:r>
+          </a:p>
+          <a:p>
+            <a:r>
+              <a:rPr lang="en-IN" sz="1050" dirty="0" err="1"/>
+              <a:t>fuel_used</a:t>
+            </a:r>
+            <a:r>
+              <a:rPr lang="en-IN" sz="1050" dirty="0"/>
+              <a:t> = </a:t>
+            </a:r>
+            <a:r>
+              <a:rPr lang="en-IN" sz="1050" dirty="0" err="1"/>
+              <a:t>st.number_input</a:t>
+            </a:r>
+            <a:r>
+              <a:rPr lang="en-IN" sz="1050" dirty="0"/>
+              <a:t>("Fuel Used (litres)", </a:t>
+            </a:r>
+            <a:r>
+              <a:rPr lang="en-IN" sz="1050" dirty="0" err="1"/>
+              <a:t>min_value</a:t>
+            </a:r>
+            <a:r>
+              <a:rPr lang="en-IN" sz="1050" dirty="0"/>
+              <a:t>=0.1)</a:t>
+            </a:r>
+          </a:p>
+          <a:p>
+            <a:r>
+              <a:rPr lang="en-IN" sz="1050" dirty="0"/>
+              <a:t>delay = </a:t>
+            </a:r>
+            <a:r>
+              <a:rPr lang="en-IN" sz="1050" dirty="0" err="1"/>
+              <a:t>st.number_input</a:t>
+            </a:r>
+            <a:r>
+              <a:rPr lang="en-IN" sz="1050" dirty="0"/>
+              <a:t>("Delay (minutes)", </a:t>
+            </a:r>
+            <a:r>
+              <a:rPr lang="en-IN" sz="1050" dirty="0" err="1"/>
+              <a:t>min_value</a:t>
+            </a:r>
+            <a:r>
+              <a:rPr lang="en-IN" sz="1050" dirty="0"/>
+              <a:t>=0.0)</a:t>
+            </a:r>
+          </a:p>
+          <a:p>
+            <a:br>
+              <a:rPr lang="en-IN" sz="1050" dirty="0"/>
+            </a:br>
+            <a:r>
+              <a:rPr lang="en-IN" sz="1050" dirty="0"/>
+              <a:t>if </a:t>
+            </a:r>
+            <a:r>
+              <a:rPr lang="en-IN" sz="1050" dirty="0" err="1"/>
+              <a:t>st.button</a:t>
+            </a:r>
+            <a:r>
+              <a:rPr lang="en-IN" sz="1050" dirty="0"/>
+              <a:t>("Predict Fuel Efficiency"):</a:t>
+            </a:r>
+          </a:p>
+          <a:p>
+            <a:r>
+              <a:rPr lang="en-IN" sz="1050" dirty="0"/>
+              <a:t>    try:</a:t>
+            </a:r>
+          </a:p>
+          <a:p>
+            <a:r>
+              <a:rPr lang="en-IN" sz="1050" dirty="0"/>
+              <a:t>        </a:t>
+            </a:r>
+          </a:p>
+          <a:p>
+            <a:r>
+              <a:rPr lang="en-IN" sz="1050" dirty="0"/>
+              <a:t>        </a:t>
+            </a:r>
+            <a:r>
+              <a:rPr lang="en-IN" sz="1050" dirty="0" err="1"/>
+              <a:t>input_data</a:t>
+            </a:r>
+            <a:r>
+              <a:rPr lang="en-IN" sz="1050" dirty="0"/>
+              <a:t> = [[distance, </a:t>
+            </a:r>
+            <a:r>
+              <a:rPr lang="en-IN" sz="1050" dirty="0" err="1"/>
+              <a:t>fuel_used</a:t>
+            </a:r>
+            <a:r>
+              <a:rPr lang="en-IN" sz="1050" dirty="0"/>
+              <a:t>, delay]]</a:t>
+            </a:r>
+          </a:p>
+          <a:p>
+            <a:r>
+              <a:rPr lang="en-IN" sz="1050" dirty="0"/>
+              <a:t>        prediction = </a:t>
+            </a:r>
+            <a:r>
+              <a:rPr lang="en-IN" sz="1050" dirty="0" err="1"/>
+              <a:t>model.predict</a:t>
+            </a:r>
+            <a:r>
+              <a:rPr lang="en-IN" sz="1050" dirty="0"/>
+              <a:t>(</a:t>
+            </a:r>
+            <a:r>
+              <a:rPr lang="en-IN" sz="1050" dirty="0" err="1"/>
+              <a:t>input_data</a:t>
+            </a:r>
+            <a:r>
+              <a:rPr lang="en-IN" sz="1050" dirty="0"/>
+              <a:t>)</a:t>
+            </a:r>
+          </a:p>
+          <a:p>
+            <a:br>
+              <a:rPr lang="en-IN" sz="1050" dirty="0"/>
+            </a:br>
+            <a:r>
+              <a:rPr lang="en-IN" sz="1050" dirty="0"/>
+              <a:t>        </a:t>
+            </a:r>
+            <a:r>
+              <a:rPr lang="en-IN" sz="1050" dirty="0" err="1"/>
+              <a:t>st.success</a:t>
+            </a:r>
+            <a:r>
+              <a:rPr lang="en-IN" sz="1050" dirty="0"/>
+              <a:t>(f" Predicted Fuel Efficiency: **{prediction[0]:.2f} km/L**")</a:t>
+            </a:r>
+          </a:p>
+          <a:p>
+            <a:r>
+              <a:rPr lang="en-IN" sz="1050" dirty="0"/>
+              <a:t>    except Exception:</a:t>
+            </a:r>
+          </a:p>
+          <a:p>
+            <a:r>
+              <a:rPr lang="en-IN" sz="1050" dirty="0"/>
+              <a:t>        </a:t>
+            </a:r>
+            <a:r>
+              <a:rPr lang="en-IN" sz="1050" dirty="0" err="1"/>
+              <a:t>st.error</a:t>
+            </a:r>
+            <a:r>
+              <a:rPr lang="en-IN" sz="1050" dirty="0"/>
+              <a:t>(" Prediction failed. Feature mismatch.")</a:t>
+            </a:r>
+          </a:p>
+        </p:txBody>
+      </p:sp>
+      <p:sp>
+        <p:nvSpPr>
+          <p:cNvPr id="3" name="Rectangle 2">
+            <a:extLst>
+              <a:ext uri="{FF2B5EF4-FFF2-40B4-BE49-F238E27FC236}">
+                <a16:creationId xmlns:a16="http://schemas.microsoft.com/office/drawing/2014/main" id="{EF1ABB15-E1D8-4DC1-B421-2E73A4723244}"/>
+              </a:ext>
+            </a:extLst>
+          </p:cNvPr>
+          <p:cNvSpPr/>
+          <p:nvPr/>
+        </p:nvSpPr>
+        <p:spPr>
+          <a:xfrm>
+            <a:off x="219076" y="3703754"/>
+            <a:ext cx="7772400" cy="1725409"/>
+          </a:xfrm>
+          <a:prstGeom prst="rect">
+            <a:avLst/>
+          </a:prstGeom>
+        </p:spPr>
+        <p:txBody>
+          <a:bodyPr wrap="square">
+            <a:spAutoFit/>
+          </a:bodyPr>
+          <a:lstStyle/>
+          <a:p>
+            <a:pPr>
+              <a:lnSpc>
+                <a:spcPct val="115000"/>
+              </a:lnSpc>
+              <a:spcAft>
+                <a:spcPts val="1000"/>
+              </a:spcAft>
+            </a:pPr>
+            <a:r>
+              <a:rPr lang="en-US" b="1" dirty="0" err="1">
+                <a:latin typeface="Times New Roman" panose="02020603050405020304" pitchFamily="18" charset="0"/>
+                <a:ea typeface="MS Mincho" panose="02020609040205080304" pitchFamily="49" charset="-128"/>
+                <a:cs typeface="Times New Roman" panose="02020603050405020304" pitchFamily="18" charset="0"/>
+              </a:rPr>
+              <a:t>streamlit</a:t>
+            </a:r>
+            <a:r>
+              <a:rPr lang="en-US" b="1" dirty="0">
+                <a:latin typeface="Times New Roman" panose="02020603050405020304" pitchFamily="18" charset="0"/>
+                <a:ea typeface="MS Mincho" panose="02020609040205080304" pitchFamily="49" charset="-128"/>
+                <a:cs typeface="Times New Roman" panose="02020603050405020304" pitchFamily="18" charset="0"/>
+              </a:rPr>
+              <a:t> run dashboard.py</a:t>
+            </a:r>
+            <a:endParaRPr lang="en-IN" dirty="0">
+              <a:latin typeface="Cambria" panose="02040503050406030204" pitchFamily="18" charset="0"/>
+              <a:ea typeface="MS Mincho" panose="02020609040205080304" pitchFamily="49" charset="-128"/>
+              <a:cs typeface="Times New Roman" panose="02020603050405020304" pitchFamily="18" charset="0"/>
+            </a:endParaRPr>
+          </a:p>
+          <a:p>
+            <a:pPr>
+              <a:lnSpc>
+                <a:spcPct val="115000"/>
+              </a:lnSpc>
+              <a:spcAft>
+                <a:spcPts val="1000"/>
+              </a:spcAft>
+            </a:pPr>
+            <a:r>
+              <a:rPr lang="en-US" dirty="0">
+                <a:latin typeface="Times New Roman" panose="02020603050405020304" pitchFamily="18" charset="0"/>
+                <a:ea typeface="MS Mincho" panose="02020609040205080304" pitchFamily="49" charset="-128"/>
+                <a:cs typeface="Times New Roman" panose="02020603050405020304" pitchFamily="18" charset="0"/>
+              </a:rPr>
+              <a:t>You can now view your </a:t>
+            </a:r>
+            <a:r>
+              <a:rPr lang="en-US" dirty="0" err="1">
+                <a:latin typeface="Times New Roman" panose="02020603050405020304" pitchFamily="18" charset="0"/>
+                <a:ea typeface="MS Mincho" panose="02020609040205080304" pitchFamily="49" charset="-128"/>
+                <a:cs typeface="Times New Roman" panose="02020603050405020304" pitchFamily="18" charset="0"/>
+              </a:rPr>
+              <a:t>Streamlit</a:t>
+            </a:r>
+            <a:r>
+              <a:rPr lang="en-US" dirty="0">
+                <a:latin typeface="Times New Roman" panose="02020603050405020304" pitchFamily="18" charset="0"/>
+                <a:ea typeface="MS Mincho" panose="02020609040205080304" pitchFamily="49" charset="-128"/>
+                <a:cs typeface="Times New Roman" panose="02020603050405020304" pitchFamily="18" charset="0"/>
+              </a:rPr>
+              <a:t> app in your browser.</a:t>
+            </a:r>
+            <a:endParaRPr lang="en-IN" dirty="0">
+              <a:latin typeface="Cambria" panose="02040503050406030204" pitchFamily="18" charset="0"/>
+              <a:ea typeface="MS Mincho" panose="02020609040205080304" pitchFamily="49" charset="-128"/>
+              <a:cs typeface="Times New Roman" panose="02020603050405020304" pitchFamily="18" charset="0"/>
+            </a:endParaRPr>
+          </a:p>
+          <a:p>
+            <a:pPr>
+              <a:lnSpc>
+                <a:spcPct val="115000"/>
+              </a:lnSpc>
+              <a:spcAft>
+                <a:spcPts val="1000"/>
+              </a:spcAft>
+            </a:pPr>
+            <a:r>
+              <a:rPr lang="en-US" dirty="0">
+                <a:latin typeface="Times New Roman" panose="02020603050405020304" pitchFamily="18" charset="0"/>
+                <a:ea typeface="MS Mincho" panose="02020609040205080304" pitchFamily="49" charset="-128"/>
+                <a:cs typeface="Times New Roman" panose="02020603050405020304" pitchFamily="18" charset="0"/>
+              </a:rPr>
+              <a:t> Local URL: http://localhost:8501</a:t>
+            </a:r>
+            <a:endParaRPr lang="en-IN" dirty="0">
+              <a:latin typeface="Cambria" panose="02040503050406030204" pitchFamily="18" charset="0"/>
+              <a:ea typeface="MS Mincho" panose="02020609040205080304" pitchFamily="49" charset="-128"/>
+              <a:cs typeface="Times New Roman" panose="02020603050405020304" pitchFamily="18" charset="0"/>
+            </a:endParaRPr>
+          </a:p>
+          <a:p>
+            <a:pPr>
+              <a:lnSpc>
+                <a:spcPct val="115000"/>
+              </a:lnSpc>
+              <a:spcAft>
+                <a:spcPts val="1000"/>
+              </a:spcAft>
+            </a:pPr>
+            <a:r>
+              <a:rPr lang="en-US" dirty="0">
+                <a:latin typeface="Times New Roman" panose="02020603050405020304" pitchFamily="18" charset="0"/>
+                <a:ea typeface="MS Mincho" panose="02020609040205080304" pitchFamily="49" charset="-128"/>
+                <a:cs typeface="Times New Roman" panose="02020603050405020304" pitchFamily="18" charset="0"/>
+              </a:rPr>
+              <a:t>  Network URL: http://10.172.46.106:8501</a:t>
+            </a:r>
+            <a:endParaRPr lang="en-IN" dirty="0">
+              <a:latin typeface="Cambria" panose="02040503050406030204" pitchFamily="18" charset="0"/>
+              <a:ea typeface="MS Mincho" panose="02020609040205080304" pitchFamily="49" charset="-128"/>
+              <a:cs typeface="Times New Roman" panose="02020603050405020304" pitchFamily="18" charset="0"/>
+            </a:endParaRPr>
+          </a:p>
+        </p:txBody>
+      </p:sp>
+    </p:spTree>
+    <p:extLst>
+      <p:ext uri="{BB962C8B-B14F-4D97-AF65-F5344CB8AC3E}">
+        <p14:creationId xmlns:p14="http://schemas.microsoft.com/office/powerpoint/2010/main" val="3307180135"/>
+      </p:ext>
+    </p:extLst>
+  </p:cSld>
+  <p:clrMapOvr>
+    <a:masterClrMapping/>
+  </p:clrMapOvr>
+</p:sld>
+</file>
+
+<file path=ppt/slides/slide14.xml><?xml version="1.0" encoding="utf-8"?>
 <p:sld xmlns:a="http://schemas.openxmlformats.org/drawingml/2006/main" xmlns:r="http://schemas.openxmlformats.org/officeDocument/2006/relationships" xmlns:p="http://schemas.openxmlformats.org/presentationml/2006/main">
   <p:cSld>
     <p:spTree>
@@ -5898,7 +6363,7 @@
 </p:sld>
 </file>
 
-<file path=ppt/slides/slide14.xml><?xml version="1.0" encoding="utf-8"?>
+<file path=ppt/slides/slide15.xml><?xml version="1.0" encoding="utf-8"?>
 <p:sld xmlns:a="http://schemas.openxmlformats.org/drawingml/2006/main" xmlns:r="http://schemas.openxmlformats.org/officeDocument/2006/relationships" xmlns:p="http://schemas.openxmlformats.org/presentationml/2006/main">
   <p:cSld>
     <p:spTree>
@@ -6272,7 +6737,7 @@
 </p:sld>
 </file>
 
-<file path=ppt/slides/slide15.xml><?xml version="1.0" encoding="utf-8"?>
+<file path=ppt/slides/slide16.xml><?xml version="1.0" encoding="utf-8"?>
 <p:sld xmlns:a="http://schemas.openxmlformats.org/drawingml/2006/main" xmlns:r="http://schemas.openxmlformats.org/officeDocument/2006/relationships" xmlns:p="http://schemas.openxmlformats.org/presentationml/2006/main">
   <p:cSld>
     <p:spTree>
@@ -6756,7 +7221,7 @@
 </p:sld>
 </file>
 
-<file path=ppt/slides/slide16.xml><?xml version="1.0" encoding="utf-8"?>
+<file path=ppt/slides/slide17.xml><?xml version="1.0" encoding="utf-8"?>
 <p:sld xmlns:a="http://schemas.openxmlformats.org/drawingml/2006/main" xmlns:r="http://schemas.openxmlformats.org/officeDocument/2006/relationships" xmlns:p="http://schemas.openxmlformats.org/presentationml/2006/main">
   <p:cSld>
     <p:spTree>
@@ -13236,7 +13701,7 @@
         <p:spPr>
           <a:xfrm>
             <a:off x="190500" y="76200"/>
-            <a:ext cx="9715500" cy="6944978"/>
+            <a:ext cx="9715500" cy="12292852"/>
           </a:xfrm>
           <a:prstGeom prst="rect">
             <a:avLst/>
@@ -13272,1421 +13737,712 @@
             </a:endParaRPr>
           </a:p>
           <a:p>
-            <a:pPr>
-              <a:lnSpc>
-                <a:spcPct val="115000"/>
-              </a:lnSpc>
-              <a:spcAft>
-                <a:spcPts val="1000"/>
-              </a:spcAft>
-            </a:pPr>
-            <a:r>
-              <a:rPr lang="en-IN" sz="1050" dirty="0">
-                <a:latin typeface="Times New Roman" panose="02020603050405020304" pitchFamily="18" charset="0"/>
-                <a:ea typeface="Times New Roman" panose="02020603050405020304" pitchFamily="18" charset="0"/>
-                <a:cs typeface="Times New Roman" panose="02020603050405020304" pitchFamily="18" charset="0"/>
-              </a:rPr>
+            <a:r>
+              <a:rPr lang="en-IN" sz="1050" dirty="0"/>
+              <a:t>import pandas as pd</a:t>
+            </a:r>
+          </a:p>
+          <a:p>
+            <a:r>
+              <a:rPr lang="en-IN" sz="1050" dirty="0"/>
               <a:t>import </a:t>
             </a:r>
             <a:r>
-              <a:rPr lang="en-IN" sz="1050" dirty="0" err="1">
-                <a:latin typeface="Times New Roman" panose="02020603050405020304" pitchFamily="18" charset="0"/>
-                <a:ea typeface="Times New Roman" panose="02020603050405020304" pitchFamily="18" charset="0"/>
-                <a:cs typeface="Times New Roman" panose="02020603050405020304" pitchFamily="18" charset="0"/>
-              </a:rPr>
+              <a:rPr lang="en-IN" sz="1050" dirty="0" err="1"/>
               <a:t>os</a:t>
             </a:r>
-            <a:endParaRPr lang="en-IN" sz="1050" dirty="0">
-              <a:latin typeface="Cambria" panose="02040503050406030204" pitchFamily="18" charset="0"/>
-              <a:ea typeface="MS Mincho" panose="02020609040205080304" pitchFamily="49" charset="-128"/>
-              <a:cs typeface="Times New Roman" panose="02020603050405020304" pitchFamily="18" charset="0"/>
-            </a:endParaRPr>
-          </a:p>
-          <a:p>
-            <a:pPr>
-              <a:lnSpc>
-                <a:spcPct val="115000"/>
-              </a:lnSpc>
-              <a:spcAft>
-                <a:spcPts val="1000"/>
-              </a:spcAft>
-            </a:pPr>
-            <a:r>
-              <a:rPr lang="en-IN" sz="1050" dirty="0" err="1">
-                <a:latin typeface="Times New Roman" panose="02020603050405020304" pitchFamily="18" charset="0"/>
-                <a:ea typeface="Times New Roman" panose="02020603050405020304" pitchFamily="18" charset="0"/>
-                <a:cs typeface="Times New Roman" panose="02020603050405020304" pitchFamily="18" charset="0"/>
-              </a:rPr>
-              <a:t>mport</a:t>
-            </a:r>
-            <a:r>
-              <a:rPr lang="en-IN" sz="1050" dirty="0">
-                <a:latin typeface="Times New Roman" panose="02020603050405020304" pitchFamily="18" charset="0"/>
-                <a:ea typeface="Times New Roman" panose="02020603050405020304" pitchFamily="18" charset="0"/>
-                <a:cs typeface="Times New Roman" panose="02020603050405020304" pitchFamily="18" charset="0"/>
-              </a:rPr>
-              <a:t> pandas as pd</a:t>
-            </a:r>
-            <a:endParaRPr lang="en-IN" sz="1050" dirty="0">
-              <a:effectLst/>
-              <a:latin typeface="Cambria" panose="02040503050406030204" pitchFamily="18" charset="0"/>
-              <a:ea typeface="MS Mincho" panose="02020609040205080304" pitchFamily="49" charset="-128"/>
-              <a:cs typeface="Times New Roman" panose="02020603050405020304" pitchFamily="18" charset="0"/>
-            </a:endParaRPr>
-          </a:p>
-          <a:p>
-            <a:pPr>
-              <a:lnSpc>
-                <a:spcPts val="1425"/>
-              </a:lnSpc>
-              <a:spcAft>
-                <a:spcPts val="0"/>
-              </a:spcAft>
-            </a:pPr>
-            <a:r>
-              <a:rPr lang="en-IN" sz="1050" dirty="0">
-                <a:latin typeface="Times New Roman" panose="02020603050405020304" pitchFamily="18" charset="0"/>
-                <a:ea typeface="Times New Roman" panose="02020603050405020304" pitchFamily="18" charset="0"/>
-                <a:cs typeface="Times New Roman" panose="02020603050405020304" pitchFamily="18" charset="0"/>
-              </a:rPr>
+            <a:endParaRPr lang="en-IN" sz="1050" dirty="0"/>
+          </a:p>
+          <a:p>
+            <a:r>
+              <a:rPr lang="en-IN" sz="1050" dirty="0"/>
+              <a:t>import </a:t>
+            </a:r>
+            <a:r>
+              <a:rPr lang="en-IN" sz="1050" dirty="0" err="1"/>
+              <a:t>joblib</a:t>
+            </a:r>
+            <a:endParaRPr lang="en-IN" sz="1050" dirty="0"/>
+          </a:p>
+          <a:p>
+            <a:br>
+              <a:rPr lang="en-IN" sz="1050" dirty="0"/>
+            </a:br>
+            <a:r>
+              <a:rPr lang="en-IN" sz="1050" dirty="0"/>
               <a:t>from </a:t>
             </a:r>
             <a:r>
-              <a:rPr lang="en-IN" sz="1050" dirty="0" err="1">
-                <a:latin typeface="Times New Roman" panose="02020603050405020304" pitchFamily="18" charset="0"/>
-                <a:ea typeface="Times New Roman" panose="02020603050405020304" pitchFamily="18" charset="0"/>
-                <a:cs typeface="Times New Roman" panose="02020603050405020304" pitchFamily="18" charset="0"/>
-              </a:rPr>
+              <a:rPr lang="en-IN" sz="1050" dirty="0" err="1"/>
+              <a:t>sklearn.model_selection</a:t>
+            </a:r>
+            <a:r>
+              <a:rPr lang="en-IN" sz="1050" dirty="0"/>
+              <a:t> import </a:t>
+            </a:r>
+            <a:r>
+              <a:rPr lang="en-IN" sz="1050" dirty="0" err="1"/>
+              <a:t>train_test_split</a:t>
+            </a:r>
+            <a:endParaRPr lang="en-IN" sz="1050" dirty="0"/>
+          </a:p>
+          <a:p>
+            <a:r>
+              <a:rPr lang="en-IN" sz="1050" dirty="0"/>
+              <a:t>from </a:t>
+            </a:r>
+            <a:r>
+              <a:rPr lang="en-IN" sz="1050" dirty="0" err="1"/>
               <a:t>sklearn.ensemble</a:t>
             </a:r>
             <a:r>
-              <a:rPr lang="en-IN" sz="1050" dirty="0">
-                <a:latin typeface="Times New Roman" panose="02020603050405020304" pitchFamily="18" charset="0"/>
-                <a:ea typeface="Times New Roman" panose="02020603050405020304" pitchFamily="18" charset="0"/>
-                <a:cs typeface="Times New Roman" panose="02020603050405020304" pitchFamily="18" charset="0"/>
-              </a:rPr>
+              <a:rPr lang="en-IN" sz="1050" dirty="0"/>
               <a:t> import </a:t>
             </a:r>
             <a:r>
-              <a:rPr lang="en-IN" sz="1050" dirty="0" err="1">
-                <a:latin typeface="Times New Roman" panose="02020603050405020304" pitchFamily="18" charset="0"/>
-                <a:ea typeface="Times New Roman" panose="02020603050405020304" pitchFamily="18" charset="0"/>
-                <a:cs typeface="Times New Roman" panose="02020603050405020304" pitchFamily="18" charset="0"/>
-              </a:rPr>
+              <a:rPr lang="en-IN" sz="1050" dirty="0" err="1"/>
               <a:t>RandomForestRegressor</a:t>
             </a:r>
-            <a:endParaRPr lang="en-IN" sz="1050" dirty="0">
-              <a:effectLst/>
-              <a:latin typeface="Cambria" panose="02040503050406030204" pitchFamily="18" charset="0"/>
-              <a:ea typeface="MS Mincho" panose="02020609040205080304" pitchFamily="49" charset="-128"/>
-              <a:cs typeface="Times New Roman" panose="02020603050405020304" pitchFamily="18" charset="0"/>
-            </a:endParaRPr>
-          </a:p>
-          <a:p>
-            <a:pPr>
-              <a:lnSpc>
-                <a:spcPts val="1425"/>
-              </a:lnSpc>
-              <a:spcAft>
-                <a:spcPts val="0"/>
-              </a:spcAft>
-            </a:pPr>
-            <a:r>
-              <a:rPr lang="en-IN" sz="1050" dirty="0">
-                <a:latin typeface="Times New Roman" panose="02020603050405020304" pitchFamily="18" charset="0"/>
-                <a:ea typeface="Times New Roman" panose="02020603050405020304" pitchFamily="18" charset="0"/>
-                <a:cs typeface="Times New Roman" panose="02020603050405020304" pitchFamily="18" charset="0"/>
-              </a:rPr>
+            <a:endParaRPr lang="en-IN" sz="1050" dirty="0"/>
+          </a:p>
+          <a:p>
+            <a:r>
+              <a:rPr lang="en-IN" sz="1050" dirty="0"/>
               <a:t>from </a:t>
             </a:r>
             <a:r>
-              <a:rPr lang="en-IN" sz="1050" dirty="0" err="1">
-                <a:latin typeface="Times New Roman" panose="02020603050405020304" pitchFamily="18" charset="0"/>
-                <a:ea typeface="Times New Roman" panose="02020603050405020304" pitchFamily="18" charset="0"/>
-                <a:cs typeface="Times New Roman" panose="02020603050405020304" pitchFamily="18" charset="0"/>
-              </a:rPr>
-              <a:t>sklearn.preprocessing</a:t>
-            </a:r>
-            <a:r>
-              <a:rPr lang="en-IN" sz="1050" dirty="0">
-                <a:latin typeface="Times New Roman" panose="02020603050405020304" pitchFamily="18" charset="0"/>
-                <a:ea typeface="Times New Roman" panose="02020603050405020304" pitchFamily="18" charset="0"/>
-                <a:cs typeface="Times New Roman" panose="02020603050405020304" pitchFamily="18" charset="0"/>
-              </a:rPr>
+              <a:rPr lang="en-IN" sz="1050" dirty="0" err="1"/>
+              <a:t>sklearn.metrics</a:t>
+            </a:r>
+            <a:r>
+              <a:rPr lang="en-IN" sz="1050" dirty="0"/>
               <a:t> import </a:t>
             </a:r>
             <a:r>
-              <a:rPr lang="en-IN" sz="1050" dirty="0" err="1">
-                <a:latin typeface="Times New Roman" panose="02020603050405020304" pitchFamily="18" charset="0"/>
-                <a:ea typeface="Times New Roman" panose="02020603050405020304" pitchFamily="18" charset="0"/>
-                <a:cs typeface="Times New Roman" panose="02020603050405020304" pitchFamily="18" charset="0"/>
-              </a:rPr>
-              <a:t>OneHotEncoder</a:t>
-            </a:r>
-            <a:endParaRPr lang="en-IN" sz="1050" dirty="0">
-              <a:effectLst/>
-              <a:latin typeface="Cambria" panose="02040503050406030204" pitchFamily="18" charset="0"/>
-              <a:ea typeface="MS Mincho" panose="02020609040205080304" pitchFamily="49" charset="-128"/>
-              <a:cs typeface="Times New Roman" panose="02020603050405020304" pitchFamily="18" charset="0"/>
-            </a:endParaRPr>
-          </a:p>
-          <a:p>
-            <a:pPr>
-              <a:lnSpc>
-                <a:spcPts val="1425"/>
-              </a:lnSpc>
-              <a:spcAft>
-                <a:spcPts val="0"/>
-              </a:spcAft>
-            </a:pPr>
-            <a:r>
-              <a:rPr lang="en-IN" sz="1050" dirty="0">
-                <a:latin typeface="Times New Roman" panose="02020603050405020304" pitchFamily="18" charset="0"/>
-                <a:ea typeface="Times New Roman" panose="02020603050405020304" pitchFamily="18" charset="0"/>
-                <a:cs typeface="Times New Roman" panose="02020603050405020304" pitchFamily="18" charset="0"/>
-              </a:rPr>
-              <a:t>from </a:t>
-            </a:r>
-            <a:r>
-              <a:rPr lang="en-IN" sz="1050" dirty="0" err="1">
-                <a:latin typeface="Times New Roman" panose="02020603050405020304" pitchFamily="18" charset="0"/>
-                <a:ea typeface="Times New Roman" panose="02020603050405020304" pitchFamily="18" charset="0"/>
-                <a:cs typeface="Times New Roman" panose="02020603050405020304" pitchFamily="18" charset="0"/>
-              </a:rPr>
-              <a:t>sklearn.metrics</a:t>
-            </a:r>
-            <a:r>
-              <a:rPr lang="en-IN" sz="1050" dirty="0">
-                <a:latin typeface="Times New Roman" panose="02020603050405020304" pitchFamily="18" charset="0"/>
-                <a:ea typeface="Times New Roman" panose="02020603050405020304" pitchFamily="18" charset="0"/>
-                <a:cs typeface="Times New Roman" panose="02020603050405020304" pitchFamily="18" charset="0"/>
-              </a:rPr>
-              <a:t> import </a:t>
-            </a:r>
-            <a:r>
-              <a:rPr lang="en-IN" sz="1050" dirty="0" err="1">
-                <a:latin typeface="Times New Roman" panose="02020603050405020304" pitchFamily="18" charset="0"/>
-                <a:ea typeface="Times New Roman" panose="02020603050405020304" pitchFamily="18" charset="0"/>
-                <a:cs typeface="Times New Roman" panose="02020603050405020304" pitchFamily="18" charset="0"/>
-              </a:rPr>
+              <a:rPr lang="en-IN" sz="1050" dirty="0" err="1"/>
               <a:t>mean_absolute_error</a:t>
             </a:r>
             <a:r>
-              <a:rPr lang="en-IN" sz="1050" dirty="0">
-                <a:latin typeface="Times New Roman" panose="02020603050405020304" pitchFamily="18" charset="0"/>
-                <a:ea typeface="Times New Roman" panose="02020603050405020304" pitchFamily="18" charset="0"/>
-                <a:cs typeface="Times New Roman" panose="02020603050405020304" pitchFamily="18" charset="0"/>
-              </a:rPr>
+              <a:rPr lang="en-IN" sz="1050" dirty="0"/>
               <a:t>, r2_score</a:t>
             </a:r>
-            <a:endParaRPr lang="en-IN" sz="1050" dirty="0">
-              <a:effectLst/>
-              <a:latin typeface="Cambria" panose="02040503050406030204" pitchFamily="18" charset="0"/>
-              <a:ea typeface="MS Mincho" panose="02020609040205080304" pitchFamily="49" charset="-128"/>
-              <a:cs typeface="Times New Roman" panose="02020603050405020304" pitchFamily="18" charset="0"/>
-            </a:endParaRPr>
-          </a:p>
-          <a:p>
-            <a:pPr>
-              <a:lnSpc>
-                <a:spcPts val="1425"/>
-              </a:lnSpc>
-              <a:spcAft>
-                <a:spcPts val="0"/>
-              </a:spcAft>
-            </a:pPr>
-            <a:r>
-              <a:rPr lang="en-IN" sz="1050" dirty="0">
-                <a:latin typeface="Times New Roman" panose="02020603050405020304" pitchFamily="18" charset="0"/>
-                <a:ea typeface="Times New Roman" panose="02020603050405020304" pitchFamily="18" charset="0"/>
-                <a:cs typeface="Times New Roman" panose="02020603050405020304" pitchFamily="18" charset="0"/>
-              </a:rPr>
-              <a:t>import </a:t>
-            </a:r>
-            <a:r>
-              <a:rPr lang="en-IN" sz="1050" dirty="0" err="1">
-                <a:latin typeface="Times New Roman" panose="02020603050405020304" pitchFamily="18" charset="0"/>
-                <a:ea typeface="Times New Roman" panose="02020603050405020304" pitchFamily="18" charset="0"/>
-                <a:cs typeface="Times New Roman" panose="02020603050405020304" pitchFamily="18" charset="0"/>
-              </a:rPr>
-              <a:t>joblib</a:t>
-            </a:r>
-            <a:endParaRPr lang="en-IN" sz="1050" dirty="0">
-              <a:effectLst/>
-              <a:latin typeface="Cambria" panose="02040503050406030204" pitchFamily="18" charset="0"/>
-              <a:ea typeface="MS Mincho" panose="02020609040205080304" pitchFamily="49" charset="-128"/>
-              <a:cs typeface="Times New Roman" panose="02020603050405020304" pitchFamily="18" charset="0"/>
-            </a:endParaRPr>
-          </a:p>
-          <a:p>
-            <a:pPr>
-              <a:lnSpc>
-                <a:spcPts val="1425"/>
-              </a:lnSpc>
-              <a:spcAft>
-                <a:spcPts val="0"/>
-              </a:spcAft>
-            </a:pPr>
-            <a:r>
-              <a:rPr lang="en-IN" sz="1050" dirty="0">
-                <a:latin typeface="Times New Roman" panose="02020603050405020304" pitchFamily="18" charset="0"/>
-                <a:ea typeface="Times New Roman" panose="02020603050405020304" pitchFamily="18" charset="0"/>
-                <a:cs typeface="Times New Roman" panose="02020603050405020304" pitchFamily="18" charset="0"/>
-              </a:rPr>
-              <a:t> </a:t>
-            </a:r>
-            <a:endParaRPr lang="en-IN" sz="1050" dirty="0">
-              <a:effectLst/>
-              <a:latin typeface="Cambria" panose="02040503050406030204" pitchFamily="18" charset="0"/>
-              <a:ea typeface="MS Mincho" panose="02020609040205080304" pitchFamily="49" charset="-128"/>
-              <a:cs typeface="Times New Roman" panose="02020603050405020304" pitchFamily="18" charset="0"/>
-            </a:endParaRPr>
-          </a:p>
-          <a:p>
-            <a:pPr>
-              <a:lnSpc>
-                <a:spcPts val="1425"/>
-              </a:lnSpc>
-              <a:spcAft>
-                <a:spcPts val="0"/>
-              </a:spcAft>
-            </a:pPr>
-            <a:r>
-              <a:rPr lang="en-IN" sz="1050" dirty="0">
-                <a:latin typeface="Times New Roman" panose="02020603050405020304" pitchFamily="18" charset="0"/>
-                <a:ea typeface="Times New Roman" panose="02020603050405020304" pitchFamily="18" charset="0"/>
-                <a:cs typeface="Times New Roman" panose="02020603050405020304" pitchFamily="18" charset="0"/>
-              </a:rPr>
+          </a:p>
+          <a:p>
+            <a:br>
+              <a:rPr lang="en-IN" sz="1050" dirty="0"/>
+            </a:br>
+            <a:r>
+              <a:rPr lang="en-IN" sz="1050" dirty="0"/>
               <a:t>print("Fuel Efficiency Model Training Started...")</a:t>
             </a:r>
-            <a:endParaRPr lang="en-IN" sz="1050" dirty="0">
-              <a:effectLst/>
-              <a:latin typeface="Cambria" panose="02040503050406030204" pitchFamily="18" charset="0"/>
-              <a:ea typeface="MS Mincho" panose="02020609040205080304" pitchFamily="49" charset="-128"/>
-              <a:cs typeface="Times New Roman" panose="02020603050405020304" pitchFamily="18" charset="0"/>
-            </a:endParaRPr>
-          </a:p>
-          <a:p>
-            <a:pPr>
-              <a:lnSpc>
-                <a:spcPts val="1425"/>
-              </a:lnSpc>
-              <a:spcAft>
-                <a:spcPts val="0"/>
-              </a:spcAft>
-            </a:pPr>
-            <a:r>
-              <a:rPr lang="en-IN" sz="1050" dirty="0">
-                <a:latin typeface="Times New Roman" panose="02020603050405020304" pitchFamily="18" charset="0"/>
-                <a:ea typeface="Times New Roman" panose="02020603050405020304" pitchFamily="18" charset="0"/>
-                <a:cs typeface="Times New Roman" panose="02020603050405020304" pitchFamily="18" charset="0"/>
-              </a:rPr>
-              <a:t>DATA_PATH = "data/cleaned/master_analytics.csv"</a:t>
-            </a:r>
-            <a:endParaRPr lang="en-IN" sz="1050" dirty="0">
-              <a:effectLst/>
-              <a:latin typeface="Cambria" panose="02040503050406030204" pitchFamily="18" charset="0"/>
-              <a:ea typeface="MS Mincho" panose="02020609040205080304" pitchFamily="49" charset="-128"/>
-              <a:cs typeface="Times New Roman" panose="02020603050405020304" pitchFamily="18" charset="0"/>
-            </a:endParaRPr>
-          </a:p>
-          <a:p>
-            <a:pPr>
-              <a:lnSpc>
-                <a:spcPts val="1425"/>
-              </a:lnSpc>
-              <a:spcAft>
-                <a:spcPts val="0"/>
-              </a:spcAft>
-            </a:pPr>
-            <a:r>
-              <a:rPr lang="en-IN" sz="1050" dirty="0">
-                <a:latin typeface="Times New Roman" panose="02020603050405020304" pitchFamily="18" charset="0"/>
-                <a:ea typeface="Times New Roman" panose="02020603050405020304" pitchFamily="18" charset="0"/>
-                <a:cs typeface="Times New Roman" panose="02020603050405020304" pitchFamily="18" charset="0"/>
-              </a:rPr>
-              <a:t>SAVE_DIR = "D:/models"  </a:t>
-            </a:r>
-            <a:r>
-              <a:rPr lang="en-IN" sz="1050" dirty="0" err="1">
-                <a:latin typeface="Times New Roman" panose="02020603050405020304" pitchFamily="18" charset="0"/>
-                <a:ea typeface="Times New Roman" panose="02020603050405020304" pitchFamily="18" charset="0"/>
-                <a:cs typeface="Times New Roman" panose="02020603050405020304" pitchFamily="18" charset="0"/>
-              </a:rPr>
+          </a:p>
+          <a:p>
+            <a:br>
+              <a:rPr lang="en-IN" sz="1050" dirty="0"/>
+            </a:br>
+            <a:br>
+              <a:rPr lang="en-IN" sz="1050" dirty="0"/>
+            </a:br>
+            <a:r>
+              <a:rPr lang="en-IN" sz="1050" dirty="0"/>
+              <a:t>DATA_PATH = </a:t>
+            </a:r>
+            <a:r>
+              <a:rPr lang="en-IN" sz="1050" dirty="0" err="1"/>
+              <a:t>os.path.join</a:t>
+            </a:r>
+            <a:r>
+              <a:rPr lang="en-IN" sz="1050" dirty="0"/>
+              <a:t>("data", "cleaned", "master_analytics.csv")</a:t>
+            </a:r>
+          </a:p>
+          <a:p>
+            <a:r>
+              <a:rPr lang="en-IN" sz="1050" dirty="0"/>
+              <a:t>MODEL_DIR = "models"</a:t>
+            </a:r>
+          </a:p>
+          <a:p>
+            <a:r>
+              <a:rPr lang="en-IN" sz="1050" dirty="0"/>
+              <a:t>MODEL_PATH = </a:t>
+            </a:r>
+            <a:r>
+              <a:rPr lang="en-IN" sz="1050" dirty="0" err="1"/>
+              <a:t>os.path.join</a:t>
+            </a:r>
+            <a:r>
+              <a:rPr lang="en-IN" sz="1050" dirty="0"/>
+              <a:t>(MODEL_DIR, "</a:t>
+            </a:r>
+            <a:r>
+              <a:rPr lang="en-IN" sz="1050" dirty="0" err="1"/>
+              <a:t>fuel_efficiency_model.pkl</a:t>
+            </a:r>
+            <a:r>
+              <a:rPr lang="en-IN" sz="1050" dirty="0"/>
+              <a:t>")</a:t>
+            </a:r>
+          </a:p>
+          <a:p>
+            <a:br>
+              <a:rPr lang="en-IN" sz="1050" dirty="0"/>
+            </a:br>
+            <a:br>
+              <a:rPr lang="en-IN" sz="1050" dirty="0"/>
+            </a:br>
+            <a:r>
+              <a:rPr lang="en-IN" sz="1050" dirty="0"/>
+              <a:t>if not </a:t>
+            </a:r>
+            <a:r>
+              <a:rPr lang="en-IN" sz="1050" dirty="0" err="1"/>
+              <a:t>os.path.exists</a:t>
+            </a:r>
+            <a:r>
+              <a:rPr lang="en-IN" sz="1050" dirty="0"/>
+              <a:t>(DATA_PATH):</a:t>
+            </a:r>
+          </a:p>
+          <a:p>
+            <a:r>
+              <a:rPr lang="en-IN" sz="1050" dirty="0"/>
+              <a:t>    raise </a:t>
+            </a:r>
+            <a:r>
+              <a:rPr lang="en-IN" sz="1050" dirty="0" err="1"/>
+              <a:t>FileNotFoundError</a:t>
+            </a:r>
+            <a:r>
+              <a:rPr lang="en-IN" sz="1050" dirty="0"/>
+              <a:t>("master_analytics.csv not found")</a:t>
+            </a:r>
+          </a:p>
+          <a:p>
+            <a:br>
+              <a:rPr lang="en-IN" sz="1050" dirty="0"/>
+            </a:br>
+            <a:r>
+              <a:rPr lang="en-IN" sz="1050" dirty="0"/>
+              <a:t>df = </a:t>
+            </a:r>
+            <a:r>
+              <a:rPr lang="en-IN" sz="1050" dirty="0" err="1"/>
+              <a:t>pd.read_csv</a:t>
+            </a:r>
+            <a:r>
+              <a:rPr lang="en-IN" sz="1050" dirty="0"/>
+              <a:t>(DATA_PATH)</a:t>
+            </a:r>
+          </a:p>
+          <a:p>
+            <a:br>
+              <a:rPr lang="en-IN" sz="1050" dirty="0"/>
+            </a:br>
+            <a:br>
+              <a:rPr lang="en-IN" sz="1050" dirty="0"/>
+            </a:br>
+            <a:r>
+              <a:rPr lang="en-IN" sz="1050" dirty="0"/>
+              <a:t>FEATURES = [</a:t>
+            </a:r>
+          </a:p>
+          <a:p>
+            <a:r>
+              <a:rPr lang="en-IN" sz="1050" dirty="0"/>
+              <a:t>    "</a:t>
+            </a:r>
+            <a:r>
+              <a:rPr lang="en-IN" sz="1050" dirty="0" err="1"/>
+              <a:t>Distance_km</a:t>
+            </a:r>
+            <a:r>
+              <a:rPr lang="en-IN" sz="1050" dirty="0"/>
+              <a:t>",</a:t>
+            </a:r>
+          </a:p>
+          <a:p>
+            <a:r>
+              <a:rPr lang="en-IN" sz="1050" dirty="0"/>
+              <a:t>    "</a:t>
+            </a:r>
+            <a:r>
+              <a:rPr lang="en-IN" sz="1050" dirty="0" err="1"/>
+              <a:t>Fuel_Consumed_L</a:t>
+            </a:r>
+            <a:r>
+              <a:rPr lang="en-IN" sz="1050" dirty="0"/>
+              <a:t>",</a:t>
+            </a:r>
+          </a:p>
+          <a:p>
+            <a:r>
+              <a:rPr lang="en-IN" sz="1050" dirty="0"/>
+              <a:t>    "</a:t>
+            </a:r>
+            <a:r>
+              <a:rPr lang="en-IN" sz="1050" dirty="0" err="1"/>
+              <a:t>Delay_Minutes</a:t>
+            </a:r>
+            <a:r>
+              <a:rPr lang="en-IN" sz="1050" dirty="0"/>
+              <a:t>"</a:t>
+            </a:r>
+          </a:p>
+          <a:p>
+            <a:r>
+              <a:rPr lang="en-IN" sz="1050" dirty="0"/>
+              <a:t>]</a:t>
+            </a:r>
+          </a:p>
+          <a:p>
+            <a:br>
+              <a:rPr lang="en-IN" sz="1050" dirty="0"/>
+            </a:br>
+            <a:r>
+              <a:rPr lang="en-IN" sz="1050" dirty="0"/>
+              <a:t>TARGET = "</a:t>
+            </a:r>
+            <a:r>
+              <a:rPr lang="en-IN" sz="1050" dirty="0" err="1"/>
+              <a:t>Fuel_Efficiency_km_per_L</a:t>
+            </a:r>
+            <a:r>
+              <a:rPr lang="en-IN" sz="1050" dirty="0"/>
+              <a:t>"</a:t>
+            </a:r>
+          </a:p>
+          <a:p>
+            <a:br>
+              <a:rPr lang="en-IN" sz="1050" dirty="0"/>
+            </a:br>
+            <a:br>
+              <a:rPr lang="en-IN" sz="1050" dirty="0"/>
+            </a:br>
+            <a:r>
+              <a:rPr lang="en-IN" sz="1050" dirty="0"/>
+              <a:t>for col in FEATURES + [TARGET]:</a:t>
+            </a:r>
+          </a:p>
+          <a:p>
+            <a:r>
+              <a:rPr lang="en-IN" sz="1050" dirty="0"/>
+              <a:t>    if col not in </a:t>
+            </a:r>
+            <a:r>
+              <a:rPr lang="en-IN" sz="1050" dirty="0" err="1"/>
+              <a:t>df.columns</a:t>
+            </a:r>
+            <a:r>
+              <a:rPr lang="en-IN" sz="1050" dirty="0"/>
+              <a:t>:</a:t>
+            </a:r>
+          </a:p>
+          <a:p>
+            <a:r>
+              <a:rPr lang="en-IN" sz="1050" dirty="0"/>
+              <a:t>        raise </a:t>
+            </a:r>
+            <a:r>
+              <a:rPr lang="en-IN" sz="1050" dirty="0" err="1"/>
+              <a:t>ValueError</a:t>
+            </a:r>
+            <a:r>
+              <a:rPr lang="en-IN" sz="1050" dirty="0"/>
+              <a:t>(</a:t>
+            </a:r>
+            <a:r>
+              <a:rPr lang="en-IN" sz="1050" dirty="0" err="1"/>
+              <a:t>f"Missing</a:t>
+            </a:r>
+            <a:r>
+              <a:rPr lang="en-IN" sz="1050" dirty="0"/>
+              <a:t> column in dataset: {col}")</a:t>
+            </a:r>
+          </a:p>
+          <a:p>
+            <a:br>
+              <a:rPr lang="en-IN" sz="1050" dirty="0"/>
+            </a:br>
+            <a:r>
+              <a:rPr lang="en-IN" sz="1050" dirty="0"/>
+              <a:t>X = df[FEATURES]</a:t>
+            </a:r>
+          </a:p>
+          <a:p>
+            <a:r>
+              <a:rPr lang="en-IN" sz="1050" dirty="0"/>
+              <a:t>y = df[TARGET]</a:t>
+            </a:r>
+          </a:p>
+          <a:p>
+            <a:br>
+              <a:rPr lang="en-IN" sz="1050" dirty="0"/>
+            </a:br>
+            <a:r>
+              <a:rPr lang="en-IN" sz="1050" dirty="0"/>
+              <a:t>print(</a:t>
+            </a:r>
+            <a:r>
+              <a:rPr lang="en-IN" sz="1050" dirty="0" err="1"/>
+              <a:t>f"Features</a:t>
+            </a:r>
+            <a:r>
+              <a:rPr lang="en-IN" sz="1050" dirty="0"/>
+              <a:t> used: {</a:t>
+            </a:r>
+            <a:r>
+              <a:rPr lang="en-IN" sz="1050" dirty="0" err="1"/>
+              <a:t>len</a:t>
+            </a:r>
+            <a:r>
+              <a:rPr lang="en-IN" sz="1050" dirty="0"/>
+              <a:t>(FEATURES)}, Rows: {</a:t>
+            </a:r>
+            <a:r>
+              <a:rPr lang="en-IN" sz="1050" dirty="0" err="1"/>
+              <a:t>len</a:t>
+            </a:r>
+            <a:r>
+              <a:rPr lang="en-IN" sz="1050" dirty="0"/>
+              <a:t>(df)}")</a:t>
+            </a:r>
+          </a:p>
+          <a:p>
+            <a:br>
+              <a:rPr lang="en-IN" sz="1050" dirty="0"/>
+            </a:br>
+            <a:br>
+              <a:rPr lang="en-IN" sz="1050" dirty="0"/>
+            </a:br>
+            <a:r>
+              <a:rPr lang="en-IN" sz="1050" dirty="0" err="1"/>
+              <a:t>X_train</a:t>
+            </a:r>
+            <a:r>
+              <a:rPr lang="en-IN" sz="1050" dirty="0"/>
+              <a:t>, </a:t>
+            </a:r>
+            <a:r>
+              <a:rPr lang="en-IN" sz="1050" dirty="0" err="1"/>
+              <a:t>X_test</a:t>
+            </a:r>
+            <a:r>
+              <a:rPr lang="en-IN" sz="1050" dirty="0"/>
+              <a:t>, </a:t>
+            </a:r>
+            <a:r>
+              <a:rPr lang="en-IN" sz="1050" dirty="0" err="1"/>
+              <a:t>y_train</a:t>
+            </a:r>
+            <a:r>
+              <a:rPr lang="en-IN" sz="1050" dirty="0"/>
+              <a:t>, </a:t>
+            </a:r>
+            <a:r>
+              <a:rPr lang="en-IN" sz="1050" dirty="0" err="1"/>
+              <a:t>y_test</a:t>
+            </a:r>
+            <a:r>
+              <a:rPr lang="en-IN" sz="1050" dirty="0"/>
+              <a:t> = </a:t>
+            </a:r>
+            <a:r>
+              <a:rPr lang="en-IN" sz="1050" dirty="0" err="1"/>
+              <a:t>train_test_split</a:t>
+            </a:r>
+            <a:r>
+              <a:rPr lang="en-IN" sz="1050" dirty="0"/>
+              <a:t>(</a:t>
+            </a:r>
+          </a:p>
+          <a:p>
+            <a:r>
+              <a:rPr lang="en-IN" sz="1050" dirty="0"/>
+              <a:t>    X, y, </a:t>
+            </a:r>
+            <a:r>
+              <a:rPr lang="en-IN" sz="1050" dirty="0" err="1"/>
+              <a:t>test_size</a:t>
+            </a:r>
+            <a:r>
+              <a:rPr lang="en-IN" sz="1050" dirty="0"/>
+              <a:t>=0.2, </a:t>
+            </a:r>
+            <a:r>
+              <a:rPr lang="en-IN" sz="1050" dirty="0" err="1"/>
+              <a:t>random_state</a:t>
+            </a:r>
+            <a:r>
+              <a:rPr lang="en-IN" sz="1050" dirty="0"/>
+              <a:t>=42</a:t>
+            </a:r>
+          </a:p>
+          <a:p>
+            <a:r>
+              <a:rPr lang="en-IN" sz="1050" dirty="0"/>
+              <a:t>)</a:t>
+            </a:r>
+          </a:p>
+          <a:p>
+            <a:br>
+              <a:rPr lang="en-IN" sz="1050" dirty="0"/>
+            </a:br>
+            <a:br>
+              <a:rPr lang="en-IN" sz="1050" dirty="0"/>
+            </a:br>
+            <a:r>
+              <a:rPr lang="en-IN" sz="1050" dirty="0"/>
+              <a:t>model = </a:t>
+            </a:r>
+            <a:r>
+              <a:rPr lang="en-IN" sz="1050" dirty="0" err="1"/>
+              <a:t>RandomForestRegressor</a:t>
+            </a:r>
+            <a:r>
+              <a:rPr lang="en-IN" sz="1050" dirty="0"/>
+              <a:t>(</a:t>
+            </a:r>
+          </a:p>
+          <a:p>
+            <a:r>
+              <a:rPr lang="en-IN" sz="1050" dirty="0"/>
+              <a:t>    </a:t>
+            </a:r>
+            <a:r>
+              <a:rPr lang="en-IN" sz="1050" dirty="0" err="1"/>
+              <a:t>n_estimators</a:t>
+            </a:r>
+            <a:r>
+              <a:rPr lang="en-IN" sz="1050" dirty="0"/>
+              <a:t>=100,</a:t>
+            </a:r>
+          </a:p>
+          <a:p>
+            <a:r>
+              <a:rPr lang="en-IN" sz="1050" dirty="0"/>
+              <a:t>    </a:t>
+            </a:r>
+            <a:r>
+              <a:rPr lang="en-IN" sz="1050" dirty="0" err="1"/>
+              <a:t>random_state</a:t>
+            </a:r>
+            <a:r>
+              <a:rPr lang="en-IN" sz="1050" dirty="0"/>
+              <a:t>=42</a:t>
+            </a:r>
+          </a:p>
+          <a:p>
+            <a:r>
+              <a:rPr lang="en-IN" sz="1050" dirty="0"/>
+              <a:t>)</a:t>
+            </a:r>
+          </a:p>
+          <a:p>
+            <a:br>
+              <a:rPr lang="en-IN" sz="1050" dirty="0"/>
+            </a:br>
+            <a:r>
+              <a:rPr lang="en-IN" sz="1050" dirty="0" err="1"/>
+              <a:t>model.fit</a:t>
+            </a:r>
+            <a:r>
+              <a:rPr lang="en-IN" sz="1050" dirty="0"/>
+              <a:t>(</a:t>
+            </a:r>
+            <a:r>
+              <a:rPr lang="en-IN" sz="1050" dirty="0" err="1"/>
+              <a:t>X_train</a:t>
+            </a:r>
+            <a:r>
+              <a:rPr lang="en-IN" sz="1050" dirty="0"/>
+              <a:t>, </a:t>
+            </a:r>
+            <a:r>
+              <a:rPr lang="en-IN" sz="1050" dirty="0" err="1"/>
+              <a:t>y_train</a:t>
+            </a:r>
+            <a:r>
+              <a:rPr lang="en-IN" sz="1050" dirty="0"/>
+              <a:t>)</a:t>
+            </a:r>
+          </a:p>
+          <a:p>
+            <a:br>
+              <a:rPr lang="en-IN" sz="1050" dirty="0"/>
+            </a:br>
+            <a:br>
+              <a:rPr lang="en-IN" sz="1050" dirty="0"/>
+            </a:br>
+            <a:r>
+              <a:rPr lang="en-IN" sz="1050" dirty="0" err="1"/>
+              <a:t>y_pred</a:t>
+            </a:r>
+            <a:r>
+              <a:rPr lang="en-IN" sz="1050" dirty="0"/>
+              <a:t> = </a:t>
+            </a:r>
+            <a:r>
+              <a:rPr lang="en-IN" sz="1050" dirty="0" err="1"/>
+              <a:t>model.predict</a:t>
+            </a:r>
+            <a:r>
+              <a:rPr lang="en-IN" sz="1050" dirty="0"/>
+              <a:t>(</a:t>
+            </a:r>
+            <a:r>
+              <a:rPr lang="en-IN" sz="1050" dirty="0" err="1"/>
+              <a:t>X_test</a:t>
+            </a:r>
+            <a:r>
+              <a:rPr lang="en-IN" sz="1050" dirty="0"/>
+              <a:t>)</a:t>
+            </a:r>
+          </a:p>
+          <a:p>
+            <a:br>
+              <a:rPr lang="en-IN" sz="1050" dirty="0"/>
+            </a:br>
+            <a:r>
+              <a:rPr lang="en-IN" sz="1050" dirty="0" err="1"/>
+              <a:t>mae</a:t>
+            </a:r>
+            <a:r>
+              <a:rPr lang="en-IN" sz="1050" dirty="0"/>
+              <a:t> = </a:t>
+            </a:r>
+            <a:r>
+              <a:rPr lang="en-IN" sz="1050" dirty="0" err="1"/>
+              <a:t>mean_absolute_error</a:t>
+            </a:r>
+            <a:r>
+              <a:rPr lang="en-IN" sz="1050" dirty="0"/>
+              <a:t>(</a:t>
+            </a:r>
+            <a:r>
+              <a:rPr lang="en-IN" sz="1050" dirty="0" err="1"/>
+              <a:t>y_test</a:t>
+            </a:r>
+            <a:r>
+              <a:rPr lang="en-IN" sz="1050" dirty="0"/>
+              <a:t>, </a:t>
+            </a:r>
+            <a:r>
+              <a:rPr lang="en-IN" sz="1050" dirty="0" err="1"/>
+              <a:t>y_pred</a:t>
+            </a:r>
+            <a:r>
+              <a:rPr lang="en-IN" sz="1050" dirty="0"/>
+              <a:t>)</a:t>
+            </a:r>
+          </a:p>
+          <a:p>
+            <a:r>
+              <a:rPr lang="en-IN" sz="1050" dirty="0"/>
+              <a:t>r2 = r2_score(</a:t>
+            </a:r>
+            <a:r>
+              <a:rPr lang="en-IN" sz="1050" dirty="0" err="1"/>
+              <a:t>y_test</a:t>
+            </a:r>
+            <a:r>
+              <a:rPr lang="en-IN" sz="1050" dirty="0"/>
+              <a:t>, </a:t>
+            </a:r>
+            <a:r>
+              <a:rPr lang="en-IN" sz="1050" dirty="0" err="1"/>
+              <a:t>y_pred</a:t>
+            </a:r>
+            <a:r>
+              <a:rPr lang="en-IN" sz="1050" dirty="0"/>
+              <a:t>)</a:t>
+            </a:r>
+          </a:p>
+          <a:p>
+            <a:br>
+              <a:rPr lang="en-IN" sz="1050" dirty="0"/>
+            </a:br>
+            <a:r>
+              <a:rPr lang="en-IN" sz="1050" dirty="0"/>
+              <a:t>print("Model Trained Successfully!")</a:t>
+            </a:r>
+          </a:p>
+          <a:p>
+            <a:r>
+              <a:rPr lang="en-IN" sz="1050" dirty="0"/>
+              <a:t>print(</a:t>
+            </a:r>
+            <a:r>
+              <a:rPr lang="en-IN" sz="1050" dirty="0" err="1"/>
+              <a:t>f"MAE</a:t>
+            </a:r>
+            <a:r>
+              <a:rPr lang="en-IN" sz="1050" dirty="0"/>
+              <a:t>: {mae:.4f}")</a:t>
+            </a:r>
+          </a:p>
+          <a:p>
+            <a:r>
+              <a:rPr lang="en-IN" sz="1050" dirty="0"/>
+              <a:t>print(f"R² Score: {r2:.4f}")</a:t>
+            </a:r>
+          </a:p>
+          <a:p>
+            <a:br>
+              <a:rPr lang="en-IN" sz="1050" dirty="0"/>
+            </a:br>
+            <a:br>
+              <a:rPr lang="en-IN" sz="1050" dirty="0"/>
+            </a:br>
+            <a:r>
+              <a:rPr lang="en-IN" sz="1050" dirty="0" err="1"/>
               <a:t>os.makedirs</a:t>
             </a:r>
             <a:r>
-              <a:rPr lang="en-IN" sz="1050" dirty="0">
-                <a:latin typeface="Times New Roman" panose="02020603050405020304" pitchFamily="18" charset="0"/>
-                <a:ea typeface="Times New Roman" panose="02020603050405020304" pitchFamily="18" charset="0"/>
-                <a:cs typeface="Times New Roman" panose="02020603050405020304" pitchFamily="18" charset="0"/>
-              </a:rPr>
-              <a:t>(SAVE_DIR, </a:t>
-            </a:r>
-            <a:r>
-              <a:rPr lang="en-IN" sz="1050" dirty="0" err="1">
-                <a:latin typeface="Times New Roman" panose="02020603050405020304" pitchFamily="18" charset="0"/>
-                <a:ea typeface="Times New Roman" panose="02020603050405020304" pitchFamily="18" charset="0"/>
-                <a:cs typeface="Times New Roman" panose="02020603050405020304" pitchFamily="18" charset="0"/>
-              </a:rPr>
+              <a:rPr lang="en-IN" sz="1050" dirty="0"/>
+              <a:t>(MODEL_DIR, </a:t>
+            </a:r>
+            <a:r>
+              <a:rPr lang="en-IN" sz="1050" dirty="0" err="1"/>
               <a:t>exist_ok</a:t>
             </a:r>
             <a:r>
-              <a:rPr lang="en-IN" sz="1050" dirty="0">
-                <a:latin typeface="Times New Roman" panose="02020603050405020304" pitchFamily="18" charset="0"/>
-                <a:ea typeface="Times New Roman" panose="02020603050405020304" pitchFamily="18" charset="0"/>
-                <a:cs typeface="Times New Roman" panose="02020603050405020304" pitchFamily="18" charset="0"/>
-              </a:rPr>
+              <a:rPr lang="en-IN" sz="1050" dirty="0"/>
               <a:t>=True)</a:t>
             </a:r>
-            <a:endParaRPr lang="en-IN" sz="1050" dirty="0">
-              <a:effectLst/>
-              <a:latin typeface="Cambria" panose="02040503050406030204" pitchFamily="18" charset="0"/>
-              <a:ea typeface="MS Mincho" panose="02020609040205080304" pitchFamily="49" charset="-128"/>
-              <a:cs typeface="Times New Roman" panose="02020603050405020304" pitchFamily="18" charset="0"/>
-            </a:endParaRPr>
-          </a:p>
-          <a:p>
-            <a:pPr>
-              <a:lnSpc>
-                <a:spcPts val="1425"/>
-              </a:lnSpc>
-              <a:spcAft>
-                <a:spcPts val="0"/>
-              </a:spcAft>
-            </a:pPr>
-            <a:r>
-              <a:rPr lang="en-IN" sz="1050" dirty="0">
-                <a:latin typeface="Times New Roman" panose="02020603050405020304" pitchFamily="18" charset="0"/>
-                <a:ea typeface="Times New Roman" panose="02020603050405020304" pitchFamily="18" charset="0"/>
-                <a:cs typeface="Times New Roman" panose="02020603050405020304" pitchFamily="18" charset="0"/>
-              </a:rPr>
-              <a:t>MODEL_PATH = </a:t>
-            </a:r>
-            <a:r>
-              <a:rPr lang="en-IN" sz="1050" dirty="0" err="1">
-                <a:latin typeface="Times New Roman" panose="02020603050405020304" pitchFamily="18" charset="0"/>
-                <a:ea typeface="Times New Roman" panose="02020603050405020304" pitchFamily="18" charset="0"/>
-                <a:cs typeface="Times New Roman" panose="02020603050405020304" pitchFamily="18" charset="0"/>
-              </a:rPr>
-              <a:t>os.path.join</a:t>
-            </a:r>
-            <a:r>
-              <a:rPr lang="en-IN" sz="1050" dirty="0">
-                <a:latin typeface="Times New Roman" panose="02020603050405020304" pitchFamily="18" charset="0"/>
-                <a:ea typeface="Times New Roman" panose="02020603050405020304" pitchFamily="18" charset="0"/>
-                <a:cs typeface="Times New Roman" panose="02020603050405020304" pitchFamily="18" charset="0"/>
-              </a:rPr>
-              <a:t>(SAVE_DIR, "</a:t>
-            </a:r>
-            <a:r>
-              <a:rPr lang="en-IN" sz="1050" dirty="0" err="1">
-                <a:latin typeface="Times New Roman" panose="02020603050405020304" pitchFamily="18" charset="0"/>
-                <a:ea typeface="Times New Roman" panose="02020603050405020304" pitchFamily="18" charset="0"/>
-                <a:cs typeface="Times New Roman" panose="02020603050405020304" pitchFamily="18" charset="0"/>
-              </a:rPr>
-              <a:t>fuel_efficiency_model.pkl</a:t>
-            </a:r>
-            <a:r>
-              <a:rPr lang="en-IN" sz="1050" dirty="0">
-                <a:latin typeface="Times New Roman" panose="02020603050405020304" pitchFamily="18" charset="0"/>
-                <a:ea typeface="Times New Roman" panose="02020603050405020304" pitchFamily="18" charset="0"/>
-                <a:cs typeface="Times New Roman" panose="02020603050405020304" pitchFamily="18" charset="0"/>
-              </a:rPr>
-              <a:t>")</a:t>
-            </a:r>
-            <a:endParaRPr lang="en-IN" sz="1050" dirty="0">
-              <a:effectLst/>
-              <a:latin typeface="Cambria" panose="02040503050406030204" pitchFamily="18" charset="0"/>
-              <a:ea typeface="MS Mincho" panose="02020609040205080304" pitchFamily="49" charset="-128"/>
-              <a:cs typeface="Times New Roman" panose="02020603050405020304" pitchFamily="18" charset="0"/>
-            </a:endParaRPr>
-          </a:p>
-          <a:p>
-            <a:pPr>
-              <a:lnSpc>
-                <a:spcPts val="1425"/>
-              </a:lnSpc>
-              <a:spcAft>
-                <a:spcPts val="0"/>
-              </a:spcAft>
-            </a:pPr>
-            <a:r>
-              <a:rPr lang="en-IN" sz="1050" dirty="0">
-                <a:latin typeface="Times New Roman" panose="02020603050405020304" pitchFamily="18" charset="0"/>
-                <a:ea typeface="Times New Roman" panose="02020603050405020304" pitchFamily="18" charset="0"/>
-                <a:cs typeface="Times New Roman" panose="02020603050405020304" pitchFamily="18" charset="0"/>
-              </a:rPr>
-              <a:t> </a:t>
-            </a:r>
-            <a:endParaRPr lang="en-IN" sz="1050" dirty="0">
-              <a:effectLst/>
-              <a:latin typeface="Cambria" panose="02040503050406030204" pitchFamily="18" charset="0"/>
-              <a:ea typeface="MS Mincho" panose="02020609040205080304" pitchFamily="49" charset="-128"/>
-              <a:cs typeface="Times New Roman" panose="02020603050405020304" pitchFamily="18" charset="0"/>
-            </a:endParaRPr>
-          </a:p>
-          <a:p>
-            <a:pPr>
-              <a:lnSpc>
-                <a:spcPts val="1425"/>
-              </a:lnSpc>
-              <a:spcAft>
-                <a:spcPts val="0"/>
-              </a:spcAft>
-            </a:pPr>
-            <a:r>
-              <a:rPr lang="en-IN" sz="1050" dirty="0">
-                <a:latin typeface="Times New Roman" panose="02020603050405020304" pitchFamily="18" charset="0"/>
-                <a:ea typeface="Times New Roman" panose="02020603050405020304" pitchFamily="18" charset="0"/>
-                <a:cs typeface="Times New Roman" panose="02020603050405020304" pitchFamily="18" charset="0"/>
-              </a:rPr>
-              <a:t>df = </a:t>
-            </a:r>
-            <a:r>
-              <a:rPr lang="en-IN" sz="1050" dirty="0" err="1">
-                <a:latin typeface="Times New Roman" panose="02020603050405020304" pitchFamily="18" charset="0"/>
-                <a:ea typeface="Times New Roman" panose="02020603050405020304" pitchFamily="18" charset="0"/>
-                <a:cs typeface="Times New Roman" panose="02020603050405020304" pitchFamily="18" charset="0"/>
-              </a:rPr>
-              <a:t>pd.read_csv</a:t>
-            </a:r>
-            <a:r>
-              <a:rPr lang="en-IN" sz="1050" dirty="0">
-                <a:latin typeface="Times New Roman" panose="02020603050405020304" pitchFamily="18" charset="0"/>
-                <a:ea typeface="Times New Roman" panose="02020603050405020304" pitchFamily="18" charset="0"/>
-                <a:cs typeface="Times New Roman" panose="02020603050405020304" pitchFamily="18" charset="0"/>
-              </a:rPr>
-              <a:t>(DATA_PATH)</a:t>
-            </a:r>
-            <a:endParaRPr lang="en-IN" sz="1050" dirty="0">
-              <a:effectLst/>
-              <a:latin typeface="Cambria" panose="02040503050406030204" pitchFamily="18" charset="0"/>
-              <a:ea typeface="MS Mincho" panose="02020609040205080304" pitchFamily="49" charset="-128"/>
-              <a:cs typeface="Times New Roman" panose="02020603050405020304" pitchFamily="18" charset="0"/>
-            </a:endParaRPr>
-          </a:p>
-          <a:p>
-            <a:pPr>
-              <a:lnSpc>
-                <a:spcPts val="1425"/>
-              </a:lnSpc>
-              <a:spcAft>
-                <a:spcPts val="0"/>
-              </a:spcAft>
-            </a:pPr>
-            <a:r>
-              <a:rPr lang="en-IN" sz="1050" dirty="0" err="1">
-                <a:latin typeface="Times New Roman" panose="02020603050405020304" pitchFamily="18" charset="0"/>
-                <a:ea typeface="Times New Roman" panose="02020603050405020304" pitchFamily="18" charset="0"/>
-                <a:cs typeface="Times New Roman" panose="02020603050405020304" pitchFamily="18" charset="0"/>
-              </a:rPr>
-              <a:t>feature_cols</a:t>
-            </a:r>
-            <a:r>
-              <a:rPr lang="en-IN" sz="1050" dirty="0">
-                <a:latin typeface="Times New Roman" panose="02020603050405020304" pitchFamily="18" charset="0"/>
-                <a:ea typeface="Times New Roman" panose="02020603050405020304" pitchFamily="18" charset="0"/>
-                <a:cs typeface="Times New Roman" panose="02020603050405020304" pitchFamily="18" charset="0"/>
-              </a:rPr>
-              <a:t> = ["</a:t>
-            </a:r>
-            <a:r>
-              <a:rPr lang="en-IN" sz="1050" dirty="0" err="1">
-                <a:latin typeface="Times New Roman" panose="02020603050405020304" pitchFamily="18" charset="0"/>
-                <a:ea typeface="Times New Roman" panose="02020603050405020304" pitchFamily="18" charset="0"/>
-                <a:cs typeface="Times New Roman" panose="02020603050405020304" pitchFamily="18" charset="0"/>
-              </a:rPr>
-              <a:t>Distance_km</a:t>
-            </a:r>
-            <a:r>
-              <a:rPr lang="en-IN" sz="1050" dirty="0">
-                <a:latin typeface="Times New Roman" panose="02020603050405020304" pitchFamily="18" charset="0"/>
-                <a:ea typeface="Times New Roman" panose="02020603050405020304" pitchFamily="18" charset="0"/>
-                <a:cs typeface="Times New Roman" panose="02020603050405020304" pitchFamily="18" charset="0"/>
-              </a:rPr>
-              <a:t>", "Capacity", "</a:t>
-            </a:r>
-            <a:r>
-              <a:rPr lang="en-IN" sz="1050" dirty="0" err="1">
-                <a:latin typeface="Times New Roman" panose="02020603050405020304" pitchFamily="18" charset="0"/>
-                <a:ea typeface="Times New Roman" panose="02020603050405020304" pitchFamily="18" charset="0"/>
-                <a:cs typeface="Times New Roman" panose="02020603050405020304" pitchFamily="18" charset="0"/>
-              </a:rPr>
-              <a:t>Fuel_Consumed_L</a:t>
-            </a:r>
-            <a:r>
-              <a:rPr lang="en-IN" sz="1050" dirty="0">
-                <a:latin typeface="Times New Roman" panose="02020603050405020304" pitchFamily="18" charset="0"/>
-                <a:ea typeface="Times New Roman" panose="02020603050405020304" pitchFamily="18" charset="0"/>
-                <a:cs typeface="Times New Roman" panose="02020603050405020304" pitchFamily="18" charset="0"/>
-              </a:rPr>
-              <a:t>"]  </a:t>
-            </a:r>
-            <a:r>
-              <a:rPr lang="en-IN" sz="1050" dirty="0" err="1">
-                <a:latin typeface="Times New Roman" panose="02020603050405020304" pitchFamily="18" charset="0"/>
-                <a:ea typeface="Times New Roman" panose="02020603050405020304" pitchFamily="18" charset="0"/>
-                <a:cs typeface="Times New Roman" panose="02020603050405020304" pitchFamily="18" charset="0"/>
-              </a:rPr>
-              <a:t>categorical_cols</a:t>
-            </a:r>
-            <a:r>
-              <a:rPr lang="en-IN" sz="1050" dirty="0">
-                <a:latin typeface="Times New Roman" panose="02020603050405020304" pitchFamily="18" charset="0"/>
-                <a:ea typeface="Times New Roman" panose="02020603050405020304" pitchFamily="18" charset="0"/>
-                <a:cs typeface="Times New Roman" panose="02020603050405020304" pitchFamily="18" charset="0"/>
-              </a:rPr>
-              <a:t> = ["</a:t>
-            </a:r>
-            <a:r>
-              <a:rPr lang="en-IN" sz="1050" dirty="0" err="1">
-                <a:latin typeface="Times New Roman" panose="02020603050405020304" pitchFamily="18" charset="0"/>
-                <a:ea typeface="Times New Roman" panose="02020603050405020304" pitchFamily="18" charset="0"/>
-                <a:cs typeface="Times New Roman" panose="02020603050405020304" pitchFamily="18" charset="0"/>
-              </a:rPr>
-              <a:t>Vehicle_Type</a:t>
-            </a:r>
-            <a:r>
-              <a:rPr lang="en-IN" sz="1050" dirty="0">
-                <a:latin typeface="Times New Roman" panose="02020603050405020304" pitchFamily="18" charset="0"/>
-                <a:ea typeface="Times New Roman" panose="02020603050405020304" pitchFamily="18" charset="0"/>
-                <a:cs typeface="Times New Roman" panose="02020603050405020304" pitchFamily="18" charset="0"/>
-              </a:rPr>
-              <a:t>", "Route"]</a:t>
-            </a:r>
-            <a:endParaRPr lang="en-IN" sz="1050" dirty="0">
-              <a:effectLst/>
-              <a:latin typeface="Cambria" panose="02040503050406030204" pitchFamily="18" charset="0"/>
-              <a:ea typeface="MS Mincho" panose="02020609040205080304" pitchFamily="49" charset="-128"/>
-              <a:cs typeface="Times New Roman" panose="02020603050405020304" pitchFamily="18" charset="0"/>
-            </a:endParaRPr>
-          </a:p>
-          <a:p>
-            <a:pPr>
-              <a:lnSpc>
-                <a:spcPts val="1425"/>
-              </a:lnSpc>
-              <a:spcAft>
-                <a:spcPts val="0"/>
-              </a:spcAft>
-            </a:pPr>
-            <a:r>
-              <a:rPr lang="en-IN" sz="1050" dirty="0">
-                <a:latin typeface="Times New Roman" panose="02020603050405020304" pitchFamily="18" charset="0"/>
-                <a:ea typeface="Times New Roman" panose="02020603050405020304" pitchFamily="18" charset="0"/>
-                <a:cs typeface="Times New Roman" panose="02020603050405020304" pitchFamily="18" charset="0"/>
-              </a:rPr>
-              <a:t> </a:t>
-            </a:r>
-            <a:endParaRPr lang="en-IN" sz="1050" dirty="0">
-              <a:effectLst/>
-              <a:latin typeface="Cambria" panose="02040503050406030204" pitchFamily="18" charset="0"/>
-              <a:ea typeface="MS Mincho" panose="02020609040205080304" pitchFamily="49" charset="-128"/>
-              <a:cs typeface="Times New Roman" panose="02020603050405020304" pitchFamily="18" charset="0"/>
-            </a:endParaRPr>
-          </a:p>
-          <a:p>
-            <a:pPr>
-              <a:lnSpc>
-                <a:spcPts val="1425"/>
-              </a:lnSpc>
-              <a:spcAft>
-                <a:spcPts val="0"/>
-              </a:spcAft>
-            </a:pPr>
-            <a:r>
-              <a:rPr lang="en-IN" sz="1050" dirty="0" err="1">
-                <a:latin typeface="Times New Roman" panose="02020603050405020304" pitchFamily="18" charset="0"/>
-                <a:ea typeface="Times New Roman" panose="02020603050405020304" pitchFamily="18" charset="0"/>
-                <a:cs typeface="Times New Roman" panose="02020603050405020304" pitchFamily="18" charset="0"/>
-              </a:rPr>
-              <a:t>X_num</a:t>
-            </a:r>
-            <a:r>
-              <a:rPr lang="en-IN" sz="1050" dirty="0">
-                <a:latin typeface="Times New Roman" panose="02020603050405020304" pitchFamily="18" charset="0"/>
-                <a:ea typeface="Times New Roman" panose="02020603050405020304" pitchFamily="18" charset="0"/>
-                <a:cs typeface="Times New Roman" panose="02020603050405020304" pitchFamily="18" charset="0"/>
-              </a:rPr>
-              <a:t> = df[</a:t>
-            </a:r>
-            <a:r>
-              <a:rPr lang="en-IN" sz="1050" dirty="0" err="1">
-                <a:latin typeface="Times New Roman" panose="02020603050405020304" pitchFamily="18" charset="0"/>
-                <a:ea typeface="Times New Roman" panose="02020603050405020304" pitchFamily="18" charset="0"/>
-                <a:cs typeface="Times New Roman" panose="02020603050405020304" pitchFamily="18" charset="0"/>
-              </a:rPr>
-              <a:t>feature_cols</a:t>
-            </a:r>
-            <a:r>
-              <a:rPr lang="en-IN" sz="1050" dirty="0">
-                <a:latin typeface="Times New Roman" panose="02020603050405020304" pitchFamily="18" charset="0"/>
-                <a:ea typeface="Times New Roman" panose="02020603050405020304" pitchFamily="18" charset="0"/>
-                <a:cs typeface="Times New Roman" panose="02020603050405020304" pitchFamily="18" charset="0"/>
-              </a:rPr>
-              <a:t>]</a:t>
-            </a:r>
-            <a:endParaRPr lang="en-IN" sz="1050" dirty="0">
-              <a:effectLst/>
-              <a:latin typeface="Cambria" panose="02040503050406030204" pitchFamily="18" charset="0"/>
-              <a:ea typeface="MS Mincho" panose="02020609040205080304" pitchFamily="49" charset="-128"/>
-              <a:cs typeface="Times New Roman" panose="02020603050405020304" pitchFamily="18" charset="0"/>
-            </a:endParaRPr>
-          </a:p>
-          <a:p>
-            <a:pPr>
-              <a:lnSpc>
-                <a:spcPts val="1425"/>
-              </a:lnSpc>
-              <a:spcAft>
-                <a:spcPts val="0"/>
-              </a:spcAft>
-            </a:pPr>
-            <a:r>
-              <a:rPr lang="en-IN" sz="1050" dirty="0">
-                <a:latin typeface="Times New Roman" panose="02020603050405020304" pitchFamily="18" charset="0"/>
-                <a:ea typeface="Times New Roman" panose="02020603050405020304" pitchFamily="18" charset="0"/>
-                <a:cs typeface="Times New Roman" panose="02020603050405020304" pitchFamily="18" charset="0"/>
-              </a:rPr>
-              <a:t> </a:t>
-            </a:r>
-            <a:endParaRPr lang="en-IN" sz="1050" dirty="0">
-              <a:effectLst/>
-              <a:latin typeface="Cambria" panose="02040503050406030204" pitchFamily="18" charset="0"/>
-              <a:ea typeface="MS Mincho" panose="02020609040205080304" pitchFamily="49" charset="-128"/>
-              <a:cs typeface="Times New Roman" panose="02020603050405020304" pitchFamily="18" charset="0"/>
-            </a:endParaRPr>
-          </a:p>
-          <a:p>
-            <a:pPr>
-              <a:lnSpc>
-                <a:spcPts val="1425"/>
-              </a:lnSpc>
-              <a:spcAft>
-                <a:spcPts val="0"/>
-              </a:spcAft>
-            </a:pPr>
-            <a:r>
-              <a:rPr lang="en-IN" sz="1050" dirty="0">
-                <a:latin typeface="Times New Roman" panose="02020603050405020304" pitchFamily="18" charset="0"/>
-                <a:ea typeface="Times New Roman" panose="02020603050405020304" pitchFamily="18" charset="0"/>
-                <a:cs typeface="Times New Roman" panose="02020603050405020304" pitchFamily="18" charset="0"/>
-              </a:rPr>
-              <a:t>encoder = </a:t>
-            </a:r>
-            <a:r>
-              <a:rPr lang="en-IN" sz="1050" dirty="0" err="1">
-                <a:latin typeface="Times New Roman" panose="02020603050405020304" pitchFamily="18" charset="0"/>
-                <a:ea typeface="Times New Roman" panose="02020603050405020304" pitchFamily="18" charset="0"/>
-                <a:cs typeface="Times New Roman" panose="02020603050405020304" pitchFamily="18" charset="0"/>
-              </a:rPr>
-              <a:t>OneHotEncoder</a:t>
-            </a:r>
-            <a:r>
-              <a:rPr lang="en-IN" sz="1050" dirty="0">
-                <a:latin typeface="Times New Roman" panose="02020603050405020304" pitchFamily="18" charset="0"/>
-                <a:ea typeface="Times New Roman" panose="02020603050405020304" pitchFamily="18" charset="0"/>
-                <a:cs typeface="Times New Roman" panose="02020603050405020304" pitchFamily="18" charset="0"/>
-              </a:rPr>
-              <a:t>(drop='first', </a:t>
-            </a:r>
-            <a:r>
-              <a:rPr lang="en-IN" sz="1050" dirty="0" err="1">
-                <a:latin typeface="Times New Roman" panose="02020603050405020304" pitchFamily="18" charset="0"/>
-                <a:ea typeface="Times New Roman" panose="02020603050405020304" pitchFamily="18" charset="0"/>
-                <a:cs typeface="Times New Roman" panose="02020603050405020304" pitchFamily="18" charset="0"/>
-              </a:rPr>
-              <a:t>dtype</a:t>
-            </a:r>
-            <a:r>
-              <a:rPr lang="en-IN" sz="1050" dirty="0">
-                <a:latin typeface="Times New Roman" panose="02020603050405020304" pitchFamily="18" charset="0"/>
-                <a:ea typeface="Times New Roman" panose="02020603050405020304" pitchFamily="18" charset="0"/>
-                <a:cs typeface="Times New Roman" panose="02020603050405020304" pitchFamily="18" charset="0"/>
-              </a:rPr>
-              <a:t>=int)</a:t>
-            </a:r>
-            <a:endParaRPr lang="en-IN" sz="1050" dirty="0">
-              <a:effectLst/>
-              <a:latin typeface="Cambria" panose="02040503050406030204" pitchFamily="18" charset="0"/>
-              <a:ea typeface="MS Mincho" panose="02020609040205080304" pitchFamily="49" charset="-128"/>
-              <a:cs typeface="Times New Roman" panose="02020603050405020304" pitchFamily="18" charset="0"/>
-            </a:endParaRPr>
-          </a:p>
-          <a:p>
-            <a:pPr>
-              <a:lnSpc>
-                <a:spcPts val="1425"/>
-              </a:lnSpc>
-              <a:spcAft>
-                <a:spcPts val="0"/>
-              </a:spcAft>
-            </a:pPr>
-            <a:r>
-              <a:rPr lang="en-IN" sz="1050" dirty="0" err="1">
-                <a:latin typeface="Times New Roman" panose="02020603050405020304" pitchFamily="18" charset="0"/>
-                <a:ea typeface="Times New Roman" panose="02020603050405020304" pitchFamily="18" charset="0"/>
-                <a:cs typeface="Times New Roman" panose="02020603050405020304" pitchFamily="18" charset="0"/>
-              </a:rPr>
-              <a:t>X_cat</a:t>
-            </a:r>
-            <a:r>
-              <a:rPr lang="en-IN" sz="1050" dirty="0">
-                <a:latin typeface="Times New Roman" panose="02020603050405020304" pitchFamily="18" charset="0"/>
-                <a:ea typeface="Times New Roman" panose="02020603050405020304" pitchFamily="18" charset="0"/>
-                <a:cs typeface="Times New Roman" panose="02020603050405020304" pitchFamily="18" charset="0"/>
-              </a:rPr>
-              <a:t> = </a:t>
-            </a:r>
-            <a:r>
-              <a:rPr lang="en-IN" sz="1050" dirty="0" err="1">
-                <a:latin typeface="Times New Roman" panose="02020603050405020304" pitchFamily="18" charset="0"/>
-                <a:ea typeface="Times New Roman" panose="02020603050405020304" pitchFamily="18" charset="0"/>
-                <a:cs typeface="Times New Roman" panose="02020603050405020304" pitchFamily="18" charset="0"/>
-              </a:rPr>
-              <a:t>encoder.fit_transform</a:t>
-            </a:r>
-            <a:r>
-              <a:rPr lang="en-IN" sz="1050" dirty="0">
-                <a:latin typeface="Times New Roman" panose="02020603050405020304" pitchFamily="18" charset="0"/>
-                <a:ea typeface="Times New Roman" panose="02020603050405020304" pitchFamily="18" charset="0"/>
-                <a:cs typeface="Times New Roman" panose="02020603050405020304" pitchFamily="18" charset="0"/>
-              </a:rPr>
-              <a:t>(df[</a:t>
-            </a:r>
-            <a:r>
-              <a:rPr lang="en-IN" sz="1050" dirty="0" err="1">
-                <a:latin typeface="Times New Roman" panose="02020603050405020304" pitchFamily="18" charset="0"/>
-                <a:ea typeface="Times New Roman" panose="02020603050405020304" pitchFamily="18" charset="0"/>
-                <a:cs typeface="Times New Roman" panose="02020603050405020304" pitchFamily="18" charset="0"/>
-              </a:rPr>
-              <a:t>categorical_cols</a:t>
-            </a:r>
-            <a:r>
-              <a:rPr lang="en-IN" sz="1050" dirty="0">
-                <a:latin typeface="Times New Roman" panose="02020603050405020304" pitchFamily="18" charset="0"/>
-                <a:ea typeface="Times New Roman" panose="02020603050405020304" pitchFamily="18" charset="0"/>
-                <a:cs typeface="Times New Roman" panose="02020603050405020304" pitchFamily="18" charset="0"/>
-              </a:rPr>
-              <a:t>]).</a:t>
-            </a:r>
-            <a:r>
-              <a:rPr lang="en-IN" sz="1050" dirty="0" err="1">
-                <a:latin typeface="Times New Roman" panose="02020603050405020304" pitchFamily="18" charset="0"/>
-                <a:ea typeface="Times New Roman" panose="02020603050405020304" pitchFamily="18" charset="0"/>
-                <a:cs typeface="Times New Roman" panose="02020603050405020304" pitchFamily="18" charset="0"/>
-              </a:rPr>
-              <a:t>toarray</a:t>
-            </a:r>
-            <a:r>
-              <a:rPr lang="en-IN" sz="1050" dirty="0">
-                <a:latin typeface="Times New Roman" panose="02020603050405020304" pitchFamily="18" charset="0"/>
-                <a:ea typeface="Times New Roman" panose="02020603050405020304" pitchFamily="18" charset="0"/>
-                <a:cs typeface="Times New Roman" panose="02020603050405020304" pitchFamily="18" charset="0"/>
-              </a:rPr>
-              <a:t>()</a:t>
-            </a:r>
-            <a:endParaRPr lang="en-IN" sz="1050" dirty="0">
-              <a:effectLst/>
-              <a:latin typeface="Cambria" panose="02040503050406030204" pitchFamily="18" charset="0"/>
-              <a:ea typeface="MS Mincho" panose="02020609040205080304" pitchFamily="49" charset="-128"/>
-              <a:cs typeface="Times New Roman" panose="02020603050405020304" pitchFamily="18" charset="0"/>
-            </a:endParaRPr>
-          </a:p>
-          <a:p>
-            <a:pPr>
-              <a:lnSpc>
-                <a:spcPts val="1425"/>
-              </a:lnSpc>
-              <a:spcAft>
-                <a:spcPts val="0"/>
-              </a:spcAft>
-            </a:pPr>
-            <a:r>
-              <a:rPr lang="en-IN" sz="1050" dirty="0">
-                <a:latin typeface="Times New Roman" panose="02020603050405020304" pitchFamily="18" charset="0"/>
-                <a:ea typeface="Times New Roman" panose="02020603050405020304" pitchFamily="18" charset="0"/>
-                <a:cs typeface="Times New Roman" panose="02020603050405020304" pitchFamily="18" charset="0"/>
-              </a:rPr>
-              <a:t> </a:t>
-            </a:r>
-            <a:endParaRPr lang="en-IN" sz="1050" dirty="0">
-              <a:effectLst/>
-              <a:latin typeface="Cambria" panose="02040503050406030204" pitchFamily="18" charset="0"/>
-              <a:ea typeface="MS Mincho" panose="02020609040205080304" pitchFamily="49" charset="-128"/>
-              <a:cs typeface="Times New Roman" panose="02020603050405020304" pitchFamily="18" charset="0"/>
-            </a:endParaRPr>
-          </a:p>
-          <a:p>
-            <a:pPr>
-              <a:lnSpc>
-                <a:spcPts val="1425"/>
-              </a:lnSpc>
-              <a:spcAft>
-                <a:spcPts val="0"/>
-              </a:spcAft>
-            </a:pPr>
-            <a:r>
-              <a:rPr lang="en-IN" sz="1050" dirty="0">
-                <a:latin typeface="Times New Roman" panose="02020603050405020304" pitchFamily="18" charset="0"/>
-                <a:ea typeface="Times New Roman" panose="02020603050405020304" pitchFamily="18" charset="0"/>
-                <a:cs typeface="Times New Roman" panose="02020603050405020304" pitchFamily="18" charset="0"/>
-              </a:rPr>
-              <a:t>import </a:t>
-            </a:r>
-            <a:r>
-              <a:rPr lang="en-IN" sz="1050" dirty="0" err="1">
-                <a:latin typeface="Times New Roman" panose="02020603050405020304" pitchFamily="18" charset="0"/>
-                <a:ea typeface="Times New Roman" panose="02020603050405020304" pitchFamily="18" charset="0"/>
-                <a:cs typeface="Times New Roman" panose="02020603050405020304" pitchFamily="18" charset="0"/>
-              </a:rPr>
-              <a:t>numpy</a:t>
-            </a:r>
-            <a:r>
-              <a:rPr lang="en-IN" sz="1050" dirty="0">
-                <a:latin typeface="Times New Roman" panose="02020603050405020304" pitchFamily="18" charset="0"/>
-                <a:ea typeface="Times New Roman" panose="02020603050405020304" pitchFamily="18" charset="0"/>
-                <a:cs typeface="Times New Roman" panose="02020603050405020304" pitchFamily="18" charset="0"/>
-              </a:rPr>
-              <a:t> as np</a:t>
-            </a:r>
-            <a:endParaRPr lang="en-IN" sz="1050" dirty="0">
-              <a:effectLst/>
-              <a:latin typeface="Cambria" panose="02040503050406030204" pitchFamily="18" charset="0"/>
-              <a:ea typeface="MS Mincho" panose="02020609040205080304" pitchFamily="49" charset="-128"/>
-              <a:cs typeface="Times New Roman" panose="02020603050405020304" pitchFamily="18" charset="0"/>
-            </a:endParaRPr>
-          </a:p>
-          <a:p>
-            <a:pPr>
-              <a:lnSpc>
-                <a:spcPts val="1425"/>
-              </a:lnSpc>
-              <a:spcAft>
-                <a:spcPts val="0"/>
-              </a:spcAft>
-            </a:pPr>
-            <a:r>
-              <a:rPr lang="en-IN" sz="1050" dirty="0">
-                <a:latin typeface="Times New Roman" panose="02020603050405020304" pitchFamily="18" charset="0"/>
-                <a:ea typeface="Times New Roman" panose="02020603050405020304" pitchFamily="18" charset="0"/>
-                <a:cs typeface="Times New Roman" panose="02020603050405020304" pitchFamily="18" charset="0"/>
-              </a:rPr>
-              <a:t>X = </a:t>
-            </a:r>
-            <a:r>
-              <a:rPr lang="en-IN" sz="1050" dirty="0" err="1">
-                <a:latin typeface="Times New Roman" panose="02020603050405020304" pitchFamily="18" charset="0"/>
-                <a:ea typeface="Times New Roman" panose="02020603050405020304" pitchFamily="18" charset="0"/>
-                <a:cs typeface="Times New Roman" panose="02020603050405020304" pitchFamily="18" charset="0"/>
-              </a:rPr>
-              <a:t>np.hstack</a:t>
-            </a:r>
-            <a:r>
-              <a:rPr lang="en-IN" sz="1050" dirty="0">
-                <a:latin typeface="Times New Roman" panose="02020603050405020304" pitchFamily="18" charset="0"/>
-                <a:ea typeface="Times New Roman" panose="02020603050405020304" pitchFamily="18" charset="0"/>
-                <a:cs typeface="Times New Roman" panose="02020603050405020304" pitchFamily="18" charset="0"/>
-              </a:rPr>
-              <a:t>([</a:t>
-            </a:r>
-            <a:r>
-              <a:rPr lang="en-IN" sz="1050" dirty="0" err="1">
-                <a:latin typeface="Times New Roman" panose="02020603050405020304" pitchFamily="18" charset="0"/>
-                <a:ea typeface="Times New Roman" panose="02020603050405020304" pitchFamily="18" charset="0"/>
-                <a:cs typeface="Times New Roman" panose="02020603050405020304" pitchFamily="18" charset="0"/>
-              </a:rPr>
-              <a:t>X_num.values</a:t>
-            </a:r>
-            <a:r>
-              <a:rPr lang="en-IN" sz="1050" dirty="0">
-                <a:latin typeface="Times New Roman" panose="02020603050405020304" pitchFamily="18" charset="0"/>
-                <a:ea typeface="Times New Roman" panose="02020603050405020304" pitchFamily="18" charset="0"/>
-                <a:cs typeface="Times New Roman" panose="02020603050405020304" pitchFamily="18" charset="0"/>
-              </a:rPr>
-              <a:t>, </a:t>
-            </a:r>
-            <a:r>
-              <a:rPr lang="en-IN" sz="1050" dirty="0" err="1">
-                <a:latin typeface="Times New Roman" panose="02020603050405020304" pitchFamily="18" charset="0"/>
-                <a:ea typeface="Times New Roman" panose="02020603050405020304" pitchFamily="18" charset="0"/>
-                <a:cs typeface="Times New Roman" panose="02020603050405020304" pitchFamily="18" charset="0"/>
-              </a:rPr>
-              <a:t>X_cat</a:t>
-            </a:r>
-            <a:r>
-              <a:rPr lang="en-IN" sz="1050" dirty="0">
-                <a:latin typeface="Times New Roman" panose="02020603050405020304" pitchFamily="18" charset="0"/>
-                <a:ea typeface="Times New Roman" panose="02020603050405020304" pitchFamily="18" charset="0"/>
-                <a:cs typeface="Times New Roman" panose="02020603050405020304" pitchFamily="18" charset="0"/>
-              </a:rPr>
-              <a:t>])</a:t>
-            </a:r>
-            <a:endParaRPr lang="en-IN" sz="1050" dirty="0">
-              <a:effectLst/>
-              <a:latin typeface="Cambria" panose="02040503050406030204" pitchFamily="18" charset="0"/>
-              <a:ea typeface="MS Mincho" panose="02020609040205080304" pitchFamily="49" charset="-128"/>
-              <a:cs typeface="Times New Roman" panose="02020603050405020304" pitchFamily="18" charset="0"/>
-            </a:endParaRPr>
-          </a:p>
-          <a:p>
-            <a:pPr>
-              <a:lnSpc>
-                <a:spcPts val="1425"/>
-              </a:lnSpc>
-              <a:spcAft>
-                <a:spcPts val="0"/>
-              </a:spcAft>
-            </a:pPr>
-            <a:r>
-              <a:rPr lang="en-IN" sz="1050" dirty="0">
-                <a:latin typeface="Times New Roman" panose="02020603050405020304" pitchFamily="18" charset="0"/>
-                <a:ea typeface="Times New Roman" panose="02020603050405020304" pitchFamily="18" charset="0"/>
-                <a:cs typeface="Times New Roman" panose="02020603050405020304" pitchFamily="18" charset="0"/>
-              </a:rPr>
-              <a:t>y = df["</a:t>
-            </a:r>
-            <a:r>
-              <a:rPr lang="en-IN" sz="1050" dirty="0" err="1">
-                <a:latin typeface="Times New Roman" panose="02020603050405020304" pitchFamily="18" charset="0"/>
-                <a:ea typeface="Times New Roman" panose="02020603050405020304" pitchFamily="18" charset="0"/>
-                <a:cs typeface="Times New Roman" panose="02020603050405020304" pitchFamily="18" charset="0"/>
-              </a:rPr>
-              <a:t>Fuel_Efficiency_km_per_L</a:t>
-            </a:r>
-            <a:r>
-              <a:rPr lang="en-IN" sz="1050" dirty="0">
-                <a:latin typeface="Times New Roman" panose="02020603050405020304" pitchFamily="18" charset="0"/>
-                <a:ea typeface="Times New Roman" panose="02020603050405020304" pitchFamily="18" charset="0"/>
-                <a:cs typeface="Times New Roman" panose="02020603050405020304" pitchFamily="18" charset="0"/>
-              </a:rPr>
-              <a:t>"].values</a:t>
-            </a:r>
-            <a:endParaRPr lang="en-IN" sz="1050" dirty="0">
-              <a:effectLst/>
-              <a:latin typeface="Cambria" panose="02040503050406030204" pitchFamily="18" charset="0"/>
-              <a:ea typeface="MS Mincho" panose="02020609040205080304" pitchFamily="49" charset="-128"/>
-              <a:cs typeface="Times New Roman" panose="02020603050405020304" pitchFamily="18" charset="0"/>
-            </a:endParaRPr>
-          </a:p>
-          <a:p>
-            <a:pPr>
-              <a:lnSpc>
-                <a:spcPts val="1425"/>
-              </a:lnSpc>
-              <a:spcAft>
-                <a:spcPts val="0"/>
-              </a:spcAft>
-            </a:pPr>
-            <a:r>
-              <a:rPr lang="en-IN" sz="1050" dirty="0">
-                <a:latin typeface="Times New Roman" panose="02020603050405020304" pitchFamily="18" charset="0"/>
-                <a:ea typeface="Times New Roman" panose="02020603050405020304" pitchFamily="18" charset="0"/>
-                <a:cs typeface="Times New Roman" panose="02020603050405020304" pitchFamily="18" charset="0"/>
-              </a:rPr>
-              <a:t> </a:t>
-            </a:r>
-            <a:endParaRPr lang="en-IN" sz="1050" dirty="0">
-              <a:effectLst/>
-              <a:latin typeface="Cambria" panose="02040503050406030204" pitchFamily="18" charset="0"/>
-              <a:ea typeface="MS Mincho" panose="02020609040205080304" pitchFamily="49" charset="-128"/>
-              <a:cs typeface="Times New Roman" panose="02020603050405020304" pitchFamily="18" charset="0"/>
-            </a:endParaRPr>
-          </a:p>
-          <a:p>
-            <a:pPr>
-              <a:lnSpc>
-                <a:spcPts val="1425"/>
-              </a:lnSpc>
-              <a:spcAft>
-                <a:spcPts val="0"/>
-              </a:spcAft>
-            </a:pPr>
-            <a:r>
-              <a:rPr lang="en-IN" sz="1050" dirty="0">
-                <a:latin typeface="Times New Roman" panose="02020603050405020304" pitchFamily="18" charset="0"/>
-                <a:ea typeface="Times New Roman" panose="02020603050405020304" pitchFamily="18" charset="0"/>
-                <a:cs typeface="Times New Roman" panose="02020603050405020304" pitchFamily="18" charset="0"/>
-              </a:rPr>
+          </a:p>
+          <a:p>
+            <a:r>
+              <a:rPr lang="en-IN" sz="1050" dirty="0" err="1"/>
+              <a:t>joblib.dump</a:t>
+            </a:r>
+            <a:r>
+              <a:rPr lang="en-IN" sz="1050" dirty="0"/>
+              <a:t>(model, MODEL_PATH)</a:t>
+            </a:r>
+          </a:p>
+          <a:p>
+            <a:br>
+              <a:rPr lang="en-IN" sz="1050" dirty="0"/>
+            </a:br>
+            <a:r>
+              <a:rPr lang="en-IN" sz="1050" dirty="0"/>
               <a:t>print(</a:t>
             </a:r>
             <a:r>
-              <a:rPr lang="en-IN" sz="1050" dirty="0" err="1">
-                <a:latin typeface="Times New Roman" panose="02020603050405020304" pitchFamily="18" charset="0"/>
-                <a:ea typeface="Times New Roman" panose="02020603050405020304" pitchFamily="18" charset="0"/>
-                <a:cs typeface="Times New Roman" panose="02020603050405020304" pitchFamily="18" charset="0"/>
-              </a:rPr>
-              <a:t>f"Features</a:t>
-            </a:r>
-            <a:r>
-              <a:rPr lang="en-IN" sz="1050" dirty="0">
-                <a:latin typeface="Times New Roman" panose="02020603050405020304" pitchFamily="18" charset="0"/>
-                <a:ea typeface="Times New Roman" panose="02020603050405020304" pitchFamily="18" charset="0"/>
-                <a:cs typeface="Times New Roman" panose="02020603050405020304" pitchFamily="18" charset="0"/>
-              </a:rPr>
-              <a:t> used: {</a:t>
-            </a:r>
-            <a:r>
-              <a:rPr lang="en-IN" sz="1050" dirty="0" err="1">
-                <a:latin typeface="Times New Roman" panose="02020603050405020304" pitchFamily="18" charset="0"/>
-                <a:ea typeface="Times New Roman" panose="02020603050405020304" pitchFamily="18" charset="0"/>
-                <a:cs typeface="Times New Roman" panose="02020603050405020304" pitchFamily="18" charset="0"/>
-              </a:rPr>
-              <a:t>X.shape</a:t>
-            </a:r>
-            <a:r>
-              <a:rPr lang="en-IN" sz="1050" dirty="0">
-                <a:latin typeface="Times New Roman" panose="02020603050405020304" pitchFamily="18" charset="0"/>
-                <a:ea typeface="Times New Roman" panose="02020603050405020304" pitchFamily="18" charset="0"/>
-                <a:cs typeface="Times New Roman" panose="02020603050405020304" pitchFamily="18" charset="0"/>
-              </a:rPr>
-              <a:t>[1]}, Rows: {</a:t>
-            </a:r>
-            <a:r>
-              <a:rPr lang="en-IN" sz="1050" dirty="0" err="1">
-                <a:latin typeface="Times New Roman" panose="02020603050405020304" pitchFamily="18" charset="0"/>
-                <a:ea typeface="Times New Roman" panose="02020603050405020304" pitchFamily="18" charset="0"/>
-                <a:cs typeface="Times New Roman" panose="02020603050405020304" pitchFamily="18" charset="0"/>
-              </a:rPr>
-              <a:t>X.shape</a:t>
-            </a:r>
-            <a:r>
-              <a:rPr lang="en-IN" sz="1050" dirty="0">
-                <a:latin typeface="Times New Roman" panose="02020603050405020304" pitchFamily="18" charset="0"/>
-                <a:ea typeface="Times New Roman" panose="02020603050405020304" pitchFamily="18" charset="0"/>
-                <a:cs typeface="Times New Roman" panose="02020603050405020304" pitchFamily="18" charset="0"/>
-              </a:rPr>
-              <a:t>[0]}")</a:t>
-            </a:r>
-            <a:endParaRPr lang="en-IN" sz="1050" dirty="0">
-              <a:effectLst/>
-              <a:latin typeface="Cambria" panose="02040503050406030204" pitchFamily="18" charset="0"/>
-              <a:ea typeface="MS Mincho" panose="02020609040205080304" pitchFamily="49" charset="-128"/>
-              <a:cs typeface="Times New Roman" panose="02020603050405020304" pitchFamily="18" charset="0"/>
-            </a:endParaRPr>
-          </a:p>
-          <a:p>
-            <a:pPr>
-              <a:lnSpc>
-                <a:spcPts val="1425"/>
-              </a:lnSpc>
-              <a:spcAft>
-                <a:spcPts val="0"/>
-              </a:spcAft>
-            </a:pPr>
-            <a:r>
-              <a:rPr lang="en-IN" sz="1050" dirty="0">
-                <a:latin typeface="Times New Roman" panose="02020603050405020304" pitchFamily="18" charset="0"/>
-                <a:ea typeface="Times New Roman" panose="02020603050405020304" pitchFamily="18" charset="0"/>
-                <a:cs typeface="Times New Roman" panose="02020603050405020304" pitchFamily="18" charset="0"/>
-              </a:rPr>
-              <a:t> </a:t>
-            </a:r>
-            <a:endParaRPr lang="en-IN" sz="1050" dirty="0">
-              <a:effectLst/>
-              <a:latin typeface="Cambria" panose="02040503050406030204" pitchFamily="18" charset="0"/>
-              <a:ea typeface="MS Mincho" panose="02020609040205080304" pitchFamily="49" charset="-128"/>
-              <a:cs typeface="Times New Roman" panose="02020603050405020304" pitchFamily="18" charset="0"/>
-            </a:endParaRPr>
-          </a:p>
-          <a:p>
-            <a:pPr>
-              <a:lnSpc>
-                <a:spcPts val="1425"/>
-              </a:lnSpc>
-              <a:spcAft>
-                <a:spcPts val="0"/>
-              </a:spcAft>
-            </a:pPr>
-            <a:r>
-              <a:rPr lang="en-IN" sz="1050" dirty="0">
-                <a:latin typeface="Times New Roman" panose="02020603050405020304" pitchFamily="18" charset="0"/>
-                <a:ea typeface="Times New Roman" panose="02020603050405020304" pitchFamily="18" charset="0"/>
-                <a:cs typeface="Times New Roman" panose="02020603050405020304" pitchFamily="18" charset="0"/>
-              </a:rPr>
-              <a:t>model = </a:t>
-            </a:r>
-            <a:r>
-              <a:rPr lang="en-IN" sz="1050" dirty="0" err="1">
-                <a:latin typeface="Times New Roman" panose="02020603050405020304" pitchFamily="18" charset="0"/>
-                <a:ea typeface="Times New Roman" panose="02020603050405020304" pitchFamily="18" charset="0"/>
-                <a:cs typeface="Times New Roman" panose="02020603050405020304" pitchFamily="18" charset="0"/>
-              </a:rPr>
-              <a:t>RandomForestRegressor</a:t>
-            </a:r>
-            <a:r>
-              <a:rPr lang="en-IN" sz="1050" dirty="0">
-                <a:latin typeface="Times New Roman" panose="02020603050405020304" pitchFamily="18" charset="0"/>
-                <a:ea typeface="Times New Roman" panose="02020603050405020304" pitchFamily="18" charset="0"/>
-                <a:cs typeface="Times New Roman" panose="02020603050405020304" pitchFamily="18" charset="0"/>
-              </a:rPr>
-              <a:t>(</a:t>
-            </a:r>
-            <a:r>
-              <a:rPr lang="en-IN" sz="1050" dirty="0" err="1">
-                <a:latin typeface="Times New Roman" panose="02020603050405020304" pitchFamily="18" charset="0"/>
-                <a:ea typeface="Times New Roman" panose="02020603050405020304" pitchFamily="18" charset="0"/>
-                <a:cs typeface="Times New Roman" panose="02020603050405020304" pitchFamily="18" charset="0"/>
-              </a:rPr>
-              <a:t>n_estimators</a:t>
-            </a:r>
-            <a:r>
-              <a:rPr lang="en-IN" sz="1050" dirty="0">
-                <a:latin typeface="Times New Roman" panose="02020603050405020304" pitchFamily="18" charset="0"/>
-                <a:ea typeface="Times New Roman" panose="02020603050405020304" pitchFamily="18" charset="0"/>
-                <a:cs typeface="Times New Roman" panose="02020603050405020304" pitchFamily="18" charset="0"/>
-              </a:rPr>
-              <a:t>=100, </a:t>
-            </a:r>
-            <a:r>
-              <a:rPr lang="en-IN" sz="1050" dirty="0" err="1">
-                <a:latin typeface="Times New Roman" panose="02020603050405020304" pitchFamily="18" charset="0"/>
-                <a:ea typeface="Times New Roman" panose="02020603050405020304" pitchFamily="18" charset="0"/>
-                <a:cs typeface="Times New Roman" panose="02020603050405020304" pitchFamily="18" charset="0"/>
-              </a:rPr>
-              <a:t>random_state</a:t>
-            </a:r>
-            <a:r>
-              <a:rPr lang="en-IN" sz="1050" dirty="0">
-                <a:latin typeface="Times New Roman" panose="02020603050405020304" pitchFamily="18" charset="0"/>
-                <a:ea typeface="Times New Roman" panose="02020603050405020304" pitchFamily="18" charset="0"/>
-                <a:cs typeface="Times New Roman" panose="02020603050405020304" pitchFamily="18" charset="0"/>
-              </a:rPr>
-              <a:t>=42)</a:t>
-            </a:r>
-            <a:endParaRPr lang="en-IN" sz="1050" dirty="0">
-              <a:effectLst/>
-              <a:latin typeface="Cambria" panose="02040503050406030204" pitchFamily="18" charset="0"/>
-              <a:ea typeface="MS Mincho" panose="02020609040205080304" pitchFamily="49" charset="-128"/>
-              <a:cs typeface="Times New Roman" panose="02020603050405020304" pitchFamily="18" charset="0"/>
-            </a:endParaRPr>
-          </a:p>
-          <a:p>
-            <a:pPr>
-              <a:lnSpc>
-                <a:spcPts val="1425"/>
-              </a:lnSpc>
-              <a:spcAft>
-                <a:spcPts val="0"/>
-              </a:spcAft>
-            </a:pPr>
-            <a:r>
-              <a:rPr lang="en-IN" sz="1050" dirty="0" err="1">
-                <a:latin typeface="Times New Roman" panose="02020603050405020304" pitchFamily="18" charset="0"/>
-                <a:ea typeface="Times New Roman" panose="02020603050405020304" pitchFamily="18" charset="0"/>
-                <a:cs typeface="Times New Roman" panose="02020603050405020304" pitchFamily="18" charset="0"/>
-              </a:rPr>
-              <a:t>model.fit</a:t>
-            </a:r>
-            <a:r>
-              <a:rPr lang="en-IN" sz="1050" dirty="0">
-                <a:latin typeface="Times New Roman" panose="02020603050405020304" pitchFamily="18" charset="0"/>
-                <a:ea typeface="Times New Roman" panose="02020603050405020304" pitchFamily="18" charset="0"/>
-                <a:cs typeface="Times New Roman" panose="02020603050405020304" pitchFamily="18" charset="0"/>
-              </a:rPr>
-              <a:t>(X, y)</a:t>
-            </a:r>
-            <a:endParaRPr lang="en-IN" sz="1050" dirty="0">
-              <a:effectLst/>
-              <a:latin typeface="Cambria" panose="02040503050406030204" pitchFamily="18" charset="0"/>
-              <a:ea typeface="MS Mincho" panose="02020609040205080304" pitchFamily="49" charset="-128"/>
-              <a:cs typeface="Times New Roman" panose="02020603050405020304" pitchFamily="18" charset="0"/>
-            </a:endParaRPr>
-          </a:p>
-          <a:p>
-            <a:pPr>
-              <a:lnSpc>
-                <a:spcPts val="1425"/>
-              </a:lnSpc>
-              <a:spcAft>
-                <a:spcPts val="0"/>
-              </a:spcAft>
-            </a:pPr>
-            <a:r>
-              <a:rPr lang="en-IN" sz="1050" dirty="0">
-                <a:latin typeface="Times New Roman" panose="02020603050405020304" pitchFamily="18" charset="0"/>
-                <a:ea typeface="Times New Roman" panose="02020603050405020304" pitchFamily="18" charset="0"/>
-                <a:cs typeface="Times New Roman" panose="02020603050405020304" pitchFamily="18" charset="0"/>
-              </a:rPr>
-              <a:t> </a:t>
-            </a:r>
-            <a:endParaRPr lang="en-IN" sz="1050" dirty="0">
-              <a:effectLst/>
-              <a:latin typeface="Cambria" panose="02040503050406030204" pitchFamily="18" charset="0"/>
-              <a:ea typeface="MS Mincho" panose="02020609040205080304" pitchFamily="49" charset="-128"/>
-              <a:cs typeface="Times New Roman" panose="02020603050405020304" pitchFamily="18" charset="0"/>
-            </a:endParaRPr>
-          </a:p>
-          <a:p>
-            <a:pPr>
-              <a:lnSpc>
-                <a:spcPts val="1425"/>
-              </a:lnSpc>
-              <a:spcAft>
-                <a:spcPts val="0"/>
-              </a:spcAft>
-            </a:pPr>
-            <a:r>
-              <a:rPr lang="en-IN" sz="1050" dirty="0" err="1">
-                <a:latin typeface="Times New Roman" panose="02020603050405020304" pitchFamily="18" charset="0"/>
-                <a:ea typeface="Times New Roman" panose="02020603050405020304" pitchFamily="18" charset="0"/>
-                <a:cs typeface="Times New Roman" panose="02020603050405020304" pitchFamily="18" charset="0"/>
-              </a:rPr>
-              <a:t>y_pred</a:t>
-            </a:r>
-            <a:r>
-              <a:rPr lang="en-IN" sz="1050" dirty="0">
-                <a:latin typeface="Times New Roman" panose="02020603050405020304" pitchFamily="18" charset="0"/>
-                <a:ea typeface="Times New Roman" panose="02020603050405020304" pitchFamily="18" charset="0"/>
-                <a:cs typeface="Times New Roman" panose="02020603050405020304" pitchFamily="18" charset="0"/>
-              </a:rPr>
-              <a:t> = </a:t>
-            </a:r>
-            <a:r>
-              <a:rPr lang="en-IN" sz="1050" dirty="0" err="1">
-                <a:latin typeface="Times New Roman" panose="02020603050405020304" pitchFamily="18" charset="0"/>
-                <a:ea typeface="Times New Roman" panose="02020603050405020304" pitchFamily="18" charset="0"/>
-                <a:cs typeface="Times New Roman" panose="02020603050405020304" pitchFamily="18" charset="0"/>
-              </a:rPr>
-              <a:t>model.predict</a:t>
-            </a:r>
-            <a:r>
-              <a:rPr lang="en-IN" sz="1050" dirty="0">
-                <a:latin typeface="Times New Roman" panose="02020603050405020304" pitchFamily="18" charset="0"/>
-                <a:ea typeface="Times New Roman" panose="02020603050405020304" pitchFamily="18" charset="0"/>
-                <a:cs typeface="Times New Roman" panose="02020603050405020304" pitchFamily="18" charset="0"/>
-              </a:rPr>
-              <a:t>(X)</a:t>
-            </a:r>
-            <a:endParaRPr lang="en-IN" sz="1050" dirty="0">
-              <a:effectLst/>
-              <a:latin typeface="Cambria" panose="02040503050406030204" pitchFamily="18" charset="0"/>
-              <a:ea typeface="MS Mincho" panose="02020609040205080304" pitchFamily="49" charset="-128"/>
-              <a:cs typeface="Times New Roman" panose="02020603050405020304" pitchFamily="18" charset="0"/>
-            </a:endParaRPr>
-          </a:p>
-          <a:p>
-            <a:pPr>
-              <a:lnSpc>
-                <a:spcPts val="1425"/>
-              </a:lnSpc>
-              <a:spcAft>
-                <a:spcPts val="0"/>
-              </a:spcAft>
-            </a:pPr>
-            <a:r>
-              <a:rPr lang="en-IN" sz="1050" dirty="0" err="1">
-                <a:latin typeface="Times New Roman" panose="02020603050405020304" pitchFamily="18" charset="0"/>
-                <a:ea typeface="Times New Roman" panose="02020603050405020304" pitchFamily="18" charset="0"/>
-                <a:cs typeface="Times New Roman" panose="02020603050405020304" pitchFamily="18" charset="0"/>
-              </a:rPr>
-              <a:t>mae</a:t>
-            </a:r>
-            <a:r>
-              <a:rPr lang="en-IN" sz="1050" dirty="0">
-                <a:latin typeface="Times New Roman" panose="02020603050405020304" pitchFamily="18" charset="0"/>
-                <a:ea typeface="Times New Roman" panose="02020603050405020304" pitchFamily="18" charset="0"/>
-                <a:cs typeface="Times New Roman" panose="02020603050405020304" pitchFamily="18" charset="0"/>
-              </a:rPr>
-              <a:t> = </a:t>
-            </a:r>
-            <a:r>
-              <a:rPr lang="en-IN" sz="1050" dirty="0" err="1">
-                <a:latin typeface="Times New Roman" panose="02020603050405020304" pitchFamily="18" charset="0"/>
-                <a:ea typeface="Times New Roman" panose="02020603050405020304" pitchFamily="18" charset="0"/>
-                <a:cs typeface="Times New Roman" panose="02020603050405020304" pitchFamily="18" charset="0"/>
-              </a:rPr>
-              <a:t>mean_absolute_error</a:t>
-            </a:r>
-            <a:r>
-              <a:rPr lang="en-IN" sz="1050" dirty="0">
-                <a:latin typeface="Times New Roman" panose="02020603050405020304" pitchFamily="18" charset="0"/>
-                <a:ea typeface="Times New Roman" panose="02020603050405020304" pitchFamily="18" charset="0"/>
-                <a:cs typeface="Times New Roman" panose="02020603050405020304" pitchFamily="18" charset="0"/>
-              </a:rPr>
-              <a:t>(y, </a:t>
-            </a:r>
-            <a:r>
-              <a:rPr lang="en-IN" sz="1050" dirty="0" err="1">
-                <a:latin typeface="Times New Roman" panose="02020603050405020304" pitchFamily="18" charset="0"/>
-                <a:ea typeface="Times New Roman" panose="02020603050405020304" pitchFamily="18" charset="0"/>
-                <a:cs typeface="Times New Roman" panose="02020603050405020304" pitchFamily="18" charset="0"/>
-              </a:rPr>
-              <a:t>y_pred</a:t>
-            </a:r>
-            <a:r>
-              <a:rPr lang="en-IN" sz="1050" dirty="0">
-                <a:latin typeface="Times New Roman" panose="02020603050405020304" pitchFamily="18" charset="0"/>
-                <a:ea typeface="Times New Roman" panose="02020603050405020304" pitchFamily="18" charset="0"/>
-                <a:cs typeface="Times New Roman" panose="02020603050405020304" pitchFamily="18" charset="0"/>
-              </a:rPr>
-              <a:t>)</a:t>
-            </a:r>
-            <a:endParaRPr lang="en-IN" sz="1050" dirty="0">
-              <a:effectLst/>
-              <a:latin typeface="Cambria" panose="02040503050406030204" pitchFamily="18" charset="0"/>
-              <a:ea typeface="MS Mincho" panose="02020609040205080304" pitchFamily="49" charset="-128"/>
-              <a:cs typeface="Times New Roman" panose="02020603050405020304" pitchFamily="18" charset="0"/>
-            </a:endParaRPr>
-          </a:p>
-          <a:p>
-            <a:pPr>
-              <a:lnSpc>
-                <a:spcPts val="1425"/>
-              </a:lnSpc>
-              <a:spcAft>
-                <a:spcPts val="0"/>
-              </a:spcAft>
-            </a:pPr>
-            <a:r>
-              <a:rPr lang="en-IN" sz="1050" dirty="0">
-                <a:latin typeface="Times New Roman" panose="02020603050405020304" pitchFamily="18" charset="0"/>
-                <a:ea typeface="Times New Roman" panose="02020603050405020304" pitchFamily="18" charset="0"/>
-                <a:cs typeface="Times New Roman" panose="02020603050405020304" pitchFamily="18" charset="0"/>
-              </a:rPr>
-              <a:t>r2 = r2_score(y, </a:t>
-            </a:r>
-            <a:r>
-              <a:rPr lang="en-IN" sz="1050" dirty="0" err="1">
-                <a:latin typeface="Times New Roman" panose="02020603050405020304" pitchFamily="18" charset="0"/>
-                <a:ea typeface="Times New Roman" panose="02020603050405020304" pitchFamily="18" charset="0"/>
-                <a:cs typeface="Times New Roman" panose="02020603050405020304" pitchFamily="18" charset="0"/>
-              </a:rPr>
-              <a:t>y_pred</a:t>
-            </a:r>
-            <a:r>
-              <a:rPr lang="en-IN" sz="1050" dirty="0">
-                <a:latin typeface="Times New Roman" panose="02020603050405020304" pitchFamily="18" charset="0"/>
-                <a:ea typeface="Times New Roman" panose="02020603050405020304" pitchFamily="18" charset="0"/>
-                <a:cs typeface="Times New Roman" panose="02020603050405020304" pitchFamily="18" charset="0"/>
-              </a:rPr>
-              <a:t>)</a:t>
-            </a:r>
-            <a:endParaRPr lang="en-IN" sz="1050" dirty="0">
-              <a:effectLst/>
-              <a:latin typeface="Cambria" panose="02040503050406030204" pitchFamily="18" charset="0"/>
-              <a:ea typeface="MS Mincho" panose="02020609040205080304" pitchFamily="49" charset="-128"/>
-              <a:cs typeface="Times New Roman" panose="02020603050405020304" pitchFamily="18" charset="0"/>
-            </a:endParaRPr>
-          </a:p>
-          <a:p>
-            <a:pPr>
-              <a:lnSpc>
-                <a:spcPts val="1425"/>
-              </a:lnSpc>
-              <a:spcAft>
-                <a:spcPts val="0"/>
-              </a:spcAft>
-            </a:pPr>
-            <a:r>
-              <a:rPr lang="en-IN" sz="1050" dirty="0">
-                <a:latin typeface="Times New Roman" panose="02020603050405020304" pitchFamily="18" charset="0"/>
-                <a:ea typeface="Times New Roman" panose="02020603050405020304" pitchFamily="18" charset="0"/>
-                <a:cs typeface="Times New Roman" panose="02020603050405020304" pitchFamily="18" charset="0"/>
-              </a:rPr>
-              <a:t> </a:t>
-            </a:r>
+              <a:rPr lang="en-IN" sz="1050" dirty="0" err="1"/>
+              <a:t>f"Model</a:t>
+            </a:r>
+            <a:r>
+              <a:rPr lang="en-IN" sz="1050" dirty="0"/>
+              <a:t> saved at: {MODEL_PATH}")</a:t>
+            </a:r>
+          </a:p>
+          <a:p>
+            <a:br>
+              <a:rPr lang="en-IN" dirty="0"/>
+            </a:br>
+            <a:endParaRPr lang="en-IN" dirty="0"/>
           </a:p>
           <a:p>
             <a:pPr>

</xml_diff>